<commit_message>
Uploading documentation in progress
</commit_message>
<xml_diff>
--- a/vignettes/vignetteFigs/00vignetteFigs.pptx
+++ b/vignettes/vignetteFigs/00vignetteFigs.pptx
@@ -5,10 +5,20 @@
     <p:sldMasterId id="2147483648" r:id="rId1"/>
   </p:sldMasterIdLst>
   <p:notesMasterIdLst>
-    <p:notesMasterId r:id="rId3"/>
+    <p:notesMasterId r:id="rId13"/>
   </p:notesMasterIdLst>
   <p:sldIdLst>
     <p:sldId id="256" r:id="rId2"/>
+    <p:sldId id="257" r:id="rId3"/>
+    <p:sldId id="259" r:id="rId4"/>
+    <p:sldId id="258" r:id="rId5"/>
+    <p:sldId id="260" r:id="rId6"/>
+    <p:sldId id="261" r:id="rId7"/>
+    <p:sldId id="262" r:id="rId8"/>
+    <p:sldId id="263" r:id="rId9"/>
+    <p:sldId id="264" r:id="rId10"/>
+    <p:sldId id="267" r:id="rId11"/>
+    <p:sldId id="266" r:id="rId12"/>
   </p:sldIdLst>
   <p:sldSz cx="12192000" cy="6858000"/>
   <p:notesSz cx="6858000" cy="9144000"/>
@@ -197,7 +207,7 @@
           <a:p>
             <a:fld id="{921607FB-4AF3-41D9-93C1-AF2B65302971}" type="datetimeFigureOut">
               <a:rPr lang="en-US" smtClean="0"/>
-              <a:t>6/24/2021</a:t>
+              <a:t>7/6/2021</a:t>
             </a:fld>
             <a:endParaRPr lang="en-US"/>
           </a:p>
@@ -593,7 +603,7 @@
           <a:p>
             <a:fld id="{11D67388-0790-496E-9A12-37055489AF4F}" type="datetimeFigureOut">
               <a:rPr lang="en-US" smtClean="0"/>
-              <a:t>6/24/2021</a:t>
+              <a:t>7/6/2021</a:t>
             </a:fld>
             <a:endParaRPr lang="en-US"/>
           </a:p>
@@ -761,7 +771,7 @@
           <a:p>
             <a:fld id="{11D67388-0790-496E-9A12-37055489AF4F}" type="datetimeFigureOut">
               <a:rPr lang="en-US" smtClean="0"/>
-              <a:t>6/24/2021</a:t>
+              <a:t>7/6/2021</a:t>
             </a:fld>
             <a:endParaRPr lang="en-US"/>
           </a:p>
@@ -939,7 +949,7 @@
           <a:p>
             <a:fld id="{11D67388-0790-496E-9A12-37055489AF4F}" type="datetimeFigureOut">
               <a:rPr lang="en-US" smtClean="0"/>
-              <a:t>6/24/2021</a:t>
+              <a:t>7/6/2021</a:t>
             </a:fld>
             <a:endParaRPr lang="en-US"/>
           </a:p>
@@ -1107,7 +1117,7 @@
           <a:p>
             <a:fld id="{11D67388-0790-496E-9A12-37055489AF4F}" type="datetimeFigureOut">
               <a:rPr lang="en-US" smtClean="0"/>
-              <a:t>6/24/2021</a:t>
+              <a:t>7/6/2021</a:t>
             </a:fld>
             <a:endParaRPr lang="en-US"/>
           </a:p>
@@ -1352,7 +1362,7 @@
           <a:p>
             <a:fld id="{11D67388-0790-496E-9A12-37055489AF4F}" type="datetimeFigureOut">
               <a:rPr lang="en-US" smtClean="0"/>
-              <a:t>6/24/2021</a:t>
+              <a:t>7/6/2021</a:t>
             </a:fld>
             <a:endParaRPr lang="en-US"/>
           </a:p>
@@ -1581,7 +1591,7 @@
           <a:p>
             <a:fld id="{11D67388-0790-496E-9A12-37055489AF4F}" type="datetimeFigureOut">
               <a:rPr lang="en-US" smtClean="0"/>
-              <a:t>6/24/2021</a:t>
+              <a:t>7/6/2021</a:t>
             </a:fld>
             <a:endParaRPr lang="en-US"/>
           </a:p>
@@ -1945,7 +1955,7 @@
           <a:p>
             <a:fld id="{11D67388-0790-496E-9A12-37055489AF4F}" type="datetimeFigureOut">
               <a:rPr lang="en-US" smtClean="0"/>
-              <a:t>6/24/2021</a:t>
+              <a:t>7/6/2021</a:t>
             </a:fld>
             <a:endParaRPr lang="en-US"/>
           </a:p>
@@ -2062,7 +2072,7 @@
           <a:p>
             <a:fld id="{11D67388-0790-496E-9A12-37055489AF4F}" type="datetimeFigureOut">
               <a:rPr lang="en-US" smtClean="0"/>
-              <a:t>6/24/2021</a:t>
+              <a:t>7/6/2021</a:t>
             </a:fld>
             <a:endParaRPr lang="en-US"/>
           </a:p>
@@ -2157,7 +2167,7 @@
           <a:p>
             <a:fld id="{11D67388-0790-496E-9A12-37055489AF4F}" type="datetimeFigureOut">
               <a:rPr lang="en-US" smtClean="0"/>
-              <a:t>6/24/2021</a:t>
+              <a:t>7/6/2021</a:t>
             </a:fld>
             <a:endParaRPr lang="en-US"/>
           </a:p>
@@ -2432,7 +2442,7 @@
           <a:p>
             <a:fld id="{11D67388-0790-496E-9A12-37055489AF4F}" type="datetimeFigureOut">
               <a:rPr lang="en-US" smtClean="0"/>
-              <a:t>6/24/2021</a:t>
+              <a:t>7/6/2021</a:t>
             </a:fld>
             <a:endParaRPr lang="en-US"/>
           </a:p>
@@ -2684,7 +2694,7 @@
           <a:p>
             <a:fld id="{11D67388-0790-496E-9A12-37055489AF4F}" type="datetimeFigureOut">
               <a:rPr lang="en-US" smtClean="0"/>
-              <a:t>6/24/2021</a:t>
+              <a:t>7/6/2021</a:t>
             </a:fld>
             <a:endParaRPr lang="en-US"/>
           </a:p>
@@ -2895,7 +2905,7 @@
           <a:p>
             <a:fld id="{11D67388-0790-496E-9A12-37055489AF4F}" type="datetimeFigureOut">
               <a:rPr lang="en-US" smtClean="0"/>
-              <a:t>6/24/2021</a:t>
+              <a:t>7/6/2021</a:t>
             </a:fld>
             <a:endParaRPr lang="en-US"/>
           </a:p>
@@ -3399,8 +3409,8 @@
         </p:nvSpPr>
         <p:spPr>
           <a:xfrm>
-            <a:off x="10366408" y="163629"/>
-            <a:ext cx="1655545" cy="1530417"/>
+            <a:off x="10366408" y="510138"/>
+            <a:ext cx="1655545" cy="702213"/>
           </a:xfrm>
           <a:prstGeom prst="roundRect">
             <a:avLst/>
@@ -3432,29 +3442,6 @@
               <a:t>Inputs</a:t>
             </a:r>
           </a:p>
-          <a:p>
-            <a:pPr algn="ctr"/>
-            <a:r>
-              <a:rPr lang="en-US" dirty="0" err="1"/>
-              <a:t>Asdasd</a:t>
-            </a:r>
-            <a:endParaRPr lang="en-US" dirty="0"/>
-          </a:p>
-          <a:p>
-            <a:pPr algn="ctr"/>
-            <a:r>
-              <a:rPr lang="en-US" dirty="0" err="1"/>
-              <a:t>Asdasas</a:t>
-            </a:r>
-            <a:endParaRPr lang="en-US" dirty="0"/>
-          </a:p>
-          <a:p>
-            <a:pPr algn="ctr"/>
-            <a:r>
-              <a:rPr lang="en-US" dirty="0"/>
-              <a:t>sad</a:t>
-            </a:r>
-          </a:p>
         </p:txBody>
       </p:sp>
       <p:cxnSp>
@@ -3640,7 +3627,7 @@
             <a:pPr algn="ctr"/>
             <a:r>
               <a:rPr lang="en-US" dirty="0"/>
-              <a:t>Tabs</a:t>
+              <a:t>Overview Map</a:t>
             </a:r>
           </a:p>
         </p:txBody>
@@ -3706,6 +3693,4138 @@
     <p:extLst>
       <p:ext uri="{BB962C8B-B14F-4D97-AF65-F5344CB8AC3E}">
         <p14:creationId xmlns:p14="http://schemas.microsoft.com/office/powerpoint/2010/main" val="4183064901"/>
+      </p:ext>
+    </p:extLst>
+  </p:cSld>
+  <p:clrMapOvr>
+    <a:masterClrMapping/>
+  </p:clrMapOvr>
+</p:sld>
+</file>
+
+<file path=ppt/slides/slide10.xml><?xml version="1.0" encoding="utf-8"?>
+<p:sld xmlns:a="http://schemas.openxmlformats.org/drawingml/2006/main" xmlns:r="http://schemas.openxmlformats.org/officeDocument/2006/relationships" xmlns:p="http://schemas.openxmlformats.org/presentationml/2006/main">
+  <p:cSld>
+    <p:spTree>
+      <p:nvGrpSpPr>
+        <p:cNvPr id="1" name=""/>
+        <p:cNvGrpSpPr/>
+        <p:nvPr/>
+      </p:nvGrpSpPr>
+      <p:grpSpPr>
+        <a:xfrm>
+          <a:off x="0" y="0"/>
+          <a:ext cx="0" cy="0"/>
+          <a:chOff x="0" y="0"/>
+          <a:chExt cx="0" cy="0"/>
+        </a:xfrm>
+      </p:grpSpPr>
+      <p:sp>
+        <p:nvSpPr>
+          <p:cNvPr id="2" name="Title 1">
+            <a:extLst>
+              <a:ext uri="{FF2B5EF4-FFF2-40B4-BE49-F238E27FC236}">
+                <a16:creationId xmlns:a16="http://schemas.microsoft.com/office/drawing/2014/main" id="{541384B6-2905-41D6-B59E-FBA71E71A600}"/>
+              </a:ext>
+            </a:extLst>
+          </p:cNvPr>
+          <p:cNvSpPr>
+            <a:spLocks noGrp="1"/>
+          </p:cNvSpPr>
+          <p:nvPr>
+            <p:ph type="title"/>
+          </p:nvPr>
+        </p:nvSpPr>
+        <p:spPr/>
+        <p:txBody>
+          <a:bodyPr/>
+          <a:lstStyle/>
+          <a:p>
+            <a:endParaRPr lang="en-US"/>
+          </a:p>
+        </p:txBody>
+      </p:sp>
+      <p:sp>
+        <p:nvSpPr>
+          <p:cNvPr id="3" name="Content Placeholder 2">
+            <a:extLst>
+              <a:ext uri="{FF2B5EF4-FFF2-40B4-BE49-F238E27FC236}">
+                <a16:creationId xmlns:a16="http://schemas.microsoft.com/office/drawing/2014/main" id="{21CCFFA0-7A5C-4701-B44C-41881F791A60}"/>
+              </a:ext>
+            </a:extLst>
+          </p:cNvPr>
+          <p:cNvSpPr>
+            <a:spLocks noGrp="1"/>
+          </p:cNvSpPr>
+          <p:nvPr>
+            <p:ph idx="1"/>
+          </p:nvPr>
+        </p:nvSpPr>
+        <p:spPr/>
+        <p:txBody>
+          <a:bodyPr/>
+          <a:lstStyle/>
+          <a:p>
+            <a:endParaRPr lang="en-US"/>
+          </a:p>
+        </p:txBody>
+      </p:sp>
+      <p:sp>
+        <p:nvSpPr>
+          <p:cNvPr id="4" name="Rectangle: Rounded Corners 3">
+            <a:extLst>
+              <a:ext uri="{FF2B5EF4-FFF2-40B4-BE49-F238E27FC236}">
+                <a16:creationId xmlns:a16="http://schemas.microsoft.com/office/drawing/2014/main" id="{E442DCD7-FFA6-4F0D-9386-7A7F1E5660C6}"/>
+              </a:ext>
+            </a:extLst>
+          </p:cNvPr>
+          <p:cNvSpPr/>
+          <p:nvPr/>
+        </p:nvSpPr>
+        <p:spPr>
+          <a:xfrm>
+            <a:off x="0" y="-393405"/>
+            <a:ext cx="1655545" cy="287079"/>
+          </a:xfrm>
+          <a:prstGeom prst="roundRect">
+            <a:avLst/>
+          </a:prstGeom>
+          <a:noFill/>
+          <a:ln>
+            <a:noFill/>
+          </a:ln>
+        </p:spPr>
+        <p:style>
+          <a:lnRef idx="2">
+            <a:schemeClr val="accent1">
+              <a:shade val="50000"/>
+            </a:schemeClr>
+          </a:lnRef>
+          <a:fillRef idx="1">
+            <a:schemeClr val="accent1"/>
+          </a:fillRef>
+          <a:effectRef idx="0">
+            <a:schemeClr val="accent1"/>
+          </a:effectRef>
+          <a:fontRef idx="minor">
+            <a:schemeClr val="lt1"/>
+          </a:fontRef>
+        </p:style>
+        <p:txBody>
+          <a:bodyPr rtlCol="0" anchor="ctr"/>
+          <a:lstStyle/>
+          <a:p>
+            <a:pPr algn="ctr"/>
+            <a:r>
+              <a:rPr lang="en-US" dirty="0">
+                <a:solidFill>
+                  <a:schemeClr val="tx1"/>
+                </a:solidFill>
+              </a:rPr>
+              <a:t>charts.png</a:t>
+            </a:r>
+          </a:p>
+        </p:txBody>
+      </p:sp>
+    </p:spTree>
+    <p:extLst>
+      <p:ext uri="{BB962C8B-B14F-4D97-AF65-F5344CB8AC3E}">
+        <p14:creationId xmlns:p14="http://schemas.microsoft.com/office/powerpoint/2010/main" val="2119405869"/>
+      </p:ext>
+    </p:extLst>
+  </p:cSld>
+  <p:clrMapOvr>
+    <a:masterClrMapping/>
+  </p:clrMapOvr>
+</p:sld>
+</file>
+
+<file path=ppt/slides/slide11.xml><?xml version="1.0" encoding="utf-8"?>
+<p:sld xmlns:a="http://schemas.openxmlformats.org/drawingml/2006/main" xmlns:r="http://schemas.openxmlformats.org/officeDocument/2006/relationships" xmlns:p="http://schemas.openxmlformats.org/presentationml/2006/main">
+  <p:cSld>
+    <p:spTree>
+      <p:nvGrpSpPr>
+        <p:cNvPr id="1" name=""/>
+        <p:cNvGrpSpPr/>
+        <p:nvPr/>
+      </p:nvGrpSpPr>
+      <p:grpSpPr>
+        <a:xfrm>
+          <a:off x="0" y="0"/>
+          <a:ext cx="0" cy="0"/>
+          <a:chOff x="0" y="0"/>
+          <a:chExt cx="0" cy="0"/>
+        </a:xfrm>
+      </p:grpSpPr>
+      <p:pic>
+        <p:nvPicPr>
+          <p:cNvPr id="4" name="Picture 3">
+            <a:extLst>
+              <a:ext uri="{FF2B5EF4-FFF2-40B4-BE49-F238E27FC236}">
+                <a16:creationId xmlns:a16="http://schemas.microsoft.com/office/drawing/2014/main" id="{88DA5DA5-B2F0-4B59-BA00-FF4C691B5379}"/>
+              </a:ext>
+            </a:extLst>
+          </p:cNvPr>
+          <p:cNvPicPr>
+            <a:picLocks noChangeAspect="1"/>
+          </p:cNvPicPr>
+          <p:nvPr/>
+        </p:nvPicPr>
+        <p:blipFill>
+          <a:blip r:embed="rId2"/>
+          <a:stretch>
+            <a:fillRect/>
+          </a:stretch>
+        </p:blipFill>
+        <p:spPr>
+          <a:xfrm>
+            <a:off x="2461331" y="1239245"/>
+            <a:ext cx="7783046" cy="5078152"/>
+          </a:xfrm>
+          <a:prstGeom prst="rect">
+            <a:avLst/>
+          </a:prstGeom>
+          <a:ln>
+            <a:solidFill>
+              <a:schemeClr val="tx1"/>
+            </a:solidFill>
+          </a:ln>
+          <a:effectLst>
+            <a:outerShdw blurRad="50800" dist="38100" dir="2700000" algn="tl" rotWithShape="0">
+              <a:prstClr val="black">
+                <a:alpha val="40000"/>
+              </a:prstClr>
+            </a:outerShdw>
+          </a:effectLst>
+        </p:spPr>
+      </p:pic>
+      <p:cxnSp>
+        <p:nvCxnSpPr>
+          <p:cNvPr id="6" name="Straight Arrow Connector 5">
+            <a:extLst>
+              <a:ext uri="{FF2B5EF4-FFF2-40B4-BE49-F238E27FC236}">
+                <a16:creationId xmlns:a16="http://schemas.microsoft.com/office/drawing/2014/main" id="{10AE1F7E-503D-41D5-8391-B5F7AF1627ED}"/>
+              </a:ext>
+            </a:extLst>
+          </p:cNvPr>
+          <p:cNvCxnSpPr>
+            <a:cxnSpLocks/>
+            <a:stCxn id="9" idx="3"/>
+          </p:cNvCxnSpPr>
+          <p:nvPr/>
+        </p:nvCxnSpPr>
+        <p:spPr>
+          <a:xfrm>
+            <a:off x="1931542" y="1767155"/>
+            <a:ext cx="627360" cy="0"/>
+          </a:xfrm>
+          <a:prstGeom prst="straightConnector1">
+            <a:avLst/>
+          </a:prstGeom>
+          <a:ln w="28575">
+            <a:solidFill>
+              <a:srgbClr val="FF0000"/>
+            </a:solidFill>
+            <a:tailEnd type="triangle" w="lg" len="lg"/>
+          </a:ln>
+        </p:spPr>
+        <p:style>
+          <a:lnRef idx="1">
+            <a:schemeClr val="accent1"/>
+          </a:lnRef>
+          <a:fillRef idx="0">
+            <a:schemeClr val="accent1"/>
+          </a:fillRef>
+          <a:effectRef idx="0">
+            <a:schemeClr val="accent1"/>
+          </a:effectRef>
+          <a:fontRef idx="minor">
+            <a:schemeClr val="tx1"/>
+          </a:fontRef>
+        </p:style>
+      </p:cxnSp>
+      <p:sp>
+        <p:nvSpPr>
+          <p:cNvPr id="9" name="Rectangle: Rounded Corners 8">
+            <a:extLst>
+              <a:ext uri="{FF2B5EF4-FFF2-40B4-BE49-F238E27FC236}">
+                <a16:creationId xmlns:a16="http://schemas.microsoft.com/office/drawing/2014/main" id="{72E53B3B-989E-4326-BCAE-9B4097FCD79A}"/>
+              </a:ext>
+            </a:extLst>
+          </p:cNvPr>
+          <p:cNvSpPr/>
+          <p:nvPr/>
+        </p:nvSpPr>
+        <p:spPr>
+          <a:xfrm>
+            <a:off x="308225" y="1489753"/>
+            <a:ext cx="1623317" cy="554804"/>
+          </a:xfrm>
+          <a:prstGeom prst="roundRect">
+            <a:avLst/>
+          </a:prstGeom>
+        </p:spPr>
+        <p:style>
+          <a:lnRef idx="2">
+            <a:schemeClr val="accent1">
+              <a:shade val="50000"/>
+            </a:schemeClr>
+          </a:lnRef>
+          <a:fillRef idx="1">
+            <a:schemeClr val="accent1"/>
+          </a:fillRef>
+          <a:effectRef idx="0">
+            <a:schemeClr val="accent1"/>
+          </a:effectRef>
+          <a:fontRef idx="minor">
+            <a:schemeClr val="lt1"/>
+          </a:fontRef>
+        </p:style>
+        <p:txBody>
+          <a:bodyPr rtlCol="0" anchor="ctr"/>
+          <a:lstStyle/>
+          <a:p>
+            <a:pPr algn="ctr"/>
+            <a:r>
+              <a:rPr lang="en-US" dirty="0"/>
+              <a:t>Year Scrollbar</a:t>
+            </a:r>
+          </a:p>
+        </p:txBody>
+      </p:sp>
+      <p:cxnSp>
+        <p:nvCxnSpPr>
+          <p:cNvPr id="12" name="Straight Arrow Connector 11">
+            <a:extLst>
+              <a:ext uri="{FF2B5EF4-FFF2-40B4-BE49-F238E27FC236}">
+                <a16:creationId xmlns:a16="http://schemas.microsoft.com/office/drawing/2014/main" id="{A57900FB-7C65-4F45-8D0A-4F513B1AFD17}"/>
+              </a:ext>
+            </a:extLst>
+          </p:cNvPr>
+          <p:cNvCxnSpPr>
+            <a:cxnSpLocks/>
+            <a:stCxn id="45" idx="2"/>
+          </p:cNvCxnSpPr>
+          <p:nvPr/>
+        </p:nvCxnSpPr>
+        <p:spPr>
+          <a:xfrm>
+            <a:off x="7147390" y="1072945"/>
+            <a:ext cx="0" cy="612420"/>
+          </a:xfrm>
+          <a:prstGeom prst="straightConnector1">
+            <a:avLst/>
+          </a:prstGeom>
+          <a:ln w="28575">
+            <a:solidFill>
+              <a:srgbClr val="FF0000"/>
+            </a:solidFill>
+            <a:tailEnd type="triangle" w="lg" len="lg"/>
+          </a:ln>
+        </p:spPr>
+        <p:style>
+          <a:lnRef idx="1">
+            <a:schemeClr val="accent1"/>
+          </a:lnRef>
+          <a:fillRef idx="0">
+            <a:schemeClr val="accent1"/>
+          </a:fillRef>
+          <a:effectRef idx="0">
+            <a:schemeClr val="accent1"/>
+          </a:effectRef>
+          <a:fontRef idx="minor">
+            <a:schemeClr val="tx1"/>
+          </a:fontRef>
+        </p:style>
+      </p:cxnSp>
+      <p:sp>
+        <p:nvSpPr>
+          <p:cNvPr id="17" name="Rectangle: Rounded Corners 16">
+            <a:extLst>
+              <a:ext uri="{FF2B5EF4-FFF2-40B4-BE49-F238E27FC236}">
+                <a16:creationId xmlns:a16="http://schemas.microsoft.com/office/drawing/2014/main" id="{E6EB62C3-CC47-4CED-A112-2CC694A590A3}"/>
+              </a:ext>
+            </a:extLst>
+          </p:cNvPr>
+          <p:cNvSpPr/>
+          <p:nvPr/>
+        </p:nvSpPr>
+        <p:spPr>
+          <a:xfrm>
+            <a:off x="462337" y="3429000"/>
+            <a:ext cx="1469205" cy="716623"/>
+          </a:xfrm>
+          <a:prstGeom prst="roundRect">
+            <a:avLst/>
+          </a:prstGeom>
+        </p:spPr>
+        <p:style>
+          <a:lnRef idx="2">
+            <a:schemeClr val="accent1">
+              <a:shade val="50000"/>
+            </a:schemeClr>
+          </a:lnRef>
+          <a:fillRef idx="1">
+            <a:schemeClr val="accent1"/>
+          </a:fillRef>
+          <a:effectRef idx="0">
+            <a:schemeClr val="accent1"/>
+          </a:effectRef>
+          <a:fontRef idx="minor">
+            <a:schemeClr val="lt1"/>
+          </a:fontRef>
+        </p:style>
+        <p:txBody>
+          <a:bodyPr rtlCol="0" anchor="ctr"/>
+          <a:lstStyle/>
+          <a:p>
+            <a:pPr algn="ctr"/>
+            <a:r>
+              <a:rPr lang="en-US" dirty="0"/>
+              <a:t>Different Parameters</a:t>
+            </a:r>
+          </a:p>
+        </p:txBody>
+      </p:sp>
+      <p:cxnSp>
+        <p:nvCxnSpPr>
+          <p:cNvPr id="23" name="Straight Arrow Connector 22">
+            <a:extLst>
+              <a:ext uri="{FF2B5EF4-FFF2-40B4-BE49-F238E27FC236}">
+                <a16:creationId xmlns:a16="http://schemas.microsoft.com/office/drawing/2014/main" id="{CB05C834-7311-4BC7-A22C-7D93853C98A3}"/>
+              </a:ext>
+            </a:extLst>
+          </p:cNvPr>
+          <p:cNvCxnSpPr>
+            <a:cxnSpLocks/>
+            <a:stCxn id="17" idx="3"/>
+          </p:cNvCxnSpPr>
+          <p:nvPr/>
+        </p:nvCxnSpPr>
+        <p:spPr>
+          <a:xfrm flipV="1">
+            <a:off x="1931542" y="3070688"/>
+            <a:ext cx="732990" cy="716624"/>
+          </a:xfrm>
+          <a:prstGeom prst="straightConnector1">
+            <a:avLst/>
+          </a:prstGeom>
+          <a:ln w="28575">
+            <a:solidFill>
+              <a:srgbClr val="FF0000"/>
+            </a:solidFill>
+            <a:tailEnd type="triangle" w="lg" len="lg"/>
+          </a:ln>
+        </p:spPr>
+        <p:style>
+          <a:lnRef idx="1">
+            <a:schemeClr val="accent1"/>
+          </a:lnRef>
+          <a:fillRef idx="0">
+            <a:schemeClr val="accent1"/>
+          </a:fillRef>
+          <a:effectRef idx="0">
+            <a:schemeClr val="accent1"/>
+          </a:effectRef>
+          <a:fontRef idx="minor">
+            <a:schemeClr val="tx1"/>
+          </a:fontRef>
+        </p:style>
+      </p:cxnSp>
+      <p:cxnSp>
+        <p:nvCxnSpPr>
+          <p:cNvPr id="26" name="Straight Arrow Connector 25">
+            <a:extLst>
+              <a:ext uri="{FF2B5EF4-FFF2-40B4-BE49-F238E27FC236}">
+                <a16:creationId xmlns:a16="http://schemas.microsoft.com/office/drawing/2014/main" id="{0D854972-A0BC-4C72-9F7F-04A28AC1E1E1}"/>
+              </a:ext>
+            </a:extLst>
+          </p:cNvPr>
+          <p:cNvCxnSpPr>
+            <a:cxnSpLocks/>
+            <a:stCxn id="17" idx="3"/>
+          </p:cNvCxnSpPr>
+          <p:nvPr/>
+        </p:nvCxnSpPr>
+        <p:spPr>
+          <a:xfrm>
+            <a:off x="1931542" y="3787312"/>
+            <a:ext cx="732990" cy="515330"/>
+          </a:xfrm>
+          <a:prstGeom prst="straightConnector1">
+            <a:avLst/>
+          </a:prstGeom>
+          <a:ln w="28575">
+            <a:solidFill>
+              <a:srgbClr val="FF0000"/>
+            </a:solidFill>
+            <a:tailEnd type="triangle" w="lg" len="lg"/>
+          </a:ln>
+        </p:spPr>
+        <p:style>
+          <a:lnRef idx="1">
+            <a:schemeClr val="accent1"/>
+          </a:lnRef>
+          <a:fillRef idx="0">
+            <a:schemeClr val="accent1"/>
+          </a:fillRef>
+          <a:effectRef idx="0">
+            <a:schemeClr val="accent1"/>
+          </a:effectRef>
+          <a:fontRef idx="minor">
+            <a:schemeClr val="tx1"/>
+          </a:fontRef>
+        </p:style>
+      </p:cxnSp>
+      <p:cxnSp>
+        <p:nvCxnSpPr>
+          <p:cNvPr id="35" name="Straight Arrow Connector 34">
+            <a:extLst>
+              <a:ext uri="{FF2B5EF4-FFF2-40B4-BE49-F238E27FC236}">
+                <a16:creationId xmlns:a16="http://schemas.microsoft.com/office/drawing/2014/main" id="{CC49ED38-E758-4024-B70B-9577091C715C}"/>
+              </a:ext>
+            </a:extLst>
+          </p:cNvPr>
+          <p:cNvCxnSpPr>
+            <a:cxnSpLocks/>
+            <a:stCxn id="41" idx="2"/>
+          </p:cNvCxnSpPr>
+          <p:nvPr/>
+        </p:nvCxnSpPr>
+        <p:spPr>
+          <a:xfrm flipH="1">
+            <a:off x="3956424" y="1153855"/>
+            <a:ext cx="1188843" cy="1311439"/>
+          </a:xfrm>
+          <a:prstGeom prst="straightConnector1">
+            <a:avLst/>
+          </a:prstGeom>
+          <a:ln w="28575">
+            <a:solidFill>
+              <a:srgbClr val="FF0000"/>
+            </a:solidFill>
+            <a:tailEnd type="triangle" w="lg" len="lg"/>
+          </a:ln>
+        </p:spPr>
+        <p:style>
+          <a:lnRef idx="1">
+            <a:schemeClr val="accent1"/>
+          </a:lnRef>
+          <a:fillRef idx="0">
+            <a:schemeClr val="accent1"/>
+          </a:fillRef>
+          <a:effectRef idx="0">
+            <a:schemeClr val="accent1"/>
+          </a:effectRef>
+          <a:fontRef idx="minor">
+            <a:schemeClr val="tx1"/>
+          </a:fontRef>
+        </p:style>
+      </p:cxnSp>
+      <p:cxnSp>
+        <p:nvCxnSpPr>
+          <p:cNvPr id="38" name="Straight Arrow Connector 37">
+            <a:extLst>
+              <a:ext uri="{FF2B5EF4-FFF2-40B4-BE49-F238E27FC236}">
+                <a16:creationId xmlns:a16="http://schemas.microsoft.com/office/drawing/2014/main" id="{70AEA71F-871B-4AB6-8EBE-8A36171B66DD}"/>
+              </a:ext>
+            </a:extLst>
+          </p:cNvPr>
+          <p:cNvCxnSpPr>
+            <a:cxnSpLocks/>
+            <a:stCxn id="41" idx="2"/>
+          </p:cNvCxnSpPr>
+          <p:nvPr/>
+        </p:nvCxnSpPr>
+        <p:spPr>
+          <a:xfrm>
+            <a:off x="5145267" y="1153855"/>
+            <a:ext cx="1166492" cy="1311439"/>
+          </a:xfrm>
+          <a:prstGeom prst="straightConnector1">
+            <a:avLst/>
+          </a:prstGeom>
+          <a:ln w="28575">
+            <a:solidFill>
+              <a:srgbClr val="FF0000"/>
+            </a:solidFill>
+            <a:tailEnd type="triangle" w="lg" len="lg"/>
+          </a:ln>
+        </p:spPr>
+        <p:style>
+          <a:lnRef idx="1">
+            <a:schemeClr val="accent1"/>
+          </a:lnRef>
+          <a:fillRef idx="0">
+            <a:schemeClr val="accent1"/>
+          </a:fillRef>
+          <a:effectRef idx="0">
+            <a:schemeClr val="accent1"/>
+          </a:effectRef>
+          <a:fontRef idx="minor">
+            <a:schemeClr val="tx1"/>
+          </a:fontRef>
+        </p:style>
+      </p:cxnSp>
+      <p:sp>
+        <p:nvSpPr>
+          <p:cNvPr id="41" name="Rectangle: Rounded Corners 40">
+            <a:extLst>
+              <a:ext uri="{FF2B5EF4-FFF2-40B4-BE49-F238E27FC236}">
+                <a16:creationId xmlns:a16="http://schemas.microsoft.com/office/drawing/2014/main" id="{32677CA0-DAF4-4AEA-A1B2-5F625C110971}"/>
+              </a:ext>
+            </a:extLst>
+          </p:cNvPr>
+          <p:cNvSpPr/>
+          <p:nvPr/>
+        </p:nvSpPr>
+        <p:spPr>
+          <a:xfrm>
+            <a:off x="4410664" y="437232"/>
+            <a:ext cx="1469205" cy="716623"/>
+          </a:xfrm>
+          <a:prstGeom prst="roundRect">
+            <a:avLst/>
+          </a:prstGeom>
+        </p:spPr>
+        <p:style>
+          <a:lnRef idx="2">
+            <a:schemeClr val="accent1">
+              <a:shade val="50000"/>
+            </a:schemeClr>
+          </a:lnRef>
+          <a:fillRef idx="1">
+            <a:schemeClr val="accent1"/>
+          </a:fillRef>
+          <a:effectRef idx="0">
+            <a:schemeClr val="accent1"/>
+          </a:effectRef>
+          <a:fontRef idx="minor">
+            <a:schemeClr val="lt1"/>
+          </a:fontRef>
+        </p:style>
+        <p:txBody>
+          <a:bodyPr rtlCol="0" anchor="ctr"/>
+          <a:lstStyle/>
+          <a:p>
+            <a:pPr algn="ctr"/>
+            <a:r>
+              <a:rPr lang="en-US" dirty="0"/>
+              <a:t>Different Scenarios</a:t>
+            </a:r>
+          </a:p>
+        </p:txBody>
+      </p:sp>
+      <p:sp>
+        <p:nvSpPr>
+          <p:cNvPr id="45" name="Rectangle: Rounded Corners 44">
+            <a:extLst>
+              <a:ext uri="{FF2B5EF4-FFF2-40B4-BE49-F238E27FC236}">
+                <a16:creationId xmlns:a16="http://schemas.microsoft.com/office/drawing/2014/main" id="{20CDA801-AEF5-48FF-BB62-2872F4E93656}"/>
+              </a:ext>
+            </a:extLst>
+          </p:cNvPr>
+          <p:cNvSpPr/>
+          <p:nvPr/>
+        </p:nvSpPr>
+        <p:spPr>
+          <a:xfrm>
+            <a:off x="6412787" y="518141"/>
+            <a:ext cx="1469206" cy="554804"/>
+          </a:xfrm>
+          <a:prstGeom prst="roundRect">
+            <a:avLst/>
+          </a:prstGeom>
+        </p:spPr>
+        <p:style>
+          <a:lnRef idx="2">
+            <a:schemeClr val="accent1">
+              <a:shade val="50000"/>
+            </a:schemeClr>
+          </a:lnRef>
+          <a:fillRef idx="1">
+            <a:schemeClr val="accent1"/>
+          </a:fillRef>
+          <a:effectRef idx="0">
+            <a:schemeClr val="accent1"/>
+          </a:effectRef>
+          <a:fontRef idx="minor">
+            <a:schemeClr val="lt1"/>
+          </a:fontRef>
+        </p:style>
+        <p:txBody>
+          <a:bodyPr rtlCol="0" anchor="ctr"/>
+          <a:lstStyle/>
+          <a:p>
+            <a:pPr algn="ctr"/>
+            <a:r>
+              <a:rPr lang="en-US" dirty="0"/>
+              <a:t>Legend Type</a:t>
+            </a:r>
+          </a:p>
+        </p:txBody>
+      </p:sp>
+      <p:sp>
+        <p:nvSpPr>
+          <p:cNvPr id="48" name="Rectangle: Rounded Corners 47">
+            <a:extLst>
+              <a:ext uri="{FF2B5EF4-FFF2-40B4-BE49-F238E27FC236}">
+                <a16:creationId xmlns:a16="http://schemas.microsoft.com/office/drawing/2014/main" id="{EDCEA179-1C97-401C-BFD2-7EED79F91F9A}"/>
+              </a:ext>
+            </a:extLst>
+          </p:cNvPr>
+          <p:cNvSpPr/>
+          <p:nvPr/>
+        </p:nvSpPr>
+        <p:spPr>
+          <a:xfrm>
+            <a:off x="0" y="-393405"/>
+            <a:ext cx="1655545" cy="287079"/>
+          </a:xfrm>
+          <a:prstGeom prst="roundRect">
+            <a:avLst/>
+          </a:prstGeom>
+          <a:noFill/>
+          <a:ln>
+            <a:noFill/>
+          </a:ln>
+        </p:spPr>
+        <p:style>
+          <a:lnRef idx="2">
+            <a:schemeClr val="accent1">
+              <a:shade val="50000"/>
+            </a:schemeClr>
+          </a:lnRef>
+          <a:fillRef idx="1">
+            <a:schemeClr val="accent1"/>
+          </a:fillRef>
+          <a:effectRef idx="0">
+            <a:schemeClr val="accent1"/>
+          </a:effectRef>
+          <a:fontRef idx="minor">
+            <a:schemeClr val="lt1"/>
+          </a:fontRef>
+        </p:style>
+        <p:txBody>
+          <a:bodyPr rtlCol="0" anchor="ctr"/>
+          <a:lstStyle/>
+          <a:p>
+            <a:pPr algn="ctr"/>
+            <a:r>
+              <a:rPr lang="en-US" dirty="0">
+                <a:solidFill>
+                  <a:schemeClr val="tx1"/>
+                </a:solidFill>
+              </a:rPr>
+              <a:t>maps.png</a:t>
+            </a:r>
+          </a:p>
+        </p:txBody>
+      </p:sp>
+      <p:cxnSp>
+        <p:nvCxnSpPr>
+          <p:cNvPr id="50" name="Straight Arrow Connector 49">
+            <a:extLst>
+              <a:ext uri="{FF2B5EF4-FFF2-40B4-BE49-F238E27FC236}">
+                <a16:creationId xmlns:a16="http://schemas.microsoft.com/office/drawing/2014/main" id="{5771E6AA-72EC-4EEC-8FFE-0C2DB0F47CCB}"/>
+              </a:ext>
+            </a:extLst>
+          </p:cNvPr>
+          <p:cNvCxnSpPr>
+            <a:cxnSpLocks/>
+            <a:stCxn id="54" idx="1"/>
+          </p:cNvCxnSpPr>
+          <p:nvPr/>
+        </p:nvCxnSpPr>
+        <p:spPr>
+          <a:xfrm flipH="1">
+            <a:off x="9937898" y="1762795"/>
+            <a:ext cx="527180" cy="4360"/>
+          </a:xfrm>
+          <a:prstGeom prst="straightConnector1">
+            <a:avLst/>
+          </a:prstGeom>
+          <a:ln w="28575">
+            <a:solidFill>
+              <a:srgbClr val="FF0000"/>
+            </a:solidFill>
+            <a:tailEnd type="triangle" w="lg" len="lg"/>
+          </a:ln>
+        </p:spPr>
+        <p:style>
+          <a:lnRef idx="1">
+            <a:schemeClr val="accent1"/>
+          </a:lnRef>
+          <a:fillRef idx="0">
+            <a:schemeClr val="accent1"/>
+          </a:fillRef>
+          <a:effectRef idx="0">
+            <a:schemeClr val="accent1"/>
+          </a:effectRef>
+          <a:fontRef idx="minor">
+            <a:schemeClr val="tx1"/>
+          </a:fontRef>
+        </p:style>
+      </p:cxnSp>
+      <p:sp>
+        <p:nvSpPr>
+          <p:cNvPr id="54" name="Rectangle: Rounded Corners 53">
+            <a:extLst>
+              <a:ext uri="{FF2B5EF4-FFF2-40B4-BE49-F238E27FC236}">
+                <a16:creationId xmlns:a16="http://schemas.microsoft.com/office/drawing/2014/main" id="{661DACE8-2A6A-4820-B5A4-35FCF372909A}"/>
+              </a:ext>
+            </a:extLst>
+          </p:cNvPr>
+          <p:cNvSpPr/>
+          <p:nvPr/>
+        </p:nvSpPr>
+        <p:spPr>
+          <a:xfrm>
+            <a:off x="10465078" y="1401019"/>
+            <a:ext cx="1469206" cy="723551"/>
+          </a:xfrm>
+          <a:prstGeom prst="roundRect">
+            <a:avLst/>
+          </a:prstGeom>
+        </p:spPr>
+        <p:style>
+          <a:lnRef idx="2">
+            <a:schemeClr val="accent1">
+              <a:shade val="50000"/>
+            </a:schemeClr>
+          </a:lnRef>
+          <a:fillRef idx="1">
+            <a:schemeClr val="accent1"/>
+          </a:fillRef>
+          <a:effectRef idx="0">
+            <a:schemeClr val="accent1"/>
+          </a:effectRef>
+          <a:fontRef idx="minor">
+            <a:schemeClr val="lt1"/>
+          </a:fontRef>
+        </p:style>
+        <p:txBody>
+          <a:bodyPr rtlCol="0" anchor="ctr"/>
+          <a:lstStyle/>
+          <a:p>
+            <a:pPr algn="ctr"/>
+            <a:r>
+              <a:rPr lang="en-US" dirty="0"/>
+              <a:t>Download Page</a:t>
+            </a:r>
+          </a:p>
+        </p:txBody>
+      </p:sp>
+    </p:spTree>
+    <p:extLst>
+      <p:ext uri="{BB962C8B-B14F-4D97-AF65-F5344CB8AC3E}">
+        <p14:creationId xmlns:p14="http://schemas.microsoft.com/office/powerpoint/2010/main" val="3939578071"/>
+      </p:ext>
+    </p:extLst>
+  </p:cSld>
+  <p:clrMapOvr>
+    <a:masterClrMapping/>
+  </p:clrMapOvr>
+</p:sld>
+</file>
+
+<file path=ppt/slides/slide2.xml><?xml version="1.0" encoding="utf-8"?>
+<p:sld xmlns:a="http://schemas.openxmlformats.org/drawingml/2006/main" xmlns:r="http://schemas.openxmlformats.org/officeDocument/2006/relationships" xmlns:p="http://schemas.openxmlformats.org/presentationml/2006/main">
+  <p:cSld>
+    <p:spTree>
+      <p:nvGrpSpPr>
+        <p:cNvPr id="1" name=""/>
+        <p:cNvGrpSpPr/>
+        <p:nvPr/>
+      </p:nvGrpSpPr>
+      <p:grpSpPr>
+        <a:xfrm>
+          <a:off x="0" y="0"/>
+          <a:ext cx="0" cy="0"/>
+          <a:chOff x="0" y="0"/>
+          <a:chExt cx="0" cy="0"/>
+        </a:xfrm>
+      </p:grpSpPr>
+      <p:pic>
+        <p:nvPicPr>
+          <p:cNvPr id="5" name="Picture 4">
+            <a:extLst>
+              <a:ext uri="{FF2B5EF4-FFF2-40B4-BE49-F238E27FC236}">
+                <a16:creationId xmlns:a16="http://schemas.microsoft.com/office/drawing/2014/main" id="{AE9394F5-6208-4BBE-8382-280A12D73ACA}"/>
+              </a:ext>
+            </a:extLst>
+          </p:cNvPr>
+          <p:cNvPicPr>
+            <a:picLocks noChangeAspect="1"/>
+          </p:cNvPicPr>
+          <p:nvPr/>
+        </p:nvPicPr>
+        <p:blipFill>
+          <a:blip r:embed="rId2"/>
+          <a:stretch>
+            <a:fillRect/>
+          </a:stretch>
+        </p:blipFill>
+        <p:spPr>
+          <a:xfrm>
+            <a:off x="4248631" y="1039805"/>
+            <a:ext cx="3694737" cy="4778389"/>
+          </a:xfrm>
+          <a:prstGeom prst="rect">
+            <a:avLst/>
+          </a:prstGeom>
+          <a:ln>
+            <a:solidFill>
+              <a:schemeClr val="tx1"/>
+            </a:solidFill>
+          </a:ln>
+          <a:effectLst>
+            <a:outerShdw blurRad="50800" dist="38100" dir="2700000" algn="tl" rotWithShape="0">
+              <a:prstClr val="black">
+                <a:alpha val="40000"/>
+              </a:prstClr>
+            </a:outerShdw>
+          </a:effectLst>
+        </p:spPr>
+      </p:pic>
+      <p:pic>
+        <p:nvPicPr>
+          <p:cNvPr id="9" name="Picture 8">
+            <a:extLst>
+              <a:ext uri="{FF2B5EF4-FFF2-40B4-BE49-F238E27FC236}">
+                <a16:creationId xmlns:a16="http://schemas.microsoft.com/office/drawing/2014/main" id="{DF77155E-21C5-4A10-B3CD-BAB635F98244}"/>
+              </a:ext>
+            </a:extLst>
+          </p:cNvPr>
+          <p:cNvPicPr>
+            <a:picLocks noChangeAspect="1"/>
+          </p:cNvPicPr>
+          <p:nvPr/>
+        </p:nvPicPr>
+        <p:blipFill>
+          <a:blip r:embed="rId3"/>
+          <a:stretch>
+            <a:fillRect/>
+          </a:stretch>
+        </p:blipFill>
+        <p:spPr>
+          <a:xfrm>
+            <a:off x="467447" y="1649704"/>
+            <a:ext cx="3067319" cy="2958696"/>
+          </a:xfrm>
+          <a:prstGeom prst="rect">
+            <a:avLst/>
+          </a:prstGeom>
+          <a:ln>
+            <a:solidFill>
+              <a:schemeClr val="tx1"/>
+            </a:solidFill>
+          </a:ln>
+          <a:effectLst>
+            <a:outerShdw blurRad="50800" dist="38100" dir="2700000" algn="tl" rotWithShape="0">
+              <a:prstClr val="black">
+                <a:alpha val="40000"/>
+              </a:prstClr>
+            </a:outerShdw>
+          </a:effectLst>
+        </p:spPr>
+      </p:pic>
+      <p:pic>
+        <p:nvPicPr>
+          <p:cNvPr id="10" name="Picture 9">
+            <a:extLst>
+              <a:ext uri="{FF2B5EF4-FFF2-40B4-BE49-F238E27FC236}">
+                <a16:creationId xmlns:a16="http://schemas.microsoft.com/office/drawing/2014/main" id="{972A1A53-77CD-4B49-9CDD-2CC76FB5420D}"/>
+              </a:ext>
+            </a:extLst>
+          </p:cNvPr>
+          <p:cNvPicPr>
+            <a:picLocks noChangeAspect="1"/>
+          </p:cNvPicPr>
+          <p:nvPr/>
+        </p:nvPicPr>
+        <p:blipFill>
+          <a:blip r:embed="rId4"/>
+          <a:stretch>
+            <a:fillRect/>
+          </a:stretch>
+        </p:blipFill>
+        <p:spPr>
+          <a:xfrm>
+            <a:off x="8657233" y="1039805"/>
+            <a:ext cx="2790825" cy="2019300"/>
+          </a:xfrm>
+          <a:prstGeom prst="rect">
+            <a:avLst/>
+          </a:prstGeom>
+          <a:ln>
+            <a:solidFill>
+              <a:schemeClr val="tx1"/>
+            </a:solidFill>
+          </a:ln>
+          <a:effectLst>
+            <a:outerShdw blurRad="50800" dist="38100" dir="2700000" algn="tl" rotWithShape="0">
+              <a:prstClr val="black">
+                <a:alpha val="40000"/>
+              </a:prstClr>
+            </a:outerShdw>
+          </a:effectLst>
+        </p:spPr>
+      </p:pic>
+      <p:pic>
+        <p:nvPicPr>
+          <p:cNvPr id="11" name="Picture 10">
+            <a:extLst>
+              <a:ext uri="{FF2B5EF4-FFF2-40B4-BE49-F238E27FC236}">
+                <a16:creationId xmlns:a16="http://schemas.microsoft.com/office/drawing/2014/main" id="{5FC86AAA-93BC-4FC3-AF54-5DC797F9D210}"/>
+              </a:ext>
+            </a:extLst>
+          </p:cNvPr>
+          <p:cNvPicPr>
+            <a:picLocks noChangeAspect="1"/>
+          </p:cNvPicPr>
+          <p:nvPr/>
+        </p:nvPicPr>
+        <p:blipFill>
+          <a:blip r:embed="rId5"/>
+          <a:stretch>
+            <a:fillRect/>
+          </a:stretch>
+        </p:blipFill>
+        <p:spPr>
+          <a:xfrm>
+            <a:off x="8685808" y="3954690"/>
+            <a:ext cx="2762250" cy="1857375"/>
+          </a:xfrm>
+          <a:prstGeom prst="rect">
+            <a:avLst/>
+          </a:prstGeom>
+          <a:ln>
+            <a:solidFill>
+              <a:schemeClr val="tx1"/>
+            </a:solidFill>
+          </a:ln>
+          <a:effectLst>
+            <a:outerShdw blurRad="50800" dist="38100" dir="2700000" algn="tl" rotWithShape="0">
+              <a:prstClr val="black">
+                <a:alpha val="40000"/>
+              </a:prstClr>
+            </a:outerShdw>
+          </a:effectLst>
+        </p:spPr>
+      </p:pic>
+      <p:cxnSp>
+        <p:nvCxnSpPr>
+          <p:cNvPr id="16" name="Straight Arrow Connector 15">
+            <a:extLst>
+              <a:ext uri="{FF2B5EF4-FFF2-40B4-BE49-F238E27FC236}">
+                <a16:creationId xmlns:a16="http://schemas.microsoft.com/office/drawing/2014/main" id="{4E9797F6-4440-469F-A47E-69ACC0B922F6}"/>
+              </a:ext>
+            </a:extLst>
+          </p:cNvPr>
+          <p:cNvCxnSpPr>
+            <a:cxnSpLocks/>
+            <a:stCxn id="27" idx="3"/>
+            <a:endCxn id="10" idx="1"/>
+          </p:cNvCxnSpPr>
+          <p:nvPr/>
+        </p:nvCxnSpPr>
+        <p:spPr>
+          <a:xfrm flipV="1">
+            <a:off x="4935770" y="2049455"/>
+            <a:ext cx="3721463" cy="502546"/>
+          </a:xfrm>
+          <a:prstGeom prst="straightConnector1">
+            <a:avLst/>
+          </a:prstGeom>
+          <a:ln w="38100">
+            <a:solidFill>
+              <a:srgbClr val="FF0000"/>
+            </a:solidFill>
+            <a:tailEnd type="triangle" w="lg" len="lg"/>
+          </a:ln>
+        </p:spPr>
+        <p:style>
+          <a:lnRef idx="1">
+            <a:schemeClr val="accent1"/>
+          </a:lnRef>
+          <a:fillRef idx="0">
+            <a:schemeClr val="accent1"/>
+          </a:fillRef>
+          <a:effectRef idx="0">
+            <a:schemeClr val="accent1"/>
+          </a:effectRef>
+          <a:fontRef idx="minor">
+            <a:schemeClr val="tx1"/>
+          </a:fontRef>
+        </p:style>
+      </p:cxnSp>
+      <p:cxnSp>
+        <p:nvCxnSpPr>
+          <p:cNvPr id="21" name="Straight Arrow Connector 20">
+            <a:extLst>
+              <a:ext uri="{FF2B5EF4-FFF2-40B4-BE49-F238E27FC236}">
+                <a16:creationId xmlns:a16="http://schemas.microsoft.com/office/drawing/2014/main" id="{5296BAE1-3797-40F1-81DC-52C988E6C29F}"/>
+              </a:ext>
+            </a:extLst>
+          </p:cNvPr>
+          <p:cNvCxnSpPr>
+            <a:cxnSpLocks/>
+            <a:stCxn id="29" idx="3"/>
+            <a:endCxn id="11" idx="1"/>
+          </p:cNvCxnSpPr>
+          <p:nvPr/>
+        </p:nvCxnSpPr>
+        <p:spPr>
+          <a:xfrm>
+            <a:off x="4935770" y="2837536"/>
+            <a:ext cx="3750038" cy="2045842"/>
+          </a:xfrm>
+          <a:prstGeom prst="straightConnector1">
+            <a:avLst/>
+          </a:prstGeom>
+          <a:ln w="38100">
+            <a:solidFill>
+              <a:srgbClr val="FF0000"/>
+            </a:solidFill>
+            <a:tailEnd type="triangle" w="lg" len="lg"/>
+          </a:ln>
+        </p:spPr>
+        <p:style>
+          <a:lnRef idx="1">
+            <a:schemeClr val="accent1"/>
+          </a:lnRef>
+          <a:fillRef idx="0">
+            <a:schemeClr val="accent1"/>
+          </a:fillRef>
+          <a:effectRef idx="0">
+            <a:schemeClr val="accent1"/>
+          </a:effectRef>
+          <a:fontRef idx="minor">
+            <a:schemeClr val="tx1"/>
+          </a:fontRef>
+        </p:style>
+      </p:cxnSp>
+      <p:cxnSp>
+        <p:nvCxnSpPr>
+          <p:cNvPr id="24" name="Straight Arrow Connector 23">
+            <a:extLst>
+              <a:ext uri="{FF2B5EF4-FFF2-40B4-BE49-F238E27FC236}">
+                <a16:creationId xmlns:a16="http://schemas.microsoft.com/office/drawing/2014/main" id="{666A0218-5345-4AC0-8AF5-4143FB78EDB3}"/>
+              </a:ext>
+            </a:extLst>
+          </p:cNvPr>
+          <p:cNvCxnSpPr>
+            <a:cxnSpLocks/>
+            <a:stCxn id="30" idx="1"/>
+            <a:endCxn id="9" idx="3"/>
+          </p:cNvCxnSpPr>
+          <p:nvPr/>
+        </p:nvCxnSpPr>
+        <p:spPr>
+          <a:xfrm flipH="1">
+            <a:off x="3534766" y="3129052"/>
+            <a:ext cx="1041300" cy="0"/>
+          </a:xfrm>
+          <a:prstGeom prst="straightConnector1">
+            <a:avLst/>
+          </a:prstGeom>
+          <a:ln w="38100">
+            <a:solidFill>
+              <a:srgbClr val="FF0000"/>
+            </a:solidFill>
+            <a:tailEnd type="triangle" w="lg" len="lg"/>
+          </a:ln>
+        </p:spPr>
+        <p:style>
+          <a:lnRef idx="1">
+            <a:schemeClr val="accent1"/>
+          </a:lnRef>
+          <a:fillRef idx="0">
+            <a:schemeClr val="accent1"/>
+          </a:fillRef>
+          <a:effectRef idx="0">
+            <a:schemeClr val="accent1"/>
+          </a:effectRef>
+          <a:fontRef idx="minor">
+            <a:schemeClr val="tx1"/>
+          </a:fontRef>
+        </p:style>
+      </p:cxnSp>
+      <p:sp>
+        <p:nvSpPr>
+          <p:cNvPr id="27" name="Rectangle: Rounded Corners 26">
+            <a:extLst>
+              <a:ext uri="{FF2B5EF4-FFF2-40B4-BE49-F238E27FC236}">
+                <a16:creationId xmlns:a16="http://schemas.microsoft.com/office/drawing/2014/main" id="{07C36AB0-49AA-40A2-BDBB-B4D7AE93199C}"/>
+              </a:ext>
+            </a:extLst>
+          </p:cNvPr>
+          <p:cNvSpPr/>
+          <p:nvPr/>
+        </p:nvSpPr>
+        <p:spPr>
+          <a:xfrm>
+            <a:off x="4576174" y="2433848"/>
+            <a:ext cx="359596" cy="236305"/>
+          </a:xfrm>
+          <a:prstGeom prst="roundRect">
+            <a:avLst/>
+          </a:prstGeom>
+          <a:noFill/>
+          <a:ln w="19050">
+            <a:solidFill>
+              <a:srgbClr val="FF0000"/>
+            </a:solidFill>
+          </a:ln>
+        </p:spPr>
+        <p:style>
+          <a:lnRef idx="2">
+            <a:schemeClr val="accent1">
+              <a:shade val="50000"/>
+            </a:schemeClr>
+          </a:lnRef>
+          <a:fillRef idx="1">
+            <a:schemeClr val="accent1"/>
+          </a:fillRef>
+          <a:effectRef idx="0">
+            <a:schemeClr val="accent1"/>
+          </a:effectRef>
+          <a:fontRef idx="minor">
+            <a:schemeClr val="lt1"/>
+          </a:fontRef>
+        </p:style>
+        <p:txBody>
+          <a:bodyPr rtlCol="0" anchor="ctr"/>
+          <a:lstStyle/>
+          <a:p>
+            <a:pPr algn="ctr"/>
+            <a:endParaRPr lang="en-US"/>
+          </a:p>
+        </p:txBody>
+      </p:sp>
+      <p:sp>
+        <p:nvSpPr>
+          <p:cNvPr id="29" name="Rectangle: Rounded Corners 28">
+            <a:extLst>
+              <a:ext uri="{FF2B5EF4-FFF2-40B4-BE49-F238E27FC236}">
+                <a16:creationId xmlns:a16="http://schemas.microsoft.com/office/drawing/2014/main" id="{006BDA69-C12E-4F20-8912-E39592AE1E05}"/>
+              </a:ext>
+            </a:extLst>
+          </p:cNvPr>
+          <p:cNvSpPr/>
+          <p:nvPr/>
+        </p:nvSpPr>
+        <p:spPr>
+          <a:xfrm>
+            <a:off x="4576174" y="2719383"/>
+            <a:ext cx="359596" cy="236305"/>
+          </a:xfrm>
+          <a:prstGeom prst="roundRect">
+            <a:avLst/>
+          </a:prstGeom>
+          <a:noFill/>
+          <a:ln w="19050">
+            <a:solidFill>
+              <a:srgbClr val="FF0000"/>
+            </a:solidFill>
+          </a:ln>
+        </p:spPr>
+        <p:style>
+          <a:lnRef idx="2">
+            <a:schemeClr val="accent1">
+              <a:shade val="50000"/>
+            </a:schemeClr>
+          </a:lnRef>
+          <a:fillRef idx="1">
+            <a:schemeClr val="accent1"/>
+          </a:fillRef>
+          <a:effectRef idx="0">
+            <a:schemeClr val="accent1"/>
+          </a:effectRef>
+          <a:fontRef idx="minor">
+            <a:schemeClr val="lt1"/>
+          </a:fontRef>
+        </p:style>
+        <p:txBody>
+          <a:bodyPr rtlCol="0" anchor="ctr"/>
+          <a:lstStyle/>
+          <a:p>
+            <a:pPr algn="ctr"/>
+            <a:endParaRPr lang="en-US"/>
+          </a:p>
+        </p:txBody>
+      </p:sp>
+      <p:sp>
+        <p:nvSpPr>
+          <p:cNvPr id="30" name="Rectangle: Rounded Corners 29">
+            <a:extLst>
+              <a:ext uri="{FF2B5EF4-FFF2-40B4-BE49-F238E27FC236}">
+                <a16:creationId xmlns:a16="http://schemas.microsoft.com/office/drawing/2014/main" id="{B9590F73-DF2D-4788-8FCB-D485AD5D502E}"/>
+              </a:ext>
+            </a:extLst>
+          </p:cNvPr>
+          <p:cNvSpPr/>
+          <p:nvPr/>
+        </p:nvSpPr>
+        <p:spPr>
+          <a:xfrm>
+            <a:off x="4576066" y="3004919"/>
+            <a:ext cx="489093" cy="248266"/>
+          </a:xfrm>
+          <a:prstGeom prst="roundRect">
+            <a:avLst/>
+          </a:prstGeom>
+          <a:noFill/>
+          <a:ln w="19050">
+            <a:solidFill>
+              <a:srgbClr val="FF0000"/>
+            </a:solidFill>
+          </a:ln>
+        </p:spPr>
+        <p:style>
+          <a:lnRef idx="2">
+            <a:schemeClr val="accent1">
+              <a:shade val="50000"/>
+            </a:schemeClr>
+          </a:lnRef>
+          <a:fillRef idx="1">
+            <a:schemeClr val="accent1"/>
+          </a:fillRef>
+          <a:effectRef idx="0">
+            <a:schemeClr val="accent1"/>
+          </a:effectRef>
+          <a:fontRef idx="minor">
+            <a:schemeClr val="lt1"/>
+          </a:fontRef>
+        </p:style>
+        <p:txBody>
+          <a:bodyPr rtlCol="0" anchor="ctr"/>
+          <a:lstStyle/>
+          <a:p>
+            <a:pPr algn="ctr"/>
+            <a:endParaRPr lang="en-US"/>
+          </a:p>
+        </p:txBody>
+      </p:sp>
+      <p:sp>
+        <p:nvSpPr>
+          <p:cNvPr id="35" name="Rectangle: Rounded Corners 34">
+            <a:extLst>
+              <a:ext uri="{FF2B5EF4-FFF2-40B4-BE49-F238E27FC236}">
+                <a16:creationId xmlns:a16="http://schemas.microsoft.com/office/drawing/2014/main" id="{77AFFB9F-AD7C-4830-9A3A-C0A8169B37E0}"/>
+              </a:ext>
+            </a:extLst>
+          </p:cNvPr>
+          <p:cNvSpPr/>
+          <p:nvPr/>
+        </p:nvSpPr>
+        <p:spPr>
+          <a:xfrm>
+            <a:off x="0" y="-393405"/>
+            <a:ext cx="1655545" cy="287079"/>
+          </a:xfrm>
+          <a:prstGeom prst="roundRect">
+            <a:avLst/>
+          </a:prstGeom>
+          <a:noFill/>
+          <a:ln>
+            <a:noFill/>
+          </a:ln>
+        </p:spPr>
+        <p:style>
+          <a:lnRef idx="2">
+            <a:schemeClr val="accent1">
+              <a:shade val="50000"/>
+            </a:schemeClr>
+          </a:lnRef>
+          <a:fillRef idx="1">
+            <a:schemeClr val="accent1"/>
+          </a:fillRef>
+          <a:effectRef idx="0">
+            <a:schemeClr val="accent1"/>
+          </a:effectRef>
+          <a:fontRef idx="minor">
+            <a:schemeClr val="lt1"/>
+          </a:fontRef>
+        </p:style>
+        <p:txBody>
+          <a:bodyPr rtlCol="0" anchor="ctr"/>
+          <a:lstStyle/>
+          <a:p>
+            <a:pPr algn="ctr"/>
+            <a:r>
+              <a:rPr lang="en-US" dirty="0">
+                <a:solidFill>
+                  <a:schemeClr val="tx1"/>
+                </a:solidFill>
+              </a:rPr>
+              <a:t>input.png</a:t>
+            </a:r>
+          </a:p>
+        </p:txBody>
+      </p:sp>
+    </p:spTree>
+    <p:extLst>
+      <p:ext uri="{BB962C8B-B14F-4D97-AF65-F5344CB8AC3E}">
+        <p14:creationId xmlns:p14="http://schemas.microsoft.com/office/powerpoint/2010/main" val="75352327"/>
+      </p:ext>
+    </p:extLst>
+  </p:cSld>
+  <p:clrMapOvr>
+    <a:masterClrMapping/>
+  </p:clrMapOvr>
+</p:sld>
+</file>
+
+<file path=ppt/slides/slide3.xml><?xml version="1.0" encoding="utf-8"?>
+<p:sld xmlns:a="http://schemas.openxmlformats.org/drawingml/2006/main" xmlns:r="http://schemas.openxmlformats.org/officeDocument/2006/relationships" xmlns:p="http://schemas.openxmlformats.org/presentationml/2006/main">
+  <p:cSld>
+    <p:spTree>
+      <p:nvGrpSpPr>
+        <p:cNvPr id="1" name=""/>
+        <p:cNvGrpSpPr/>
+        <p:nvPr/>
+      </p:nvGrpSpPr>
+      <p:grpSpPr>
+        <a:xfrm>
+          <a:off x="0" y="0"/>
+          <a:ext cx="0" cy="0"/>
+          <a:chOff x="0" y="0"/>
+          <a:chExt cx="0" cy="0"/>
+        </a:xfrm>
+      </p:grpSpPr>
+      <p:pic>
+        <p:nvPicPr>
+          <p:cNvPr id="4" name="Picture 3">
+            <a:extLst>
+              <a:ext uri="{FF2B5EF4-FFF2-40B4-BE49-F238E27FC236}">
+                <a16:creationId xmlns:a16="http://schemas.microsoft.com/office/drawing/2014/main" id="{339CCFC0-CF5B-427B-983A-1DA831CC0891}"/>
+              </a:ext>
+            </a:extLst>
+          </p:cNvPr>
+          <p:cNvPicPr>
+            <a:picLocks noChangeAspect="1"/>
+          </p:cNvPicPr>
+          <p:nvPr/>
+        </p:nvPicPr>
+        <p:blipFill>
+          <a:blip r:embed="rId2"/>
+          <a:stretch>
+            <a:fillRect/>
+          </a:stretch>
+        </p:blipFill>
+        <p:spPr>
+          <a:xfrm>
+            <a:off x="312928" y="1187047"/>
+            <a:ext cx="8320710" cy="5363086"/>
+          </a:xfrm>
+          <a:prstGeom prst="rect">
+            <a:avLst/>
+          </a:prstGeom>
+          <a:ln>
+            <a:solidFill>
+              <a:schemeClr val="tx1"/>
+            </a:solidFill>
+          </a:ln>
+          <a:effectLst>
+            <a:outerShdw blurRad="50800" dist="38100" dir="2700000" algn="tl" rotWithShape="0">
+              <a:prstClr val="black">
+                <a:alpha val="40000"/>
+              </a:prstClr>
+            </a:outerShdw>
+          </a:effectLst>
+        </p:spPr>
+      </p:pic>
+      <p:sp>
+        <p:nvSpPr>
+          <p:cNvPr id="6" name="Rectangle: Rounded Corners 5">
+            <a:extLst>
+              <a:ext uri="{FF2B5EF4-FFF2-40B4-BE49-F238E27FC236}">
+                <a16:creationId xmlns:a16="http://schemas.microsoft.com/office/drawing/2014/main" id="{E77DE7BD-A3F8-4D0A-9379-FC239F683463}"/>
+              </a:ext>
+            </a:extLst>
+          </p:cNvPr>
+          <p:cNvSpPr/>
+          <p:nvPr/>
+        </p:nvSpPr>
+        <p:spPr>
+          <a:xfrm>
+            <a:off x="7238728" y="1235836"/>
+            <a:ext cx="165567" cy="161861"/>
+          </a:xfrm>
+          <a:prstGeom prst="roundRect">
+            <a:avLst/>
+          </a:prstGeom>
+          <a:noFill/>
+          <a:ln w="19050">
+            <a:solidFill>
+              <a:srgbClr val="FF0000"/>
+            </a:solidFill>
+          </a:ln>
+        </p:spPr>
+        <p:style>
+          <a:lnRef idx="2">
+            <a:schemeClr val="accent1">
+              <a:shade val="50000"/>
+            </a:schemeClr>
+          </a:lnRef>
+          <a:fillRef idx="1">
+            <a:schemeClr val="accent1"/>
+          </a:fillRef>
+          <a:effectRef idx="0">
+            <a:schemeClr val="accent1"/>
+          </a:effectRef>
+          <a:fontRef idx="minor">
+            <a:schemeClr val="lt1"/>
+          </a:fontRef>
+        </p:style>
+        <p:txBody>
+          <a:bodyPr rtlCol="0" anchor="ctr"/>
+          <a:lstStyle/>
+          <a:p>
+            <a:pPr algn="ctr"/>
+            <a:endParaRPr lang="en-US"/>
+          </a:p>
+        </p:txBody>
+      </p:sp>
+      <p:sp>
+        <p:nvSpPr>
+          <p:cNvPr id="7" name="Rectangle: Rounded Corners 6">
+            <a:extLst>
+              <a:ext uri="{FF2B5EF4-FFF2-40B4-BE49-F238E27FC236}">
+                <a16:creationId xmlns:a16="http://schemas.microsoft.com/office/drawing/2014/main" id="{C1090217-F88F-4AF5-92DF-4CDB01B51C1E}"/>
+              </a:ext>
+            </a:extLst>
+          </p:cNvPr>
+          <p:cNvSpPr/>
+          <p:nvPr/>
+        </p:nvSpPr>
+        <p:spPr>
+          <a:xfrm>
+            <a:off x="7445103" y="1235836"/>
+            <a:ext cx="165567" cy="161861"/>
+          </a:xfrm>
+          <a:prstGeom prst="roundRect">
+            <a:avLst/>
+          </a:prstGeom>
+          <a:noFill/>
+          <a:ln w="19050">
+            <a:solidFill>
+              <a:srgbClr val="FF0000"/>
+            </a:solidFill>
+          </a:ln>
+        </p:spPr>
+        <p:style>
+          <a:lnRef idx="2">
+            <a:schemeClr val="accent1">
+              <a:shade val="50000"/>
+            </a:schemeClr>
+          </a:lnRef>
+          <a:fillRef idx="1">
+            <a:schemeClr val="accent1"/>
+          </a:fillRef>
+          <a:effectRef idx="0">
+            <a:schemeClr val="accent1"/>
+          </a:effectRef>
+          <a:fontRef idx="minor">
+            <a:schemeClr val="lt1"/>
+          </a:fontRef>
+        </p:style>
+        <p:txBody>
+          <a:bodyPr rtlCol="0" anchor="ctr"/>
+          <a:lstStyle/>
+          <a:p>
+            <a:pPr algn="ctr"/>
+            <a:endParaRPr lang="en-US"/>
+          </a:p>
+        </p:txBody>
+      </p:sp>
+      <p:sp>
+        <p:nvSpPr>
+          <p:cNvPr id="8" name="Rectangle: Rounded Corners 7">
+            <a:extLst>
+              <a:ext uri="{FF2B5EF4-FFF2-40B4-BE49-F238E27FC236}">
+                <a16:creationId xmlns:a16="http://schemas.microsoft.com/office/drawing/2014/main" id="{F2BC9FA7-FF68-456E-8AA9-5A85C26E6C41}"/>
+              </a:ext>
+            </a:extLst>
+          </p:cNvPr>
+          <p:cNvSpPr/>
+          <p:nvPr/>
+        </p:nvSpPr>
+        <p:spPr>
+          <a:xfrm>
+            <a:off x="7648346" y="1235836"/>
+            <a:ext cx="165567" cy="161861"/>
+          </a:xfrm>
+          <a:prstGeom prst="roundRect">
+            <a:avLst/>
+          </a:prstGeom>
+          <a:noFill/>
+          <a:ln w="19050">
+            <a:solidFill>
+              <a:srgbClr val="FF0000"/>
+            </a:solidFill>
+          </a:ln>
+        </p:spPr>
+        <p:style>
+          <a:lnRef idx="2">
+            <a:schemeClr val="accent1">
+              <a:shade val="50000"/>
+            </a:schemeClr>
+          </a:lnRef>
+          <a:fillRef idx="1">
+            <a:schemeClr val="accent1"/>
+          </a:fillRef>
+          <a:effectRef idx="0">
+            <a:schemeClr val="accent1"/>
+          </a:effectRef>
+          <a:fontRef idx="minor">
+            <a:schemeClr val="lt1"/>
+          </a:fontRef>
+        </p:style>
+        <p:txBody>
+          <a:bodyPr rtlCol="0" anchor="ctr"/>
+          <a:lstStyle/>
+          <a:p>
+            <a:pPr algn="ctr"/>
+            <a:endParaRPr lang="en-US"/>
+          </a:p>
+        </p:txBody>
+      </p:sp>
+      <p:sp>
+        <p:nvSpPr>
+          <p:cNvPr id="9" name="Rectangle: Rounded Corners 8">
+            <a:extLst>
+              <a:ext uri="{FF2B5EF4-FFF2-40B4-BE49-F238E27FC236}">
+                <a16:creationId xmlns:a16="http://schemas.microsoft.com/office/drawing/2014/main" id="{7D9743E9-5D18-455F-B02E-55A384D2127D}"/>
+              </a:ext>
+            </a:extLst>
+          </p:cNvPr>
+          <p:cNvSpPr/>
+          <p:nvPr/>
+        </p:nvSpPr>
+        <p:spPr>
+          <a:xfrm>
+            <a:off x="7842064" y="1199576"/>
+            <a:ext cx="281065" cy="210650"/>
+          </a:xfrm>
+          <a:prstGeom prst="roundRect">
+            <a:avLst/>
+          </a:prstGeom>
+          <a:noFill/>
+          <a:ln w="19050">
+            <a:solidFill>
+              <a:srgbClr val="FF0000"/>
+            </a:solidFill>
+          </a:ln>
+        </p:spPr>
+        <p:style>
+          <a:lnRef idx="2">
+            <a:schemeClr val="accent1">
+              <a:shade val="50000"/>
+            </a:schemeClr>
+          </a:lnRef>
+          <a:fillRef idx="1">
+            <a:schemeClr val="accent1"/>
+          </a:fillRef>
+          <a:effectRef idx="0">
+            <a:schemeClr val="accent1"/>
+          </a:effectRef>
+          <a:fontRef idx="minor">
+            <a:schemeClr val="lt1"/>
+          </a:fontRef>
+        </p:style>
+        <p:txBody>
+          <a:bodyPr rtlCol="0" anchor="ctr"/>
+          <a:lstStyle/>
+          <a:p>
+            <a:pPr algn="ctr"/>
+            <a:endParaRPr lang="en-US"/>
+          </a:p>
+        </p:txBody>
+      </p:sp>
+      <p:cxnSp>
+        <p:nvCxnSpPr>
+          <p:cNvPr id="10" name="Straight Arrow Connector 9">
+            <a:extLst>
+              <a:ext uri="{FF2B5EF4-FFF2-40B4-BE49-F238E27FC236}">
+                <a16:creationId xmlns:a16="http://schemas.microsoft.com/office/drawing/2014/main" id="{25B85836-DB09-4DBE-9D3E-426CFEAB573B}"/>
+              </a:ext>
+            </a:extLst>
+          </p:cNvPr>
+          <p:cNvCxnSpPr>
+            <a:cxnSpLocks/>
+            <a:stCxn id="6" idx="1"/>
+            <a:endCxn id="13" idx="3"/>
+          </p:cNvCxnSpPr>
+          <p:nvPr/>
+        </p:nvCxnSpPr>
+        <p:spPr>
+          <a:xfrm flipH="1" flipV="1">
+            <a:off x="6246277" y="461722"/>
+            <a:ext cx="992451" cy="855045"/>
+          </a:xfrm>
+          <a:prstGeom prst="straightConnector1">
+            <a:avLst/>
+          </a:prstGeom>
+          <a:ln w="19050">
+            <a:solidFill>
+              <a:srgbClr val="FF0000"/>
+            </a:solidFill>
+            <a:tailEnd type="triangle" w="lg" len="lg"/>
+          </a:ln>
+        </p:spPr>
+        <p:style>
+          <a:lnRef idx="1">
+            <a:schemeClr val="accent1"/>
+          </a:lnRef>
+          <a:fillRef idx="0">
+            <a:schemeClr val="accent1"/>
+          </a:fillRef>
+          <a:effectRef idx="0">
+            <a:schemeClr val="accent1"/>
+          </a:effectRef>
+          <a:fontRef idx="minor">
+            <a:schemeClr val="tx1"/>
+          </a:fontRef>
+        </p:style>
+      </p:cxnSp>
+      <p:sp>
+        <p:nvSpPr>
+          <p:cNvPr id="13" name="Rectangle: Rounded Corners 12">
+            <a:extLst>
+              <a:ext uri="{FF2B5EF4-FFF2-40B4-BE49-F238E27FC236}">
+                <a16:creationId xmlns:a16="http://schemas.microsoft.com/office/drawing/2014/main" id="{942333F7-08B7-4C30-AF69-9AB61B395CA3}"/>
+              </a:ext>
+            </a:extLst>
+          </p:cNvPr>
+          <p:cNvSpPr/>
+          <p:nvPr/>
+        </p:nvSpPr>
+        <p:spPr>
+          <a:xfrm>
+            <a:off x="4423145" y="193675"/>
+            <a:ext cx="1823132" cy="536093"/>
+          </a:xfrm>
+          <a:prstGeom prst="roundRect">
+            <a:avLst/>
+          </a:prstGeom>
+        </p:spPr>
+        <p:style>
+          <a:lnRef idx="2">
+            <a:schemeClr val="accent1">
+              <a:shade val="50000"/>
+            </a:schemeClr>
+          </a:lnRef>
+          <a:fillRef idx="1">
+            <a:schemeClr val="accent1"/>
+          </a:fillRef>
+          <a:effectRef idx="0">
+            <a:schemeClr val="accent1"/>
+          </a:effectRef>
+          <a:fontRef idx="minor">
+            <a:schemeClr val="lt1"/>
+          </a:fontRef>
+        </p:style>
+        <p:txBody>
+          <a:bodyPr rtlCol="0" anchor="ctr"/>
+          <a:lstStyle/>
+          <a:p>
+            <a:pPr algn="ctr"/>
+            <a:r>
+              <a:rPr lang="en-US" dirty="0"/>
+              <a:t>1. Bookmarking</a:t>
+            </a:r>
+          </a:p>
+        </p:txBody>
+      </p:sp>
+      <p:cxnSp>
+        <p:nvCxnSpPr>
+          <p:cNvPr id="18" name="Straight Arrow Connector 17">
+            <a:extLst>
+              <a:ext uri="{FF2B5EF4-FFF2-40B4-BE49-F238E27FC236}">
+                <a16:creationId xmlns:a16="http://schemas.microsoft.com/office/drawing/2014/main" id="{4FDD80ED-63D0-45CB-99B4-07B4A20712D8}"/>
+              </a:ext>
+            </a:extLst>
+          </p:cNvPr>
+          <p:cNvCxnSpPr>
+            <a:cxnSpLocks/>
+            <a:stCxn id="7" idx="0"/>
+            <a:endCxn id="22" idx="1"/>
+          </p:cNvCxnSpPr>
+          <p:nvPr/>
+        </p:nvCxnSpPr>
+        <p:spPr>
+          <a:xfrm flipV="1">
+            <a:off x="7527887" y="441461"/>
+            <a:ext cx="839178" cy="794375"/>
+          </a:xfrm>
+          <a:prstGeom prst="straightConnector1">
+            <a:avLst/>
+          </a:prstGeom>
+          <a:ln w="19050">
+            <a:solidFill>
+              <a:srgbClr val="FF0000"/>
+            </a:solidFill>
+            <a:tailEnd type="triangle" w="lg" len="lg"/>
+          </a:ln>
+        </p:spPr>
+        <p:style>
+          <a:lnRef idx="1">
+            <a:schemeClr val="accent1"/>
+          </a:lnRef>
+          <a:fillRef idx="0">
+            <a:schemeClr val="accent1"/>
+          </a:fillRef>
+          <a:effectRef idx="0">
+            <a:schemeClr val="accent1"/>
+          </a:effectRef>
+          <a:fontRef idx="minor">
+            <a:schemeClr val="tx1"/>
+          </a:fontRef>
+        </p:style>
+      </p:cxnSp>
+      <p:sp>
+        <p:nvSpPr>
+          <p:cNvPr id="22" name="Rectangle: Rounded Corners 21">
+            <a:extLst>
+              <a:ext uri="{FF2B5EF4-FFF2-40B4-BE49-F238E27FC236}">
+                <a16:creationId xmlns:a16="http://schemas.microsoft.com/office/drawing/2014/main" id="{00EB0E60-AA79-4D5E-8F06-1B8FA6F9E808}"/>
+              </a:ext>
+            </a:extLst>
+          </p:cNvPr>
+          <p:cNvSpPr/>
+          <p:nvPr/>
+        </p:nvSpPr>
+        <p:spPr>
+          <a:xfrm>
+            <a:off x="8367065" y="173414"/>
+            <a:ext cx="1423016" cy="536093"/>
+          </a:xfrm>
+          <a:prstGeom prst="roundRect">
+            <a:avLst/>
+          </a:prstGeom>
+        </p:spPr>
+        <p:style>
+          <a:lnRef idx="2">
+            <a:schemeClr val="accent1">
+              <a:shade val="50000"/>
+            </a:schemeClr>
+          </a:lnRef>
+          <a:fillRef idx="1">
+            <a:schemeClr val="accent1"/>
+          </a:fillRef>
+          <a:effectRef idx="0">
+            <a:schemeClr val="accent1"/>
+          </a:effectRef>
+          <a:fontRef idx="minor">
+            <a:schemeClr val="lt1"/>
+          </a:fontRef>
+        </p:style>
+        <p:txBody>
+          <a:bodyPr rtlCol="0" anchor="ctr"/>
+          <a:lstStyle/>
+          <a:p>
+            <a:pPr algn="ctr"/>
+            <a:r>
+              <a:rPr lang="en-US" dirty="0"/>
+              <a:t>2. </a:t>
+            </a:r>
+            <a:r>
+              <a:rPr lang="en-US" dirty="0" err="1"/>
+              <a:t>Github</a:t>
+            </a:r>
+            <a:endParaRPr lang="en-US" dirty="0"/>
+          </a:p>
+        </p:txBody>
+      </p:sp>
+      <p:sp>
+        <p:nvSpPr>
+          <p:cNvPr id="29" name="Rectangle: Rounded Corners 28">
+            <a:extLst>
+              <a:ext uri="{FF2B5EF4-FFF2-40B4-BE49-F238E27FC236}">
+                <a16:creationId xmlns:a16="http://schemas.microsoft.com/office/drawing/2014/main" id="{1F2FAE74-F0D0-47A1-A7F7-245B7012EFAB}"/>
+              </a:ext>
+            </a:extLst>
+          </p:cNvPr>
+          <p:cNvSpPr/>
+          <p:nvPr/>
+        </p:nvSpPr>
+        <p:spPr>
+          <a:xfrm>
+            <a:off x="9649345" y="3140691"/>
+            <a:ext cx="1423016" cy="576617"/>
+          </a:xfrm>
+          <a:prstGeom prst="roundRect">
+            <a:avLst/>
+          </a:prstGeom>
+        </p:spPr>
+        <p:style>
+          <a:lnRef idx="2">
+            <a:schemeClr val="accent1">
+              <a:shade val="50000"/>
+            </a:schemeClr>
+          </a:lnRef>
+          <a:fillRef idx="1">
+            <a:schemeClr val="accent1"/>
+          </a:fillRef>
+          <a:effectRef idx="0">
+            <a:schemeClr val="accent1"/>
+          </a:effectRef>
+          <a:fontRef idx="minor">
+            <a:schemeClr val="lt1"/>
+          </a:fontRef>
+        </p:style>
+        <p:txBody>
+          <a:bodyPr rtlCol="0" anchor="ctr"/>
+          <a:lstStyle/>
+          <a:p>
+            <a:pPr algn="ctr"/>
+            <a:r>
+              <a:rPr lang="en-US" dirty="0"/>
+              <a:t>3. Help</a:t>
+            </a:r>
+          </a:p>
+        </p:txBody>
+      </p:sp>
+      <p:cxnSp>
+        <p:nvCxnSpPr>
+          <p:cNvPr id="30" name="Straight Arrow Connector 29">
+            <a:extLst>
+              <a:ext uri="{FF2B5EF4-FFF2-40B4-BE49-F238E27FC236}">
+                <a16:creationId xmlns:a16="http://schemas.microsoft.com/office/drawing/2014/main" id="{47BE14F2-BF27-47D9-AEA0-4FDE34BE9AF5}"/>
+              </a:ext>
+            </a:extLst>
+          </p:cNvPr>
+          <p:cNvCxnSpPr>
+            <a:cxnSpLocks/>
+            <a:stCxn id="8" idx="2"/>
+            <a:endCxn id="29" idx="1"/>
+          </p:cNvCxnSpPr>
+          <p:nvPr/>
+        </p:nvCxnSpPr>
+        <p:spPr>
+          <a:xfrm>
+            <a:off x="7731130" y="1397697"/>
+            <a:ext cx="1918215" cy="2031303"/>
+          </a:xfrm>
+          <a:prstGeom prst="straightConnector1">
+            <a:avLst/>
+          </a:prstGeom>
+          <a:ln w="19050">
+            <a:solidFill>
+              <a:srgbClr val="FF0000"/>
+            </a:solidFill>
+            <a:tailEnd type="triangle" w="lg" len="lg"/>
+          </a:ln>
+        </p:spPr>
+        <p:style>
+          <a:lnRef idx="1">
+            <a:schemeClr val="accent1"/>
+          </a:lnRef>
+          <a:fillRef idx="0">
+            <a:schemeClr val="accent1"/>
+          </a:fillRef>
+          <a:effectRef idx="0">
+            <a:schemeClr val="accent1"/>
+          </a:effectRef>
+          <a:fontRef idx="minor">
+            <a:schemeClr val="tx1"/>
+          </a:fontRef>
+        </p:style>
+      </p:cxnSp>
+      <p:sp>
+        <p:nvSpPr>
+          <p:cNvPr id="42" name="Rectangle: Rounded Corners 41">
+            <a:extLst>
+              <a:ext uri="{FF2B5EF4-FFF2-40B4-BE49-F238E27FC236}">
+                <a16:creationId xmlns:a16="http://schemas.microsoft.com/office/drawing/2014/main" id="{28C492FB-475C-4415-BC31-D481515DEFAA}"/>
+              </a:ext>
+            </a:extLst>
+          </p:cNvPr>
+          <p:cNvSpPr/>
+          <p:nvPr/>
+        </p:nvSpPr>
+        <p:spPr>
+          <a:xfrm>
+            <a:off x="9649345" y="1605075"/>
+            <a:ext cx="1423016" cy="576617"/>
+          </a:xfrm>
+          <a:prstGeom prst="roundRect">
+            <a:avLst/>
+          </a:prstGeom>
+        </p:spPr>
+        <p:style>
+          <a:lnRef idx="2">
+            <a:schemeClr val="accent1">
+              <a:shade val="50000"/>
+            </a:schemeClr>
+          </a:lnRef>
+          <a:fillRef idx="1">
+            <a:schemeClr val="accent1"/>
+          </a:fillRef>
+          <a:effectRef idx="0">
+            <a:schemeClr val="accent1"/>
+          </a:effectRef>
+          <a:fontRef idx="minor">
+            <a:schemeClr val="lt1"/>
+          </a:fontRef>
+        </p:style>
+        <p:txBody>
+          <a:bodyPr rtlCol="0" anchor="ctr"/>
+          <a:lstStyle/>
+          <a:p>
+            <a:pPr algn="ctr"/>
+            <a:r>
+              <a:rPr lang="en-US" dirty="0"/>
+              <a:t>4. Download</a:t>
+            </a:r>
+          </a:p>
+        </p:txBody>
+      </p:sp>
+      <p:cxnSp>
+        <p:nvCxnSpPr>
+          <p:cNvPr id="43" name="Straight Arrow Connector 42">
+            <a:extLst>
+              <a:ext uri="{FF2B5EF4-FFF2-40B4-BE49-F238E27FC236}">
+                <a16:creationId xmlns:a16="http://schemas.microsoft.com/office/drawing/2014/main" id="{78347137-2507-41A1-9DED-CBD8BB123C6D}"/>
+              </a:ext>
+            </a:extLst>
+          </p:cNvPr>
+          <p:cNvCxnSpPr>
+            <a:cxnSpLocks/>
+            <a:stCxn id="9" idx="3"/>
+            <a:endCxn id="42" idx="1"/>
+          </p:cNvCxnSpPr>
+          <p:nvPr/>
+        </p:nvCxnSpPr>
+        <p:spPr>
+          <a:xfrm>
+            <a:off x="8123129" y="1304901"/>
+            <a:ext cx="1526216" cy="588483"/>
+          </a:xfrm>
+          <a:prstGeom prst="straightConnector1">
+            <a:avLst/>
+          </a:prstGeom>
+          <a:ln w="19050">
+            <a:solidFill>
+              <a:srgbClr val="FF0000"/>
+            </a:solidFill>
+            <a:tailEnd type="triangle" w="lg" len="lg"/>
+          </a:ln>
+        </p:spPr>
+        <p:style>
+          <a:lnRef idx="1">
+            <a:schemeClr val="accent1"/>
+          </a:lnRef>
+          <a:fillRef idx="0">
+            <a:schemeClr val="accent1"/>
+          </a:fillRef>
+          <a:effectRef idx="0">
+            <a:schemeClr val="accent1"/>
+          </a:effectRef>
+          <a:fontRef idx="minor">
+            <a:schemeClr val="tx1"/>
+          </a:fontRef>
+        </p:style>
+      </p:cxnSp>
+      <p:sp>
+        <p:nvSpPr>
+          <p:cNvPr id="68" name="Rectangle: Rounded Corners 67">
+            <a:extLst>
+              <a:ext uri="{FF2B5EF4-FFF2-40B4-BE49-F238E27FC236}">
+                <a16:creationId xmlns:a16="http://schemas.microsoft.com/office/drawing/2014/main" id="{02EDA732-6583-4D2D-A194-E570CE1FC7D3}"/>
+              </a:ext>
+            </a:extLst>
+          </p:cNvPr>
+          <p:cNvSpPr/>
+          <p:nvPr/>
+        </p:nvSpPr>
+        <p:spPr>
+          <a:xfrm>
+            <a:off x="0" y="-393405"/>
+            <a:ext cx="1655545" cy="287079"/>
+          </a:xfrm>
+          <a:prstGeom prst="roundRect">
+            <a:avLst/>
+          </a:prstGeom>
+          <a:noFill/>
+          <a:ln>
+            <a:noFill/>
+          </a:ln>
+        </p:spPr>
+        <p:style>
+          <a:lnRef idx="2">
+            <a:schemeClr val="accent1">
+              <a:shade val="50000"/>
+            </a:schemeClr>
+          </a:lnRef>
+          <a:fillRef idx="1">
+            <a:schemeClr val="accent1"/>
+          </a:fillRef>
+          <a:effectRef idx="0">
+            <a:schemeClr val="accent1"/>
+          </a:effectRef>
+          <a:fontRef idx="minor">
+            <a:schemeClr val="lt1"/>
+          </a:fontRef>
+        </p:style>
+        <p:txBody>
+          <a:bodyPr rtlCol="0" anchor="ctr"/>
+          <a:lstStyle/>
+          <a:p>
+            <a:pPr algn="ctr"/>
+            <a:r>
+              <a:rPr lang="en-US" dirty="0">
+                <a:solidFill>
+                  <a:schemeClr val="tx1"/>
+                </a:solidFill>
+              </a:rPr>
+              <a:t>top_bar.png</a:t>
+            </a:r>
+          </a:p>
+        </p:txBody>
+      </p:sp>
+    </p:spTree>
+    <p:extLst>
+      <p:ext uri="{BB962C8B-B14F-4D97-AF65-F5344CB8AC3E}">
+        <p14:creationId xmlns:p14="http://schemas.microsoft.com/office/powerpoint/2010/main" val="370134765"/>
+      </p:ext>
+    </p:extLst>
+  </p:cSld>
+  <p:clrMapOvr>
+    <a:masterClrMapping/>
+  </p:clrMapOvr>
+</p:sld>
+</file>
+
+<file path=ppt/slides/slide4.xml><?xml version="1.0" encoding="utf-8"?>
+<p:sld xmlns:a="http://schemas.openxmlformats.org/drawingml/2006/main" xmlns:r="http://schemas.openxmlformats.org/officeDocument/2006/relationships" xmlns:p="http://schemas.openxmlformats.org/presentationml/2006/main">
+  <p:cSld>
+    <p:spTree>
+      <p:nvGrpSpPr>
+        <p:cNvPr id="1" name=""/>
+        <p:cNvGrpSpPr/>
+        <p:nvPr/>
+      </p:nvGrpSpPr>
+      <p:grpSpPr>
+        <a:xfrm>
+          <a:off x="0" y="0"/>
+          <a:ext cx="0" cy="0"/>
+          <a:chOff x="0" y="0"/>
+          <a:chExt cx="0" cy="0"/>
+        </a:xfrm>
+      </p:grpSpPr>
+      <p:pic>
+        <p:nvPicPr>
+          <p:cNvPr id="5" name="Picture 4">
+            <a:extLst>
+              <a:ext uri="{FF2B5EF4-FFF2-40B4-BE49-F238E27FC236}">
+                <a16:creationId xmlns:a16="http://schemas.microsoft.com/office/drawing/2014/main" id="{1FFE2715-686B-4742-94F8-AAF43F7F276A}"/>
+              </a:ext>
+            </a:extLst>
+          </p:cNvPr>
+          <p:cNvPicPr>
+            <a:picLocks noChangeAspect="1"/>
+          </p:cNvPicPr>
+          <p:nvPr/>
+        </p:nvPicPr>
+        <p:blipFill>
+          <a:blip r:embed="rId2"/>
+          <a:stretch>
+            <a:fillRect/>
+          </a:stretch>
+        </p:blipFill>
+        <p:spPr>
+          <a:xfrm>
+            <a:off x="462335" y="1169772"/>
+            <a:ext cx="7924599" cy="5176001"/>
+          </a:xfrm>
+          <a:prstGeom prst="rect">
+            <a:avLst/>
+          </a:prstGeom>
+          <a:ln>
+            <a:solidFill>
+              <a:schemeClr val="tx1"/>
+            </a:solidFill>
+          </a:ln>
+          <a:effectLst>
+            <a:outerShdw blurRad="50800" dist="38100" dir="2700000" algn="tl" rotWithShape="0">
+              <a:prstClr val="black">
+                <a:alpha val="40000"/>
+              </a:prstClr>
+            </a:outerShdw>
+          </a:effectLst>
+        </p:spPr>
+      </p:pic>
+      <p:sp>
+        <p:nvSpPr>
+          <p:cNvPr id="6" name="Oval 5">
+            <a:extLst>
+              <a:ext uri="{FF2B5EF4-FFF2-40B4-BE49-F238E27FC236}">
+                <a16:creationId xmlns:a16="http://schemas.microsoft.com/office/drawing/2014/main" id="{309EEC6E-B533-4C7C-9FB9-8935A0E64DB9}"/>
+              </a:ext>
+            </a:extLst>
+          </p:cNvPr>
+          <p:cNvSpPr/>
+          <p:nvPr/>
+        </p:nvSpPr>
+        <p:spPr>
+          <a:xfrm>
+            <a:off x="6996701" y="1181528"/>
+            <a:ext cx="236305" cy="236306"/>
+          </a:xfrm>
+          <a:prstGeom prst="ellipse">
+            <a:avLst/>
+          </a:prstGeom>
+          <a:noFill/>
+          <a:ln w="28575">
+            <a:solidFill>
+              <a:srgbClr val="FF0000"/>
+            </a:solidFill>
+          </a:ln>
+        </p:spPr>
+        <p:style>
+          <a:lnRef idx="2">
+            <a:schemeClr val="accent1">
+              <a:shade val="50000"/>
+            </a:schemeClr>
+          </a:lnRef>
+          <a:fillRef idx="1">
+            <a:schemeClr val="accent1"/>
+          </a:fillRef>
+          <a:effectRef idx="0">
+            <a:schemeClr val="accent1"/>
+          </a:effectRef>
+          <a:fontRef idx="minor">
+            <a:schemeClr val="lt1"/>
+          </a:fontRef>
+        </p:style>
+        <p:txBody>
+          <a:bodyPr rtlCol="0" anchor="ctr"/>
+          <a:lstStyle/>
+          <a:p>
+            <a:pPr algn="ctr"/>
+            <a:endParaRPr lang="en-US"/>
+          </a:p>
+        </p:txBody>
+      </p:sp>
+      <p:pic>
+        <p:nvPicPr>
+          <p:cNvPr id="7" name="Picture 6">
+            <a:extLst>
+              <a:ext uri="{FF2B5EF4-FFF2-40B4-BE49-F238E27FC236}">
+                <a16:creationId xmlns:a16="http://schemas.microsoft.com/office/drawing/2014/main" id="{F162D799-5468-4EAF-AFFC-3955C01C6F89}"/>
+              </a:ext>
+            </a:extLst>
+          </p:cNvPr>
+          <p:cNvPicPr>
+            <a:picLocks noChangeAspect="1"/>
+          </p:cNvPicPr>
+          <p:nvPr/>
+        </p:nvPicPr>
+        <p:blipFill>
+          <a:blip r:embed="rId3"/>
+          <a:stretch>
+            <a:fillRect/>
+          </a:stretch>
+        </p:blipFill>
+        <p:spPr>
+          <a:xfrm>
+            <a:off x="8948365" y="2186147"/>
+            <a:ext cx="2781300" cy="1571625"/>
+          </a:xfrm>
+          <a:prstGeom prst="rect">
+            <a:avLst/>
+          </a:prstGeom>
+          <a:ln>
+            <a:solidFill>
+              <a:schemeClr val="tx1"/>
+            </a:solidFill>
+          </a:ln>
+          <a:effectLst>
+            <a:outerShdw blurRad="50800" dist="38100" dir="2700000" algn="tl" rotWithShape="0">
+              <a:prstClr val="black">
+                <a:alpha val="40000"/>
+              </a:prstClr>
+            </a:outerShdw>
+          </a:effectLst>
+        </p:spPr>
+      </p:pic>
+      <p:cxnSp>
+        <p:nvCxnSpPr>
+          <p:cNvPr id="8" name="Straight Arrow Connector 7">
+            <a:extLst>
+              <a:ext uri="{FF2B5EF4-FFF2-40B4-BE49-F238E27FC236}">
+                <a16:creationId xmlns:a16="http://schemas.microsoft.com/office/drawing/2014/main" id="{E00FDCFA-85FC-4BB0-AFCB-AB115446B6EB}"/>
+              </a:ext>
+            </a:extLst>
+          </p:cNvPr>
+          <p:cNvCxnSpPr>
+            <a:cxnSpLocks/>
+            <a:stCxn id="6" idx="5"/>
+            <a:endCxn id="7" idx="1"/>
+          </p:cNvCxnSpPr>
+          <p:nvPr/>
+        </p:nvCxnSpPr>
+        <p:spPr>
+          <a:xfrm>
+            <a:off x="7198400" y="1383228"/>
+            <a:ext cx="1749965" cy="1588732"/>
+          </a:xfrm>
+          <a:prstGeom prst="straightConnector1">
+            <a:avLst/>
+          </a:prstGeom>
+          <a:ln w="28575">
+            <a:solidFill>
+              <a:srgbClr val="FF0000"/>
+            </a:solidFill>
+            <a:tailEnd type="triangle" w="lg" len="lg"/>
+          </a:ln>
+        </p:spPr>
+        <p:style>
+          <a:lnRef idx="1">
+            <a:schemeClr val="accent1"/>
+          </a:lnRef>
+          <a:fillRef idx="0">
+            <a:schemeClr val="accent1"/>
+          </a:fillRef>
+          <a:effectRef idx="0">
+            <a:schemeClr val="accent1"/>
+          </a:effectRef>
+          <a:fontRef idx="minor">
+            <a:schemeClr val="tx1"/>
+          </a:fontRef>
+        </p:style>
+      </p:cxnSp>
+      <p:sp>
+        <p:nvSpPr>
+          <p:cNvPr id="15" name="Rectangle: Rounded Corners 14">
+            <a:extLst>
+              <a:ext uri="{FF2B5EF4-FFF2-40B4-BE49-F238E27FC236}">
+                <a16:creationId xmlns:a16="http://schemas.microsoft.com/office/drawing/2014/main" id="{60024E6C-3043-4E18-A1D0-E132708E98D6}"/>
+              </a:ext>
+            </a:extLst>
+          </p:cNvPr>
+          <p:cNvSpPr/>
+          <p:nvPr/>
+        </p:nvSpPr>
+        <p:spPr>
+          <a:xfrm>
+            <a:off x="0" y="-393405"/>
+            <a:ext cx="1655545" cy="287079"/>
+          </a:xfrm>
+          <a:prstGeom prst="roundRect">
+            <a:avLst/>
+          </a:prstGeom>
+          <a:noFill/>
+          <a:ln>
+            <a:noFill/>
+          </a:ln>
+        </p:spPr>
+        <p:style>
+          <a:lnRef idx="2">
+            <a:schemeClr val="accent1">
+              <a:shade val="50000"/>
+            </a:schemeClr>
+          </a:lnRef>
+          <a:fillRef idx="1">
+            <a:schemeClr val="accent1"/>
+          </a:fillRef>
+          <a:effectRef idx="0">
+            <a:schemeClr val="accent1"/>
+          </a:effectRef>
+          <a:fontRef idx="minor">
+            <a:schemeClr val="lt1"/>
+          </a:fontRef>
+        </p:style>
+        <p:txBody>
+          <a:bodyPr rtlCol="0" anchor="ctr"/>
+          <a:lstStyle/>
+          <a:p>
+            <a:pPr algn="ctr"/>
+            <a:r>
+              <a:rPr lang="en-US" dirty="0">
+                <a:solidFill>
+                  <a:schemeClr val="tx1"/>
+                </a:solidFill>
+              </a:rPr>
+              <a:t>bookmark.png</a:t>
+            </a:r>
+          </a:p>
+        </p:txBody>
+      </p:sp>
+    </p:spTree>
+    <p:extLst>
+      <p:ext uri="{BB962C8B-B14F-4D97-AF65-F5344CB8AC3E}">
+        <p14:creationId xmlns:p14="http://schemas.microsoft.com/office/powerpoint/2010/main" val="3758515239"/>
+      </p:ext>
+    </p:extLst>
+  </p:cSld>
+  <p:clrMapOvr>
+    <a:masterClrMapping/>
+  </p:clrMapOvr>
+</p:sld>
+</file>
+
+<file path=ppt/slides/slide5.xml><?xml version="1.0" encoding="utf-8"?>
+<p:sld xmlns:a="http://schemas.openxmlformats.org/drawingml/2006/main" xmlns:r="http://schemas.openxmlformats.org/officeDocument/2006/relationships" xmlns:p="http://schemas.openxmlformats.org/presentationml/2006/main">
+  <p:cSld>
+    <p:spTree>
+      <p:nvGrpSpPr>
+        <p:cNvPr id="1" name=""/>
+        <p:cNvGrpSpPr/>
+        <p:nvPr/>
+      </p:nvGrpSpPr>
+      <p:grpSpPr>
+        <a:xfrm>
+          <a:off x="0" y="0"/>
+          <a:ext cx="0" cy="0"/>
+          <a:chOff x="0" y="0"/>
+          <a:chExt cx="0" cy="0"/>
+        </a:xfrm>
+      </p:grpSpPr>
+      <p:pic>
+        <p:nvPicPr>
+          <p:cNvPr id="5" name="Picture 4">
+            <a:extLst>
+              <a:ext uri="{FF2B5EF4-FFF2-40B4-BE49-F238E27FC236}">
+                <a16:creationId xmlns:a16="http://schemas.microsoft.com/office/drawing/2014/main" id="{1FFE2715-686B-4742-94F8-AAF43F7F276A}"/>
+              </a:ext>
+            </a:extLst>
+          </p:cNvPr>
+          <p:cNvPicPr>
+            <a:picLocks noChangeAspect="1"/>
+          </p:cNvPicPr>
+          <p:nvPr/>
+        </p:nvPicPr>
+        <p:blipFill>
+          <a:blip r:embed="rId2"/>
+          <a:stretch>
+            <a:fillRect/>
+          </a:stretch>
+        </p:blipFill>
+        <p:spPr>
+          <a:xfrm>
+            <a:off x="186720" y="199606"/>
+            <a:ext cx="6657712" cy="4348526"/>
+          </a:xfrm>
+          <a:prstGeom prst="rect">
+            <a:avLst/>
+          </a:prstGeom>
+          <a:ln>
+            <a:solidFill>
+              <a:schemeClr val="tx1"/>
+            </a:solidFill>
+          </a:ln>
+          <a:effectLst>
+            <a:outerShdw blurRad="50800" dist="38100" dir="2700000" algn="tl" rotWithShape="0">
+              <a:prstClr val="black">
+                <a:alpha val="40000"/>
+              </a:prstClr>
+            </a:outerShdw>
+          </a:effectLst>
+        </p:spPr>
+      </p:pic>
+      <p:sp>
+        <p:nvSpPr>
+          <p:cNvPr id="6" name="Oval 5">
+            <a:extLst>
+              <a:ext uri="{FF2B5EF4-FFF2-40B4-BE49-F238E27FC236}">
+                <a16:creationId xmlns:a16="http://schemas.microsoft.com/office/drawing/2014/main" id="{309EEC6E-B533-4C7C-9FB9-8935A0E64DB9}"/>
+              </a:ext>
+            </a:extLst>
+          </p:cNvPr>
+          <p:cNvSpPr/>
+          <p:nvPr/>
+        </p:nvSpPr>
+        <p:spPr>
+          <a:xfrm>
+            <a:off x="5838472" y="209612"/>
+            <a:ext cx="199199" cy="199701"/>
+          </a:xfrm>
+          <a:prstGeom prst="ellipse">
+            <a:avLst/>
+          </a:prstGeom>
+          <a:noFill/>
+          <a:ln w="28575">
+            <a:solidFill>
+              <a:srgbClr val="FF0000"/>
+            </a:solidFill>
+          </a:ln>
+        </p:spPr>
+        <p:style>
+          <a:lnRef idx="2">
+            <a:schemeClr val="accent1">
+              <a:shade val="50000"/>
+            </a:schemeClr>
+          </a:lnRef>
+          <a:fillRef idx="1">
+            <a:schemeClr val="accent1"/>
+          </a:fillRef>
+          <a:effectRef idx="0">
+            <a:schemeClr val="accent1"/>
+          </a:effectRef>
+          <a:fontRef idx="minor">
+            <a:schemeClr val="lt1"/>
+          </a:fontRef>
+        </p:style>
+        <p:txBody>
+          <a:bodyPr rtlCol="0" anchor="ctr"/>
+          <a:lstStyle/>
+          <a:p>
+            <a:pPr algn="ctr"/>
+            <a:endParaRPr lang="en-US"/>
+          </a:p>
+        </p:txBody>
+      </p:sp>
+      <p:cxnSp>
+        <p:nvCxnSpPr>
+          <p:cNvPr id="8" name="Straight Arrow Connector 7">
+            <a:extLst>
+              <a:ext uri="{FF2B5EF4-FFF2-40B4-BE49-F238E27FC236}">
+                <a16:creationId xmlns:a16="http://schemas.microsoft.com/office/drawing/2014/main" id="{E00FDCFA-85FC-4BB0-AFCB-AB115446B6EB}"/>
+              </a:ext>
+            </a:extLst>
+          </p:cNvPr>
+          <p:cNvCxnSpPr>
+            <a:cxnSpLocks/>
+            <a:stCxn id="6" idx="5"/>
+            <a:endCxn id="10" idx="0"/>
+          </p:cNvCxnSpPr>
+          <p:nvPr/>
+        </p:nvCxnSpPr>
+        <p:spPr>
+          <a:xfrm>
+            <a:off x="6008499" y="380067"/>
+            <a:ext cx="2634716" cy="3048933"/>
+          </a:xfrm>
+          <a:prstGeom prst="straightConnector1">
+            <a:avLst/>
+          </a:prstGeom>
+          <a:ln w="28575">
+            <a:solidFill>
+              <a:srgbClr val="FF0000"/>
+            </a:solidFill>
+            <a:tailEnd type="triangle" w="lg" len="lg"/>
+          </a:ln>
+        </p:spPr>
+        <p:style>
+          <a:lnRef idx="1">
+            <a:schemeClr val="accent1"/>
+          </a:lnRef>
+          <a:fillRef idx="0">
+            <a:schemeClr val="accent1"/>
+          </a:fillRef>
+          <a:effectRef idx="0">
+            <a:schemeClr val="accent1"/>
+          </a:effectRef>
+          <a:fontRef idx="minor">
+            <a:schemeClr val="tx1"/>
+          </a:fontRef>
+        </p:style>
+      </p:cxnSp>
+      <p:sp>
+        <p:nvSpPr>
+          <p:cNvPr id="15" name="Rectangle: Rounded Corners 14">
+            <a:extLst>
+              <a:ext uri="{FF2B5EF4-FFF2-40B4-BE49-F238E27FC236}">
+                <a16:creationId xmlns:a16="http://schemas.microsoft.com/office/drawing/2014/main" id="{60024E6C-3043-4E18-A1D0-E132708E98D6}"/>
+              </a:ext>
+            </a:extLst>
+          </p:cNvPr>
+          <p:cNvSpPr/>
+          <p:nvPr/>
+        </p:nvSpPr>
+        <p:spPr>
+          <a:xfrm>
+            <a:off x="0" y="-393405"/>
+            <a:ext cx="1655545" cy="287079"/>
+          </a:xfrm>
+          <a:prstGeom prst="roundRect">
+            <a:avLst/>
+          </a:prstGeom>
+          <a:noFill/>
+          <a:ln>
+            <a:noFill/>
+          </a:ln>
+        </p:spPr>
+        <p:style>
+          <a:lnRef idx="2">
+            <a:schemeClr val="accent1">
+              <a:shade val="50000"/>
+            </a:schemeClr>
+          </a:lnRef>
+          <a:fillRef idx="1">
+            <a:schemeClr val="accent1"/>
+          </a:fillRef>
+          <a:effectRef idx="0">
+            <a:schemeClr val="accent1"/>
+          </a:effectRef>
+          <a:fontRef idx="minor">
+            <a:schemeClr val="lt1"/>
+          </a:fontRef>
+        </p:style>
+        <p:txBody>
+          <a:bodyPr rtlCol="0" anchor="ctr"/>
+          <a:lstStyle/>
+          <a:p>
+            <a:pPr algn="ctr"/>
+            <a:r>
+              <a:rPr lang="en-US" dirty="0">
+                <a:solidFill>
+                  <a:schemeClr val="tx1"/>
+                </a:solidFill>
+              </a:rPr>
+              <a:t>github.png</a:t>
+            </a:r>
+          </a:p>
+        </p:txBody>
+      </p:sp>
+      <p:pic>
+        <p:nvPicPr>
+          <p:cNvPr id="10" name="Picture 9">
+            <a:extLst>
+              <a:ext uri="{FF2B5EF4-FFF2-40B4-BE49-F238E27FC236}">
+                <a16:creationId xmlns:a16="http://schemas.microsoft.com/office/drawing/2014/main" id="{56DED18F-2A11-470A-8905-856E42586FC0}"/>
+              </a:ext>
+            </a:extLst>
+          </p:cNvPr>
+          <p:cNvPicPr>
+            <a:picLocks noChangeAspect="1"/>
+          </p:cNvPicPr>
+          <p:nvPr/>
+        </p:nvPicPr>
+        <p:blipFill>
+          <a:blip r:embed="rId3"/>
+          <a:stretch>
+            <a:fillRect/>
+          </a:stretch>
+        </p:blipFill>
+        <p:spPr>
+          <a:xfrm>
+            <a:off x="5368498" y="3429000"/>
+            <a:ext cx="6549433" cy="3219388"/>
+          </a:xfrm>
+          <a:prstGeom prst="rect">
+            <a:avLst/>
+          </a:prstGeom>
+          <a:ln>
+            <a:solidFill>
+              <a:schemeClr val="tx1"/>
+            </a:solidFill>
+          </a:ln>
+          <a:effectLst>
+            <a:outerShdw blurRad="50800" dist="38100" dir="2700000" algn="tl" rotWithShape="0">
+              <a:prstClr val="black">
+                <a:alpha val="40000"/>
+              </a:prstClr>
+            </a:outerShdw>
+          </a:effectLst>
+        </p:spPr>
+      </p:pic>
+    </p:spTree>
+    <p:extLst>
+      <p:ext uri="{BB962C8B-B14F-4D97-AF65-F5344CB8AC3E}">
+        <p14:creationId xmlns:p14="http://schemas.microsoft.com/office/powerpoint/2010/main" val="484632489"/>
+      </p:ext>
+    </p:extLst>
+  </p:cSld>
+  <p:clrMapOvr>
+    <a:masterClrMapping/>
+  </p:clrMapOvr>
+</p:sld>
+</file>
+
+<file path=ppt/slides/slide6.xml><?xml version="1.0" encoding="utf-8"?>
+<p:sld xmlns:a="http://schemas.openxmlformats.org/drawingml/2006/main" xmlns:r="http://schemas.openxmlformats.org/officeDocument/2006/relationships" xmlns:p="http://schemas.openxmlformats.org/presentationml/2006/main">
+  <p:cSld>
+    <p:spTree>
+      <p:nvGrpSpPr>
+        <p:cNvPr id="1" name=""/>
+        <p:cNvGrpSpPr/>
+        <p:nvPr/>
+      </p:nvGrpSpPr>
+      <p:grpSpPr>
+        <a:xfrm>
+          <a:off x="0" y="0"/>
+          <a:ext cx="0" cy="0"/>
+          <a:chOff x="0" y="0"/>
+          <a:chExt cx="0" cy="0"/>
+        </a:xfrm>
+      </p:grpSpPr>
+      <p:pic>
+        <p:nvPicPr>
+          <p:cNvPr id="5" name="Picture 4">
+            <a:extLst>
+              <a:ext uri="{FF2B5EF4-FFF2-40B4-BE49-F238E27FC236}">
+                <a16:creationId xmlns:a16="http://schemas.microsoft.com/office/drawing/2014/main" id="{1FFE2715-686B-4742-94F8-AAF43F7F276A}"/>
+              </a:ext>
+            </a:extLst>
+          </p:cNvPr>
+          <p:cNvPicPr>
+            <a:picLocks noChangeAspect="1"/>
+          </p:cNvPicPr>
+          <p:nvPr/>
+        </p:nvPicPr>
+        <p:blipFill>
+          <a:blip r:embed="rId2"/>
+          <a:stretch>
+            <a:fillRect/>
+          </a:stretch>
+        </p:blipFill>
+        <p:spPr>
+          <a:xfrm>
+            <a:off x="186720" y="199606"/>
+            <a:ext cx="6657712" cy="4348526"/>
+          </a:xfrm>
+          <a:prstGeom prst="rect">
+            <a:avLst/>
+          </a:prstGeom>
+          <a:ln>
+            <a:solidFill>
+              <a:schemeClr val="tx1"/>
+            </a:solidFill>
+          </a:ln>
+          <a:effectLst>
+            <a:outerShdw blurRad="50800" dist="38100" dir="2700000" algn="tl" rotWithShape="0">
+              <a:prstClr val="black">
+                <a:alpha val="40000"/>
+              </a:prstClr>
+            </a:outerShdw>
+          </a:effectLst>
+        </p:spPr>
+      </p:pic>
+      <p:sp>
+        <p:nvSpPr>
+          <p:cNvPr id="6" name="Oval 5">
+            <a:extLst>
+              <a:ext uri="{FF2B5EF4-FFF2-40B4-BE49-F238E27FC236}">
+                <a16:creationId xmlns:a16="http://schemas.microsoft.com/office/drawing/2014/main" id="{309EEC6E-B533-4C7C-9FB9-8935A0E64DB9}"/>
+              </a:ext>
+            </a:extLst>
+          </p:cNvPr>
+          <p:cNvSpPr/>
+          <p:nvPr/>
+        </p:nvSpPr>
+        <p:spPr>
+          <a:xfrm>
+            <a:off x="6010256" y="209612"/>
+            <a:ext cx="199199" cy="199701"/>
+          </a:xfrm>
+          <a:prstGeom prst="ellipse">
+            <a:avLst/>
+          </a:prstGeom>
+          <a:noFill/>
+          <a:ln w="28575">
+            <a:solidFill>
+              <a:srgbClr val="FF0000"/>
+            </a:solidFill>
+          </a:ln>
+        </p:spPr>
+        <p:style>
+          <a:lnRef idx="2">
+            <a:schemeClr val="accent1">
+              <a:shade val="50000"/>
+            </a:schemeClr>
+          </a:lnRef>
+          <a:fillRef idx="1">
+            <a:schemeClr val="accent1"/>
+          </a:fillRef>
+          <a:effectRef idx="0">
+            <a:schemeClr val="accent1"/>
+          </a:effectRef>
+          <a:fontRef idx="minor">
+            <a:schemeClr val="lt1"/>
+          </a:fontRef>
+        </p:style>
+        <p:txBody>
+          <a:bodyPr rtlCol="0" anchor="ctr"/>
+          <a:lstStyle/>
+          <a:p>
+            <a:pPr algn="ctr"/>
+            <a:endParaRPr lang="en-US"/>
+          </a:p>
+        </p:txBody>
+      </p:sp>
+      <p:cxnSp>
+        <p:nvCxnSpPr>
+          <p:cNvPr id="8" name="Straight Arrow Connector 7">
+            <a:extLst>
+              <a:ext uri="{FF2B5EF4-FFF2-40B4-BE49-F238E27FC236}">
+                <a16:creationId xmlns:a16="http://schemas.microsoft.com/office/drawing/2014/main" id="{E00FDCFA-85FC-4BB0-AFCB-AB115446B6EB}"/>
+              </a:ext>
+            </a:extLst>
+          </p:cNvPr>
+          <p:cNvCxnSpPr>
+            <a:cxnSpLocks/>
+            <a:stCxn id="6" idx="5"/>
+          </p:cNvCxnSpPr>
+          <p:nvPr/>
+        </p:nvCxnSpPr>
+        <p:spPr>
+          <a:xfrm>
+            <a:off x="6180283" y="380067"/>
+            <a:ext cx="1463659" cy="1993802"/>
+          </a:xfrm>
+          <a:prstGeom prst="straightConnector1">
+            <a:avLst/>
+          </a:prstGeom>
+          <a:ln w="28575">
+            <a:solidFill>
+              <a:srgbClr val="FF0000"/>
+            </a:solidFill>
+            <a:tailEnd type="triangle" w="lg" len="lg"/>
+          </a:ln>
+        </p:spPr>
+        <p:style>
+          <a:lnRef idx="1">
+            <a:schemeClr val="accent1"/>
+          </a:lnRef>
+          <a:fillRef idx="0">
+            <a:schemeClr val="accent1"/>
+          </a:fillRef>
+          <a:effectRef idx="0">
+            <a:schemeClr val="accent1"/>
+          </a:effectRef>
+          <a:fontRef idx="minor">
+            <a:schemeClr val="tx1"/>
+          </a:fontRef>
+        </p:style>
+      </p:cxnSp>
+      <p:sp>
+        <p:nvSpPr>
+          <p:cNvPr id="15" name="Rectangle: Rounded Corners 14">
+            <a:extLst>
+              <a:ext uri="{FF2B5EF4-FFF2-40B4-BE49-F238E27FC236}">
+                <a16:creationId xmlns:a16="http://schemas.microsoft.com/office/drawing/2014/main" id="{60024E6C-3043-4E18-A1D0-E132708E98D6}"/>
+              </a:ext>
+            </a:extLst>
+          </p:cNvPr>
+          <p:cNvSpPr/>
+          <p:nvPr/>
+        </p:nvSpPr>
+        <p:spPr>
+          <a:xfrm>
+            <a:off x="0" y="-393405"/>
+            <a:ext cx="1655545" cy="287079"/>
+          </a:xfrm>
+          <a:prstGeom prst="roundRect">
+            <a:avLst/>
+          </a:prstGeom>
+          <a:noFill/>
+          <a:ln>
+            <a:noFill/>
+          </a:ln>
+        </p:spPr>
+        <p:style>
+          <a:lnRef idx="2">
+            <a:schemeClr val="accent1">
+              <a:shade val="50000"/>
+            </a:schemeClr>
+          </a:lnRef>
+          <a:fillRef idx="1">
+            <a:schemeClr val="accent1"/>
+          </a:fillRef>
+          <a:effectRef idx="0">
+            <a:schemeClr val="accent1"/>
+          </a:effectRef>
+          <a:fontRef idx="minor">
+            <a:schemeClr val="lt1"/>
+          </a:fontRef>
+        </p:style>
+        <p:txBody>
+          <a:bodyPr rtlCol="0" anchor="ctr"/>
+          <a:lstStyle/>
+          <a:p>
+            <a:pPr algn="ctr"/>
+            <a:r>
+              <a:rPr lang="en-US" dirty="0">
+                <a:solidFill>
+                  <a:schemeClr val="tx1"/>
+                </a:solidFill>
+              </a:rPr>
+              <a:t>help.png</a:t>
+            </a:r>
+          </a:p>
+        </p:txBody>
+      </p:sp>
+      <p:pic>
+        <p:nvPicPr>
+          <p:cNvPr id="2" name="Picture 1">
+            <a:extLst>
+              <a:ext uri="{FF2B5EF4-FFF2-40B4-BE49-F238E27FC236}">
+                <a16:creationId xmlns:a16="http://schemas.microsoft.com/office/drawing/2014/main" id="{89DE1DAD-F8F9-4F53-B1DF-3C238DEA32DC}"/>
+              </a:ext>
+            </a:extLst>
+          </p:cNvPr>
+          <p:cNvPicPr>
+            <a:picLocks noChangeAspect="1"/>
+          </p:cNvPicPr>
+          <p:nvPr/>
+        </p:nvPicPr>
+        <p:blipFill>
+          <a:blip r:embed="rId3"/>
+          <a:stretch>
+            <a:fillRect/>
+          </a:stretch>
+        </p:blipFill>
+        <p:spPr>
+          <a:xfrm>
+            <a:off x="6378823" y="2373869"/>
+            <a:ext cx="5413806" cy="4178595"/>
+          </a:xfrm>
+          <a:prstGeom prst="rect">
+            <a:avLst/>
+          </a:prstGeom>
+          <a:ln>
+            <a:solidFill>
+              <a:schemeClr val="tx1"/>
+            </a:solidFill>
+          </a:ln>
+          <a:effectLst>
+            <a:outerShdw blurRad="50800" dist="38100" dir="2700000" algn="tl" rotWithShape="0">
+              <a:prstClr val="black">
+                <a:alpha val="40000"/>
+              </a:prstClr>
+            </a:outerShdw>
+          </a:effectLst>
+        </p:spPr>
+      </p:pic>
+    </p:spTree>
+    <p:extLst>
+      <p:ext uri="{BB962C8B-B14F-4D97-AF65-F5344CB8AC3E}">
+        <p14:creationId xmlns:p14="http://schemas.microsoft.com/office/powerpoint/2010/main" val="2628789977"/>
+      </p:ext>
+    </p:extLst>
+  </p:cSld>
+  <p:clrMapOvr>
+    <a:masterClrMapping/>
+  </p:clrMapOvr>
+</p:sld>
+</file>
+
+<file path=ppt/slides/slide7.xml><?xml version="1.0" encoding="utf-8"?>
+<p:sld xmlns:a="http://schemas.openxmlformats.org/drawingml/2006/main" xmlns:r="http://schemas.openxmlformats.org/officeDocument/2006/relationships" xmlns:p="http://schemas.openxmlformats.org/presentationml/2006/main">
+  <p:cSld>
+    <p:spTree>
+      <p:nvGrpSpPr>
+        <p:cNvPr id="1" name=""/>
+        <p:cNvGrpSpPr/>
+        <p:nvPr/>
+      </p:nvGrpSpPr>
+      <p:grpSpPr>
+        <a:xfrm>
+          <a:off x="0" y="0"/>
+          <a:ext cx="0" cy="0"/>
+          <a:chOff x="0" y="0"/>
+          <a:chExt cx="0" cy="0"/>
+        </a:xfrm>
+      </p:grpSpPr>
+      <p:pic>
+        <p:nvPicPr>
+          <p:cNvPr id="4" name="Picture 3">
+            <a:extLst>
+              <a:ext uri="{FF2B5EF4-FFF2-40B4-BE49-F238E27FC236}">
+                <a16:creationId xmlns:a16="http://schemas.microsoft.com/office/drawing/2014/main" id="{64F8CE30-F2F4-4CFB-8A11-90B99B4AE6D0}"/>
+              </a:ext>
+            </a:extLst>
+          </p:cNvPr>
+          <p:cNvPicPr>
+            <a:picLocks noChangeAspect="1"/>
+          </p:cNvPicPr>
+          <p:nvPr/>
+        </p:nvPicPr>
+        <p:blipFill>
+          <a:blip r:embed="rId2"/>
+          <a:stretch>
+            <a:fillRect/>
+          </a:stretch>
+        </p:blipFill>
+        <p:spPr>
+          <a:xfrm>
+            <a:off x="2050127" y="1286540"/>
+            <a:ext cx="8091746" cy="5215508"/>
+          </a:xfrm>
+          <a:prstGeom prst="rect">
+            <a:avLst/>
+          </a:prstGeom>
+          <a:ln>
+            <a:solidFill>
+              <a:schemeClr val="tx1"/>
+            </a:solidFill>
+          </a:ln>
+          <a:effectLst>
+            <a:outerShdw blurRad="50800" dist="38100" dir="2700000" algn="tl" rotWithShape="0">
+              <a:prstClr val="black">
+                <a:alpha val="40000"/>
+              </a:prstClr>
+            </a:outerShdw>
+          </a:effectLst>
+        </p:spPr>
+      </p:pic>
+      <p:cxnSp>
+        <p:nvCxnSpPr>
+          <p:cNvPr id="5" name="Straight Arrow Connector 4">
+            <a:extLst>
+              <a:ext uri="{FF2B5EF4-FFF2-40B4-BE49-F238E27FC236}">
+                <a16:creationId xmlns:a16="http://schemas.microsoft.com/office/drawing/2014/main" id="{19301885-C992-4BFD-B23D-3B86D98FE344}"/>
+              </a:ext>
+            </a:extLst>
+          </p:cNvPr>
+          <p:cNvCxnSpPr>
+            <a:cxnSpLocks/>
+            <a:stCxn id="6" idx="3"/>
+          </p:cNvCxnSpPr>
+          <p:nvPr/>
+        </p:nvCxnSpPr>
+        <p:spPr>
+          <a:xfrm>
+            <a:off x="3483931" y="659709"/>
+            <a:ext cx="719064" cy="1015872"/>
+          </a:xfrm>
+          <a:prstGeom prst="straightConnector1">
+            <a:avLst/>
+          </a:prstGeom>
+          <a:ln w="38100">
+            <a:solidFill>
+              <a:srgbClr val="FF0000"/>
+            </a:solidFill>
+            <a:tailEnd type="triangle" w="lg" len="lg"/>
+          </a:ln>
+        </p:spPr>
+        <p:style>
+          <a:lnRef idx="1">
+            <a:schemeClr val="accent1"/>
+          </a:lnRef>
+          <a:fillRef idx="0">
+            <a:schemeClr val="accent1"/>
+          </a:fillRef>
+          <a:effectRef idx="0">
+            <a:schemeClr val="accent1"/>
+          </a:effectRef>
+          <a:fontRef idx="minor">
+            <a:schemeClr val="tx1"/>
+          </a:fontRef>
+        </p:style>
+      </p:cxnSp>
+      <p:sp>
+        <p:nvSpPr>
+          <p:cNvPr id="6" name="Rectangle: Rounded Corners 5">
+            <a:extLst>
+              <a:ext uri="{FF2B5EF4-FFF2-40B4-BE49-F238E27FC236}">
+                <a16:creationId xmlns:a16="http://schemas.microsoft.com/office/drawing/2014/main" id="{60442951-E7F7-4F17-9AAA-CF44105AFCEF}"/>
+              </a:ext>
+            </a:extLst>
+          </p:cNvPr>
+          <p:cNvSpPr/>
+          <p:nvPr/>
+        </p:nvSpPr>
+        <p:spPr>
+          <a:xfrm>
+            <a:off x="1828386" y="313200"/>
+            <a:ext cx="1655545" cy="693018"/>
+          </a:xfrm>
+          <a:prstGeom prst="roundRect">
+            <a:avLst/>
+          </a:prstGeom>
+        </p:spPr>
+        <p:style>
+          <a:lnRef idx="2">
+            <a:schemeClr val="accent1">
+              <a:shade val="50000"/>
+            </a:schemeClr>
+          </a:lnRef>
+          <a:fillRef idx="1">
+            <a:schemeClr val="accent1"/>
+          </a:fillRef>
+          <a:effectRef idx="0">
+            <a:schemeClr val="accent1"/>
+          </a:effectRef>
+          <a:fontRef idx="minor">
+            <a:schemeClr val="lt1"/>
+          </a:fontRef>
+        </p:style>
+        <p:txBody>
+          <a:bodyPr rtlCol="0" anchor="ctr"/>
+          <a:lstStyle/>
+          <a:p>
+            <a:pPr algn="ctr"/>
+            <a:r>
+              <a:rPr lang="en-US" dirty="0"/>
+              <a:t>Parameters</a:t>
+            </a:r>
+          </a:p>
+        </p:txBody>
+      </p:sp>
+      <p:cxnSp>
+        <p:nvCxnSpPr>
+          <p:cNvPr id="7" name="Straight Arrow Connector 6">
+            <a:extLst>
+              <a:ext uri="{FF2B5EF4-FFF2-40B4-BE49-F238E27FC236}">
+                <a16:creationId xmlns:a16="http://schemas.microsoft.com/office/drawing/2014/main" id="{AE64E696-F98F-498C-B8D9-68D1A151B6D3}"/>
+              </a:ext>
+            </a:extLst>
+          </p:cNvPr>
+          <p:cNvCxnSpPr>
+            <a:cxnSpLocks/>
+            <a:stCxn id="8" idx="1"/>
+          </p:cNvCxnSpPr>
+          <p:nvPr/>
+        </p:nvCxnSpPr>
+        <p:spPr>
+          <a:xfrm flipH="1">
+            <a:off x="5858540" y="617177"/>
+            <a:ext cx="1080952" cy="1073400"/>
+          </a:xfrm>
+          <a:prstGeom prst="straightConnector1">
+            <a:avLst/>
+          </a:prstGeom>
+          <a:ln w="38100">
+            <a:solidFill>
+              <a:srgbClr val="FF0000"/>
+            </a:solidFill>
+            <a:tailEnd type="triangle" w="lg" len="lg"/>
+          </a:ln>
+        </p:spPr>
+        <p:style>
+          <a:lnRef idx="1">
+            <a:schemeClr val="accent1"/>
+          </a:lnRef>
+          <a:fillRef idx="0">
+            <a:schemeClr val="accent1"/>
+          </a:fillRef>
+          <a:effectRef idx="0">
+            <a:schemeClr val="accent1"/>
+          </a:effectRef>
+          <a:fontRef idx="minor">
+            <a:schemeClr val="tx1"/>
+          </a:fontRef>
+        </p:style>
+      </p:cxnSp>
+      <p:sp>
+        <p:nvSpPr>
+          <p:cNvPr id="8" name="Rectangle: Rounded Corners 7">
+            <a:extLst>
+              <a:ext uri="{FF2B5EF4-FFF2-40B4-BE49-F238E27FC236}">
+                <a16:creationId xmlns:a16="http://schemas.microsoft.com/office/drawing/2014/main" id="{74130138-4A21-4421-BABA-69DE7C945308}"/>
+              </a:ext>
+            </a:extLst>
+          </p:cNvPr>
+          <p:cNvSpPr/>
+          <p:nvPr/>
+        </p:nvSpPr>
+        <p:spPr>
+          <a:xfrm>
+            <a:off x="6939492" y="270668"/>
+            <a:ext cx="1655545" cy="693018"/>
+          </a:xfrm>
+          <a:prstGeom prst="roundRect">
+            <a:avLst/>
+          </a:prstGeom>
+        </p:spPr>
+        <p:style>
+          <a:lnRef idx="2">
+            <a:schemeClr val="accent1">
+              <a:shade val="50000"/>
+            </a:schemeClr>
+          </a:lnRef>
+          <a:fillRef idx="1">
+            <a:schemeClr val="accent1"/>
+          </a:fillRef>
+          <a:effectRef idx="0">
+            <a:schemeClr val="accent1"/>
+          </a:effectRef>
+          <a:fontRef idx="minor">
+            <a:schemeClr val="lt1"/>
+          </a:fontRef>
+        </p:style>
+        <p:txBody>
+          <a:bodyPr rtlCol="0" anchor="ctr"/>
+          <a:lstStyle/>
+          <a:p>
+            <a:pPr algn="ctr"/>
+            <a:r>
+              <a:rPr lang="en-US" dirty="0"/>
+              <a:t>Scenario</a:t>
+            </a:r>
+          </a:p>
+        </p:txBody>
+      </p:sp>
+      <p:cxnSp>
+        <p:nvCxnSpPr>
+          <p:cNvPr id="9" name="Straight Arrow Connector 8">
+            <a:extLst>
+              <a:ext uri="{FF2B5EF4-FFF2-40B4-BE49-F238E27FC236}">
+                <a16:creationId xmlns:a16="http://schemas.microsoft.com/office/drawing/2014/main" id="{E2A08EC7-9304-431B-B2B6-BBA8C99099EB}"/>
+              </a:ext>
+            </a:extLst>
+          </p:cNvPr>
+          <p:cNvCxnSpPr>
+            <a:cxnSpLocks/>
+            <a:stCxn id="10" idx="3"/>
+          </p:cNvCxnSpPr>
+          <p:nvPr/>
+        </p:nvCxnSpPr>
+        <p:spPr>
+          <a:xfrm>
+            <a:off x="1828366" y="2870567"/>
+            <a:ext cx="914834" cy="558433"/>
+          </a:xfrm>
+          <a:prstGeom prst="straightConnector1">
+            <a:avLst/>
+          </a:prstGeom>
+          <a:ln w="38100">
+            <a:solidFill>
+              <a:srgbClr val="FF0000"/>
+            </a:solidFill>
+            <a:tailEnd type="triangle" w="lg" len="lg"/>
+          </a:ln>
+        </p:spPr>
+        <p:style>
+          <a:lnRef idx="1">
+            <a:schemeClr val="accent1"/>
+          </a:lnRef>
+          <a:fillRef idx="0">
+            <a:schemeClr val="accent1"/>
+          </a:fillRef>
+          <a:effectRef idx="0">
+            <a:schemeClr val="accent1"/>
+          </a:effectRef>
+          <a:fontRef idx="minor">
+            <a:schemeClr val="tx1"/>
+          </a:fontRef>
+        </p:style>
+      </p:cxnSp>
+      <p:sp>
+        <p:nvSpPr>
+          <p:cNvPr id="10" name="Rectangle: Rounded Corners 9">
+            <a:extLst>
+              <a:ext uri="{FF2B5EF4-FFF2-40B4-BE49-F238E27FC236}">
+                <a16:creationId xmlns:a16="http://schemas.microsoft.com/office/drawing/2014/main" id="{89BE0015-B150-4AE1-BFBC-31EB761F205B}"/>
+              </a:ext>
+            </a:extLst>
+          </p:cNvPr>
+          <p:cNvSpPr/>
+          <p:nvPr/>
+        </p:nvSpPr>
+        <p:spPr>
+          <a:xfrm>
+            <a:off x="172821" y="2524058"/>
+            <a:ext cx="1655545" cy="693018"/>
+          </a:xfrm>
+          <a:prstGeom prst="roundRect">
+            <a:avLst/>
+          </a:prstGeom>
+        </p:spPr>
+        <p:style>
+          <a:lnRef idx="2">
+            <a:schemeClr val="accent1">
+              <a:shade val="50000"/>
+            </a:schemeClr>
+          </a:lnRef>
+          <a:fillRef idx="1">
+            <a:schemeClr val="accent1"/>
+          </a:fillRef>
+          <a:effectRef idx="0">
+            <a:schemeClr val="accent1"/>
+          </a:effectRef>
+          <a:fontRef idx="minor">
+            <a:schemeClr val="lt1"/>
+          </a:fontRef>
+        </p:style>
+        <p:txBody>
+          <a:bodyPr rtlCol="0" anchor="ctr"/>
+          <a:lstStyle/>
+          <a:p>
+            <a:pPr algn="ctr"/>
+            <a:r>
+              <a:rPr lang="en-US" dirty="0"/>
+              <a:t>Overview Map</a:t>
+            </a:r>
+          </a:p>
+        </p:txBody>
+      </p:sp>
+      <p:cxnSp>
+        <p:nvCxnSpPr>
+          <p:cNvPr id="12" name="Straight Arrow Connector 11">
+            <a:extLst>
+              <a:ext uri="{FF2B5EF4-FFF2-40B4-BE49-F238E27FC236}">
+                <a16:creationId xmlns:a16="http://schemas.microsoft.com/office/drawing/2014/main" id="{FB016482-40EE-4D8E-A843-C9D48FB7A002}"/>
+              </a:ext>
+            </a:extLst>
+          </p:cNvPr>
+          <p:cNvCxnSpPr>
+            <a:cxnSpLocks/>
+            <a:stCxn id="13" idx="1"/>
+          </p:cNvCxnSpPr>
+          <p:nvPr/>
+        </p:nvCxnSpPr>
+        <p:spPr>
+          <a:xfrm flipH="1">
+            <a:off x="9775881" y="3888104"/>
+            <a:ext cx="587753" cy="346509"/>
+          </a:xfrm>
+          <a:prstGeom prst="straightConnector1">
+            <a:avLst/>
+          </a:prstGeom>
+          <a:ln w="38100">
+            <a:solidFill>
+              <a:srgbClr val="FF0000"/>
+            </a:solidFill>
+            <a:tailEnd type="triangle" w="lg" len="lg"/>
+          </a:ln>
+        </p:spPr>
+        <p:style>
+          <a:lnRef idx="1">
+            <a:schemeClr val="accent1"/>
+          </a:lnRef>
+          <a:fillRef idx="0">
+            <a:schemeClr val="accent1"/>
+          </a:fillRef>
+          <a:effectRef idx="0">
+            <a:schemeClr val="accent1"/>
+          </a:effectRef>
+          <a:fontRef idx="minor">
+            <a:schemeClr val="tx1"/>
+          </a:fontRef>
+        </p:style>
+      </p:cxnSp>
+      <p:sp>
+        <p:nvSpPr>
+          <p:cNvPr id="13" name="Rectangle: Rounded Corners 12">
+            <a:extLst>
+              <a:ext uri="{FF2B5EF4-FFF2-40B4-BE49-F238E27FC236}">
+                <a16:creationId xmlns:a16="http://schemas.microsoft.com/office/drawing/2014/main" id="{EF25369F-2E5E-4DF9-AEDE-5EB6C6CAB1A1}"/>
+              </a:ext>
+            </a:extLst>
+          </p:cNvPr>
+          <p:cNvSpPr/>
+          <p:nvPr/>
+        </p:nvSpPr>
+        <p:spPr>
+          <a:xfrm>
+            <a:off x="10363634" y="3541595"/>
+            <a:ext cx="1655545" cy="693018"/>
+          </a:xfrm>
+          <a:prstGeom prst="roundRect">
+            <a:avLst/>
+          </a:prstGeom>
+        </p:spPr>
+        <p:style>
+          <a:lnRef idx="2">
+            <a:schemeClr val="accent1">
+              <a:shade val="50000"/>
+            </a:schemeClr>
+          </a:lnRef>
+          <a:fillRef idx="1">
+            <a:schemeClr val="accent1"/>
+          </a:fillRef>
+          <a:effectRef idx="0">
+            <a:schemeClr val="accent1"/>
+          </a:effectRef>
+          <a:fontRef idx="minor">
+            <a:schemeClr val="lt1"/>
+          </a:fontRef>
+        </p:style>
+        <p:txBody>
+          <a:bodyPr rtlCol="0" anchor="ctr"/>
+          <a:lstStyle/>
+          <a:p>
+            <a:pPr algn="ctr"/>
+            <a:r>
+              <a:rPr lang="en-US" dirty="0"/>
+              <a:t>Comparative Charts</a:t>
+            </a:r>
+          </a:p>
+        </p:txBody>
+      </p:sp>
+      <p:cxnSp>
+        <p:nvCxnSpPr>
+          <p:cNvPr id="18" name="Straight Arrow Connector 17">
+            <a:extLst>
+              <a:ext uri="{FF2B5EF4-FFF2-40B4-BE49-F238E27FC236}">
+                <a16:creationId xmlns:a16="http://schemas.microsoft.com/office/drawing/2014/main" id="{06DD44B2-0FC4-4CE6-8F9B-3F95ADA505E5}"/>
+              </a:ext>
+            </a:extLst>
+          </p:cNvPr>
+          <p:cNvCxnSpPr>
+            <a:cxnSpLocks/>
+            <a:stCxn id="13" idx="1"/>
+          </p:cNvCxnSpPr>
+          <p:nvPr/>
+        </p:nvCxnSpPr>
+        <p:spPr>
+          <a:xfrm flipH="1" flipV="1">
+            <a:off x="9775881" y="3451218"/>
+            <a:ext cx="587753" cy="436886"/>
+          </a:xfrm>
+          <a:prstGeom prst="straightConnector1">
+            <a:avLst/>
+          </a:prstGeom>
+          <a:ln w="38100">
+            <a:solidFill>
+              <a:srgbClr val="FF0000"/>
+            </a:solidFill>
+            <a:tailEnd type="triangle" w="lg" len="lg"/>
+          </a:ln>
+        </p:spPr>
+        <p:style>
+          <a:lnRef idx="1">
+            <a:schemeClr val="accent1"/>
+          </a:lnRef>
+          <a:fillRef idx="0">
+            <a:schemeClr val="accent1"/>
+          </a:fillRef>
+          <a:effectRef idx="0">
+            <a:schemeClr val="accent1"/>
+          </a:effectRef>
+          <a:fontRef idx="minor">
+            <a:schemeClr val="tx1"/>
+          </a:fontRef>
+        </p:style>
+      </p:cxnSp>
+      <p:sp>
+        <p:nvSpPr>
+          <p:cNvPr id="28" name="Rectangle: Rounded Corners 27">
+            <a:extLst>
+              <a:ext uri="{FF2B5EF4-FFF2-40B4-BE49-F238E27FC236}">
+                <a16:creationId xmlns:a16="http://schemas.microsoft.com/office/drawing/2014/main" id="{E6EC7CD0-884F-4D71-AA6C-CA003E63FF4B}"/>
+              </a:ext>
+            </a:extLst>
+          </p:cNvPr>
+          <p:cNvSpPr/>
+          <p:nvPr/>
+        </p:nvSpPr>
+        <p:spPr>
+          <a:xfrm>
+            <a:off x="0" y="-393405"/>
+            <a:ext cx="1655545" cy="287079"/>
+          </a:xfrm>
+          <a:prstGeom prst="roundRect">
+            <a:avLst/>
+          </a:prstGeom>
+          <a:noFill/>
+          <a:ln>
+            <a:noFill/>
+          </a:ln>
+        </p:spPr>
+        <p:style>
+          <a:lnRef idx="2">
+            <a:schemeClr val="accent1">
+              <a:shade val="50000"/>
+            </a:schemeClr>
+          </a:lnRef>
+          <a:fillRef idx="1">
+            <a:schemeClr val="accent1"/>
+          </a:fillRef>
+          <a:effectRef idx="0">
+            <a:schemeClr val="accent1"/>
+          </a:effectRef>
+          <a:fontRef idx="minor">
+            <a:schemeClr val="lt1"/>
+          </a:fontRef>
+        </p:style>
+        <p:txBody>
+          <a:bodyPr rtlCol="0" anchor="ctr"/>
+          <a:lstStyle/>
+          <a:p>
+            <a:pPr algn="ctr"/>
+            <a:r>
+              <a:rPr lang="en-US" dirty="0">
+                <a:solidFill>
+                  <a:schemeClr val="tx1"/>
+                </a:solidFill>
+              </a:rPr>
+              <a:t>focus.png</a:t>
+            </a:r>
+          </a:p>
+        </p:txBody>
+      </p:sp>
+      <p:cxnSp>
+        <p:nvCxnSpPr>
+          <p:cNvPr id="14" name="Straight Arrow Connector 13">
+            <a:extLst>
+              <a:ext uri="{FF2B5EF4-FFF2-40B4-BE49-F238E27FC236}">
+                <a16:creationId xmlns:a16="http://schemas.microsoft.com/office/drawing/2014/main" id="{72FFE272-EE55-4EB7-85A8-419BFE8A11A8}"/>
+              </a:ext>
+            </a:extLst>
+          </p:cNvPr>
+          <p:cNvCxnSpPr>
+            <a:cxnSpLocks/>
+            <a:stCxn id="15" idx="3"/>
+          </p:cNvCxnSpPr>
+          <p:nvPr/>
+        </p:nvCxnSpPr>
+        <p:spPr>
+          <a:xfrm>
+            <a:off x="1796138" y="1449549"/>
+            <a:ext cx="381983" cy="379250"/>
+          </a:xfrm>
+          <a:prstGeom prst="straightConnector1">
+            <a:avLst/>
+          </a:prstGeom>
+          <a:ln w="28575">
+            <a:solidFill>
+              <a:srgbClr val="FF0000"/>
+            </a:solidFill>
+            <a:tailEnd type="triangle" w="lg" len="lg"/>
+          </a:ln>
+        </p:spPr>
+        <p:style>
+          <a:lnRef idx="1">
+            <a:schemeClr val="accent1"/>
+          </a:lnRef>
+          <a:fillRef idx="0">
+            <a:schemeClr val="accent1"/>
+          </a:fillRef>
+          <a:effectRef idx="0">
+            <a:schemeClr val="accent1"/>
+          </a:effectRef>
+          <a:fontRef idx="minor">
+            <a:schemeClr val="tx1"/>
+          </a:fontRef>
+        </p:style>
+      </p:cxnSp>
+      <p:sp>
+        <p:nvSpPr>
+          <p:cNvPr id="15" name="Rectangle: Rounded Corners 14">
+            <a:extLst>
+              <a:ext uri="{FF2B5EF4-FFF2-40B4-BE49-F238E27FC236}">
+                <a16:creationId xmlns:a16="http://schemas.microsoft.com/office/drawing/2014/main" id="{020E3A7D-7882-464A-B190-7F94E7D2D6C3}"/>
+              </a:ext>
+            </a:extLst>
+          </p:cNvPr>
+          <p:cNvSpPr/>
+          <p:nvPr/>
+        </p:nvSpPr>
+        <p:spPr>
+          <a:xfrm>
+            <a:off x="172821" y="1172147"/>
+            <a:ext cx="1623317" cy="554804"/>
+          </a:xfrm>
+          <a:prstGeom prst="roundRect">
+            <a:avLst/>
+          </a:prstGeom>
+        </p:spPr>
+        <p:style>
+          <a:lnRef idx="2">
+            <a:schemeClr val="accent1">
+              <a:shade val="50000"/>
+            </a:schemeClr>
+          </a:lnRef>
+          <a:fillRef idx="1">
+            <a:schemeClr val="accent1"/>
+          </a:fillRef>
+          <a:effectRef idx="0">
+            <a:schemeClr val="accent1"/>
+          </a:effectRef>
+          <a:fontRef idx="minor">
+            <a:schemeClr val="lt1"/>
+          </a:fontRef>
+        </p:style>
+        <p:txBody>
+          <a:bodyPr rtlCol="0" anchor="ctr"/>
+          <a:lstStyle/>
+          <a:p>
+            <a:pPr algn="ctr"/>
+            <a:r>
+              <a:rPr lang="en-US" dirty="0"/>
+              <a:t>Year Scrollbar</a:t>
+            </a:r>
+          </a:p>
+        </p:txBody>
+      </p:sp>
+    </p:spTree>
+    <p:extLst>
+      <p:ext uri="{BB962C8B-B14F-4D97-AF65-F5344CB8AC3E}">
+        <p14:creationId xmlns:p14="http://schemas.microsoft.com/office/powerpoint/2010/main" val="461853123"/>
+      </p:ext>
+    </p:extLst>
+  </p:cSld>
+  <p:clrMapOvr>
+    <a:masterClrMapping/>
+  </p:clrMapOvr>
+</p:sld>
+</file>
+
+<file path=ppt/slides/slide8.xml><?xml version="1.0" encoding="utf-8"?>
+<p:sld xmlns:a="http://schemas.openxmlformats.org/drawingml/2006/main" xmlns:r="http://schemas.openxmlformats.org/officeDocument/2006/relationships" xmlns:p="http://schemas.openxmlformats.org/presentationml/2006/main">
+  <p:cSld>
+    <p:spTree>
+      <p:nvGrpSpPr>
+        <p:cNvPr id="1" name=""/>
+        <p:cNvGrpSpPr/>
+        <p:nvPr/>
+      </p:nvGrpSpPr>
+      <p:grpSpPr>
+        <a:xfrm>
+          <a:off x="0" y="0"/>
+          <a:ext cx="0" cy="0"/>
+          <a:chOff x="0" y="0"/>
+          <a:chExt cx="0" cy="0"/>
+        </a:xfrm>
+      </p:grpSpPr>
+      <p:pic>
+        <p:nvPicPr>
+          <p:cNvPr id="4" name="Picture 3">
+            <a:extLst>
+              <a:ext uri="{FF2B5EF4-FFF2-40B4-BE49-F238E27FC236}">
+                <a16:creationId xmlns:a16="http://schemas.microsoft.com/office/drawing/2014/main" id="{74EA4701-B880-4923-B0FC-7B26BAAFE50C}"/>
+              </a:ext>
+            </a:extLst>
+          </p:cNvPr>
+          <p:cNvPicPr>
+            <a:picLocks noChangeAspect="1"/>
+          </p:cNvPicPr>
+          <p:nvPr/>
+        </p:nvPicPr>
+        <p:blipFill>
+          <a:blip r:embed="rId2"/>
+          <a:stretch>
+            <a:fillRect/>
+          </a:stretch>
+        </p:blipFill>
+        <p:spPr>
+          <a:xfrm>
+            <a:off x="1914342" y="1184465"/>
+            <a:ext cx="8363311" cy="5360951"/>
+          </a:xfrm>
+          <a:prstGeom prst="rect">
+            <a:avLst/>
+          </a:prstGeom>
+          <a:ln>
+            <a:solidFill>
+              <a:schemeClr val="tx1"/>
+            </a:solidFill>
+          </a:ln>
+          <a:effectLst>
+            <a:outerShdw blurRad="50800" dist="38100" dir="2700000" algn="tl" rotWithShape="0">
+              <a:prstClr val="black">
+                <a:alpha val="40000"/>
+              </a:prstClr>
+            </a:outerShdw>
+          </a:effectLst>
+        </p:spPr>
+      </p:pic>
+      <p:sp>
+        <p:nvSpPr>
+          <p:cNvPr id="5" name="Rectangle: Rounded Corners 4">
+            <a:extLst>
+              <a:ext uri="{FF2B5EF4-FFF2-40B4-BE49-F238E27FC236}">
+                <a16:creationId xmlns:a16="http://schemas.microsoft.com/office/drawing/2014/main" id="{502D5E9F-5F23-4796-9DE9-8E73BB0E2110}"/>
+              </a:ext>
+            </a:extLst>
+          </p:cNvPr>
+          <p:cNvSpPr/>
+          <p:nvPr/>
+        </p:nvSpPr>
+        <p:spPr>
+          <a:xfrm>
+            <a:off x="0" y="-393405"/>
+            <a:ext cx="1655545" cy="287079"/>
+          </a:xfrm>
+          <a:prstGeom prst="roundRect">
+            <a:avLst/>
+          </a:prstGeom>
+          <a:noFill/>
+          <a:ln>
+            <a:noFill/>
+          </a:ln>
+        </p:spPr>
+        <p:style>
+          <a:lnRef idx="2">
+            <a:schemeClr val="accent1">
+              <a:shade val="50000"/>
+            </a:schemeClr>
+          </a:lnRef>
+          <a:fillRef idx="1">
+            <a:schemeClr val="accent1"/>
+          </a:fillRef>
+          <a:effectRef idx="0">
+            <a:schemeClr val="accent1"/>
+          </a:effectRef>
+          <a:fontRef idx="minor">
+            <a:schemeClr val="lt1"/>
+          </a:fontRef>
+        </p:style>
+        <p:txBody>
+          <a:bodyPr rtlCol="0" anchor="ctr"/>
+          <a:lstStyle/>
+          <a:p>
+            <a:pPr algn="ctr"/>
+            <a:r>
+              <a:rPr lang="en-US" dirty="0">
+                <a:solidFill>
+                  <a:schemeClr val="tx1"/>
+                </a:solidFill>
+              </a:rPr>
+              <a:t>line_all.png</a:t>
+            </a:r>
+          </a:p>
+        </p:txBody>
+      </p:sp>
+      <p:cxnSp>
+        <p:nvCxnSpPr>
+          <p:cNvPr id="6" name="Straight Arrow Connector 5">
+            <a:extLst>
+              <a:ext uri="{FF2B5EF4-FFF2-40B4-BE49-F238E27FC236}">
+                <a16:creationId xmlns:a16="http://schemas.microsoft.com/office/drawing/2014/main" id="{6145C5E8-BFF0-4388-B8E8-C2A1EA3E1015}"/>
+              </a:ext>
+            </a:extLst>
+          </p:cNvPr>
+          <p:cNvCxnSpPr>
+            <a:cxnSpLocks/>
+            <a:stCxn id="13" idx="3"/>
+          </p:cNvCxnSpPr>
+          <p:nvPr/>
+        </p:nvCxnSpPr>
+        <p:spPr>
+          <a:xfrm flipV="1">
+            <a:off x="1655545" y="2424231"/>
+            <a:ext cx="1534222" cy="978194"/>
+          </a:xfrm>
+          <a:prstGeom prst="straightConnector1">
+            <a:avLst/>
+          </a:prstGeom>
+          <a:ln w="28575">
+            <a:solidFill>
+              <a:srgbClr val="FF0000"/>
+            </a:solidFill>
+            <a:tailEnd type="triangle" w="lg" len="lg"/>
+          </a:ln>
+        </p:spPr>
+        <p:style>
+          <a:lnRef idx="1">
+            <a:schemeClr val="accent1"/>
+          </a:lnRef>
+          <a:fillRef idx="0">
+            <a:schemeClr val="accent1"/>
+          </a:fillRef>
+          <a:effectRef idx="0">
+            <a:schemeClr val="accent1"/>
+          </a:effectRef>
+          <a:fontRef idx="minor">
+            <a:schemeClr val="tx1"/>
+          </a:fontRef>
+        </p:style>
+      </p:cxnSp>
+      <p:cxnSp>
+        <p:nvCxnSpPr>
+          <p:cNvPr id="10" name="Straight Arrow Connector 9">
+            <a:extLst>
+              <a:ext uri="{FF2B5EF4-FFF2-40B4-BE49-F238E27FC236}">
+                <a16:creationId xmlns:a16="http://schemas.microsoft.com/office/drawing/2014/main" id="{B5958D04-163C-4CE8-8462-09D8B5EB6857}"/>
+              </a:ext>
+            </a:extLst>
+          </p:cNvPr>
+          <p:cNvCxnSpPr>
+            <a:cxnSpLocks/>
+            <a:stCxn id="13" idx="3"/>
+          </p:cNvCxnSpPr>
+          <p:nvPr/>
+        </p:nvCxnSpPr>
+        <p:spPr>
+          <a:xfrm>
+            <a:off x="1655545" y="3402425"/>
+            <a:ext cx="1534222" cy="1105786"/>
+          </a:xfrm>
+          <a:prstGeom prst="straightConnector1">
+            <a:avLst/>
+          </a:prstGeom>
+          <a:ln w="28575">
+            <a:solidFill>
+              <a:srgbClr val="FF0000"/>
+            </a:solidFill>
+            <a:tailEnd type="triangle" w="lg" len="lg"/>
+          </a:ln>
+        </p:spPr>
+        <p:style>
+          <a:lnRef idx="1">
+            <a:schemeClr val="accent1"/>
+          </a:lnRef>
+          <a:fillRef idx="0">
+            <a:schemeClr val="accent1"/>
+          </a:fillRef>
+          <a:effectRef idx="0">
+            <a:schemeClr val="accent1"/>
+          </a:effectRef>
+          <a:fontRef idx="minor">
+            <a:schemeClr val="tx1"/>
+          </a:fontRef>
+        </p:style>
+      </p:cxnSp>
+      <p:sp>
+        <p:nvSpPr>
+          <p:cNvPr id="13" name="Rectangle: Rounded Corners 12">
+            <a:extLst>
+              <a:ext uri="{FF2B5EF4-FFF2-40B4-BE49-F238E27FC236}">
+                <a16:creationId xmlns:a16="http://schemas.microsoft.com/office/drawing/2014/main" id="{F9416B15-6BD6-41F9-939E-27047604DA22}"/>
+              </a:ext>
+            </a:extLst>
+          </p:cNvPr>
+          <p:cNvSpPr/>
+          <p:nvPr/>
+        </p:nvSpPr>
+        <p:spPr>
+          <a:xfrm>
+            <a:off x="186340" y="3044113"/>
+            <a:ext cx="1469205" cy="716623"/>
+          </a:xfrm>
+          <a:prstGeom prst="roundRect">
+            <a:avLst/>
+          </a:prstGeom>
+        </p:spPr>
+        <p:style>
+          <a:lnRef idx="2">
+            <a:schemeClr val="accent1">
+              <a:shade val="50000"/>
+            </a:schemeClr>
+          </a:lnRef>
+          <a:fillRef idx="1">
+            <a:schemeClr val="accent1"/>
+          </a:fillRef>
+          <a:effectRef idx="0">
+            <a:schemeClr val="accent1"/>
+          </a:effectRef>
+          <a:fontRef idx="minor">
+            <a:schemeClr val="lt1"/>
+          </a:fontRef>
+        </p:style>
+        <p:txBody>
+          <a:bodyPr rtlCol="0" anchor="ctr"/>
+          <a:lstStyle/>
+          <a:p>
+            <a:pPr algn="ctr"/>
+            <a:r>
+              <a:rPr lang="en-US" dirty="0"/>
+              <a:t>Different Parameters</a:t>
+            </a:r>
+          </a:p>
+        </p:txBody>
+      </p:sp>
+      <p:cxnSp>
+        <p:nvCxnSpPr>
+          <p:cNvPr id="19" name="Straight Arrow Connector 18">
+            <a:extLst>
+              <a:ext uri="{FF2B5EF4-FFF2-40B4-BE49-F238E27FC236}">
+                <a16:creationId xmlns:a16="http://schemas.microsoft.com/office/drawing/2014/main" id="{8234379A-9F29-4792-A0F3-F08639A9B75F}"/>
+              </a:ext>
+            </a:extLst>
+          </p:cNvPr>
+          <p:cNvCxnSpPr>
+            <a:cxnSpLocks/>
+            <a:stCxn id="22" idx="2"/>
+          </p:cNvCxnSpPr>
+          <p:nvPr/>
+        </p:nvCxnSpPr>
+        <p:spPr>
+          <a:xfrm>
+            <a:off x="6096000" y="1029207"/>
+            <a:ext cx="0" cy="1044142"/>
+          </a:xfrm>
+          <a:prstGeom prst="straightConnector1">
+            <a:avLst/>
+          </a:prstGeom>
+          <a:ln w="28575">
+            <a:solidFill>
+              <a:srgbClr val="FF0000"/>
+            </a:solidFill>
+            <a:tailEnd type="triangle" w="lg" len="lg"/>
+          </a:ln>
+        </p:spPr>
+        <p:style>
+          <a:lnRef idx="1">
+            <a:schemeClr val="accent1"/>
+          </a:lnRef>
+          <a:fillRef idx="0">
+            <a:schemeClr val="accent1"/>
+          </a:fillRef>
+          <a:effectRef idx="0">
+            <a:schemeClr val="accent1"/>
+          </a:effectRef>
+          <a:fontRef idx="minor">
+            <a:schemeClr val="tx1"/>
+          </a:fontRef>
+        </p:style>
+      </p:cxnSp>
+      <p:sp>
+        <p:nvSpPr>
+          <p:cNvPr id="22" name="Rectangle: Rounded Corners 21">
+            <a:extLst>
+              <a:ext uri="{FF2B5EF4-FFF2-40B4-BE49-F238E27FC236}">
+                <a16:creationId xmlns:a16="http://schemas.microsoft.com/office/drawing/2014/main" id="{10240B6C-B525-4FD7-96AA-0A18F8870D38}"/>
+              </a:ext>
+            </a:extLst>
+          </p:cNvPr>
+          <p:cNvSpPr/>
+          <p:nvPr/>
+        </p:nvSpPr>
+        <p:spPr>
+          <a:xfrm>
+            <a:off x="5361397" y="312584"/>
+            <a:ext cx="1469205" cy="716623"/>
+          </a:xfrm>
+          <a:prstGeom prst="roundRect">
+            <a:avLst/>
+          </a:prstGeom>
+        </p:spPr>
+        <p:style>
+          <a:lnRef idx="2">
+            <a:schemeClr val="accent1">
+              <a:shade val="50000"/>
+            </a:schemeClr>
+          </a:lnRef>
+          <a:fillRef idx="1">
+            <a:schemeClr val="accent1"/>
+          </a:fillRef>
+          <a:effectRef idx="0">
+            <a:schemeClr val="accent1"/>
+          </a:effectRef>
+          <a:fontRef idx="minor">
+            <a:schemeClr val="lt1"/>
+          </a:fontRef>
+        </p:style>
+        <p:txBody>
+          <a:bodyPr rtlCol="0" anchor="ctr"/>
+          <a:lstStyle/>
+          <a:p>
+            <a:pPr algn="ctr"/>
+            <a:r>
+              <a:rPr lang="en-US" dirty="0"/>
+              <a:t>Different Scenarios</a:t>
+            </a:r>
+          </a:p>
+        </p:txBody>
+      </p:sp>
+      <p:cxnSp>
+        <p:nvCxnSpPr>
+          <p:cNvPr id="25" name="Straight Arrow Connector 24">
+            <a:extLst>
+              <a:ext uri="{FF2B5EF4-FFF2-40B4-BE49-F238E27FC236}">
+                <a16:creationId xmlns:a16="http://schemas.microsoft.com/office/drawing/2014/main" id="{9AE123D5-87F9-4A48-96B5-D720F95F19A2}"/>
+              </a:ext>
+            </a:extLst>
+          </p:cNvPr>
+          <p:cNvCxnSpPr>
+            <a:cxnSpLocks/>
+            <a:stCxn id="26" idx="1"/>
+          </p:cNvCxnSpPr>
+          <p:nvPr/>
+        </p:nvCxnSpPr>
+        <p:spPr>
+          <a:xfrm flipH="1">
+            <a:off x="10108503" y="1858488"/>
+            <a:ext cx="527180" cy="4360"/>
+          </a:xfrm>
+          <a:prstGeom prst="straightConnector1">
+            <a:avLst/>
+          </a:prstGeom>
+          <a:ln w="28575">
+            <a:solidFill>
+              <a:srgbClr val="FF0000"/>
+            </a:solidFill>
+            <a:tailEnd type="triangle" w="lg" len="lg"/>
+          </a:ln>
+        </p:spPr>
+        <p:style>
+          <a:lnRef idx="1">
+            <a:schemeClr val="accent1"/>
+          </a:lnRef>
+          <a:fillRef idx="0">
+            <a:schemeClr val="accent1"/>
+          </a:fillRef>
+          <a:effectRef idx="0">
+            <a:schemeClr val="accent1"/>
+          </a:effectRef>
+          <a:fontRef idx="minor">
+            <a:schemeClr val="tx1"/>
+          </a:fontRef>
+        </p:style>
+      </p:cxnSp>
+      <p:sp>
+        <p:nvSpPr>
+          <p:cNvPr id="26" name="Rectangle: Rounded Corners 25">
+            <a:extLst>
+              <a:ext uri="{FF2B5EF4-FFF2-40B4-BE49-F238E27FC236}">
+                <a16:creationId xmlns:a16="http://schemas.microsoft.com/office/drawing/2014/main" id="{61CF5170-280F-4805-97ED-980F25508C91}"/>
+              </a:ext>
+            </a:extLst>
+          </p:cNvPr>
+          <p:cNvSpPr/>
+          <p:nvPr/>
+        </p:nvSpPr>
+        <p:spPr>
+          <a:xfrm>
+            <a:off x="10635683" y="1496712"/>
+            <a:ext cx="1469206" cy="723551"/>
+          </a:xfrm>
+          <a:prstGeom prst="roundRect">
+            <a:avLst/>
+          </a:prstGeom>
+        </p:spPr>
+        <p:style>
+          <a:lnRef idx="2">
+            <a:schemeClr val="accent1">
+              <a:shade val="50000"/>
+            </a:schemeClr>
+          </a:lnRef>
+          <a:fillRef idx="1">
+            <a:schemeClr val="accent1"/>
+          </a:fillRef>
+          <a:effectRef idx="0">
+            <a:schemeClr val="accent1"/>
+          </a:effectRef>
+          <a:fontRef idx="minor">
+            <a:schemeClr val="lt1"/>
+          </a:fontRef>
+        </p:style>
+        <p:txBody>
+          <a:bodyPr rtlCol="0" anchor="ctr"/>
+          <a:lstStyle/>
+          <a:p>
+            <a:pPr algn="ctr"/>
+            <a:r>
+              <a:rPr lang="en-US" dirty="0"/>
+              <a:t>Download Page</a:t>
+            </a:r>
+          </a:p>
+        </p:txBody>
+      </p:sp>
+    </p:spTree>
+    <p:extLst>
+      <p:ext uri="{BB962C8B-B14F-4D97-AF65-F5344CB8AC3E}">
+        <p14:creationId xmlns:p14="http://schemas.microsoft.com/office/powerpoint/2010/main" val="2794040311"/>
+      </p:ext>
+    </p:extLst>
+  </p:cSld>
+  <p:clrMapOvr>
+    <a:masterClrMapping/>
+  </p:clrMapOvr>
+</p:sld>
+</file>
+
+<file path=ppt/slides/slide9.xml><?xml version="1.0" encoding="utf-8"?>
+<p:sld xmlns:a="http://schemas.openxmlformats.org/drawingml/2006/main" xmlns:r="http://schemas.openxmlformats.org/officeDocument/2006/relationships" xmlns:p="http://schemas.openxmlformats.org/presentationml/2006/main">
+  <p:cSld>
+    <p:spTree>
+      <p:nvGrpSpPr>
+        <p:cNvPr id="1" name=""/>
+        <p:cNvGrpSpPr/>
+        <p:nvPr/>
+      </p:nvGrpSpPr>
+      <p:grpSpPr>
+        <a:xfrm>
+          <a:off x="0" y="0"/>
+          <a:ext cx="0" cy="0"/>
+          <a:chOff x="0" y="0"/>
+          <a:chExt cx="0" cy="0"/>
+        </a:xfrm>
+      </p:grpSpPr>
+      <p:pic>
+        <p:nvPicPr>
+          <p:cNvPr id="4" name="Picture 3">
+            <a:extLst>
+              <a:ext uri="{FF2B5EF4-FFF2-40B4-BE49-F238E27FC236}">
+                <a16:creationId xmlns:a16="http://schemas.microsoft.com/office/drawing/2014/main" id="{CA6B5FAA-74C2-4FAC-817F-8A7966E3803E}"/>
+              </a:ext>
+            </a:extLst>
+          </p:cNvPr>
+          <p:cNvPicPr>
+            <a:picLocks noChangeAspect="1"/>
+          </p:cNvPicPr>
+          <p:nvPr/>
+        </p:nvPicPr>
+        <p:blipFill>
+          <a:blip r:embed="rId2"/>
+          <a:stretch>
+            <a:fillRect/>
+          </a:stretch>
+        </p:blipFill>
+        <p:spPr>
+          <a:xfrm>
+            <a:off x="1462151" y="319569"/>
+            <a:ext cx="9267698" cy="6218862"/>
+          </a:xfrm>
+          <a:prstGeom prst="rect">
+            <a:avLst/>
+          </a:prstGeom>
+          <a:ln>
+            <a:solidFill>
+              <a:schemeClr val="tx1"/>
+            </a:solidFill>
+          </a:ln>
+          <a:effectLst>
+            <a:outerShdw blurRad="50800" dist="38100" dir="2700000" algn="tl" rotWithShape="0">
+              <a:prstClr val="black">
+                <a:alpha val="40000"/>
+              </a:prstClr>
+            </a:outerShdw>
+          </a:effectLst>
+        </p:spPr>
+      </p:pic>
+      <p:sp>
+        <p:nvSpPr>
+          <p:cNvPr id="5" name="Rectangle: Rounded Corners 4">
+            <a:extLst>
+              <a:ext uri="{FF2B5EF4-FFF2-40B4-BE49-F238E27FC236}">
+                <a16:creationId xmlns:a16="http://schemas.microsoft.com/office/drawing/2014/main" id="{E266D1AB-E202-44FE-976E-4E83816CCE54}"/>
+              </a:ext>
+            </a:extLst>
+          </p:cNvPr>
+          <p:cNvSpPr/>
+          <p:nvPr/>
+        </p:nvSpPr>
+        <p:spPr>
+          <a:xfrm>
+            <a:off x="0" y="-393405"/>
+            <a:ext cx="1655545" cy="287079"/>
+          </a:xfrm>
+          <a:prstGeom prst="roundRect">
+            <a:avLst/>
+          </a:prstGeom>
+          <a:noFill/>
+          <a:ln>
+            <a:noFill/>
+          </a:ln>
+        </p:spPr>
+        <p:style>
+          <a:lnRef idx="2">
+            <a:schemeClr val="accent1">
+              <a:shade val="50000"/>
+            </a:schemeClr>
+          </a:lnRef>
+          <a:fillRef idx="1">
+            <a:schemeClr val="accent1"/>
+          </a:fillRef>
+          <a:effectRef idx="0">
+            <a:schemeClr val="accent1"/>
+          </a:effectRef>
+          <a:fontRef idx="minor">
+            <a:schemeClr val="lt1"/>
+          </a:fontRef>
+        </p:style>
+        <p:txBody>
+          <a:bodyPr rtlCol="0" anchor="ctr"/>
+          <a:lstStyle/>
+          <a:p>
+            <a:pPr algn="ctr"/>
+            <a:r>
+              <a:rPr lang="en-US" dirty="0">
+                <a:solidFill>
+                  <a:schemeClr val="tx1"/>
+                </a:solidFill>
+              </a:rPr>
+              <a:t>line_comp.png</a:t>
+            </a:r>
+          </a:p>
+        </p:txBody>
+      </p:sp>
+    </p:spTree>
+    <p:extLst>
+      <p:ext uri="{BB962C8B-B14F-4D97-AF65-F5344CB8AC3E}">
+        <p14:creationId xmlns:p14="http://schemas.microsoft.com/office/powerpoint/2010/main" val="1000259057"/>
       </p:ext>
     </p:extLst>
   </p:cSld>

</xml_diff>

<commit_message>
Update vignette and add data story
</commit_message>
<xml_diff>
--- a/vignettes/vignetteFigs/00vignetteFigs.pptx
+++ b/vignettes/vignetteFigs/00vignetteFigs.pptx
@@ -5,7 +5,7 @@
     <p:sldMasterId id="2147483648" r:id="rId1"/>
   </p:sldMasterIdLst>
   <p:notesMasterIdLst>
-    <p:notesMasterId r:id="rId17"/>
+    <p:notesMasterId r:id="rId18"/>
   </p:notesMasterIdLst>
   <p:sldIdLst>
     <p:sldId id="256" r:id="rId2"/>
@@ -23,6 +23,7 @@
     <p:sldId id="271" r:id="rId14"/>
     <p:sldId id="268" r:id="rId15"/>
     <p:sldId id="317" r:id="rId16"/>
+    <p:sldId id="318" r:id="rId17"/>
   </p:sldIdLst>
   <p:sldSz cx="12192000" cy="6858000"/>
   <p:notesSz cx="6858000" cy="9144000"/>
@@ -211,7 +212,7 @@
           <a:p>
             <a:fld id="{921607FB-4AF3-41D9-93C1-AF2B65302971}" type="datetimeFigureOut">
               <a:rPr lang="en-US" smtClean="0"/>
-              <a:t>8/3/2021</a:t>
+              <a:t>9/30/2021</a:t>
             </a:fld>
             <a:endParaRPr lang="en-US"/>
           </a:p>
@@ -607,7 +608,7 @@
           <a:p>
             <a:fld id="{11D67388-0790-496E-9A12-37055489AF4F}" type="datetimeFigureOut">
               <a:rPr lang="en-US" smtClean="0"/>
-              <a:t>8/3/2021</a:t>
+              <a:t>9/30/2021</a:t>
             </a:fld>
             <a:endParaRPr lang="en-US"/>
           </a:p>
@@ -775,7 +776,7 @@
           <a:p>
             <a:fld id="{11D67388-0790-496E-9A12-37055489AF4F}" type="datetimeFigureOut">
               <a:rPr lang="en-US" smtClean="0"/>
-              <a:t>8/3/2021</a:t>
+              <a:t>9/30/2021</a:t>
             </a:fld>
             <a:endParaRPr lang="en-US"/>
           </a:p>
@@ -953,7 +954,7 @@
           <a:p>
             <a:fld id="{11D67388-0790-496E-9A12-37055489AF4F}" type="datetimeFigureOut">
               <a:rPr lang="en-US" smtClean="0"/>
-              <a:t>8/3/2021</a:t>
+              <a:t>9/30/2021</a:t>
             </a:fld>
             <a:endParaRPr lang="en-US"/>
           </a:p>
@@ -1121,7 +1122,7 @@
           <a:p>
             <a:fld id="{11D67388-0790-496E-9A12-37055489AF4F}" type="datetimeFigureOut">
               <a:rPr lang="en-US" smtClean="0"/>
-              <a:t>8/3/2021</a:t>
+              <a:t>9/30/2021</a:t>
             </a:fld>
             <a:endParaRPr lang="en-US"/>
           </a:p>
@@ -1366,7 +1367,7 @@
           <a:p>
             <a:fld id="{11D67388-0790-496E-9A12-37055489AF4F}" type="datetimeFigureOut">
               <a:rPr lang="en-US" smtClean="0"/>
-              <a:t>8/3/2021</a:t>
+              <a:t>9/30/2021</a:t>
             </a:fld>
             <a:endParaRPr lang="en-US"/>
           </a:p>
@@ -1595,7 +1596,7 @@
           <a:p>
             <a:fld id="{11D67388-0790-496E-9A12-37055489AF4F}" type="datetimeFigureOut">
               <a:rPr lang="en-US" smtClean="0"/>
-              <a:t>8/3/2021</a:t>
+              <a:t>9/30/2021</a:t>
             </a:fld>
             <a:endParaRPr lang="en-US"/>
           </a:p>
@@ -1959,7 +1960,7 @@
           <a:p>
             <a:fld id="{11D67388-0790-496E-9A12-37055489AF4F}" type="datetimeFigureOut">
               <a:rPr lang="en-US" smtClean="0"/>
-              <a:t>8/3/2021</a:t>
+              <a:t>9/30/2021</a:t>
             </a:fld>
             <a:endParaRPr lang="en-US"/>
           </a:p>
@@ -2076,7 +2077,7 @@
           <a:p>
             <a:fld id="{11D67388-0790-496E-9A12-37055489AF4F}" type="datetimeFigureOut">
               <a:rPr lang="en-US" smtClean="0"/>
-              <a:t>8/3/2021</a:t>
+              <a:t>9/30/2021</a:t>
             </a:fld>
             <a:endParaRPr lang="en-US"/>
           </a:p>
@@ -2171,7 +2172,7 @@
           <a:p>
             <a:fld id="{11D67388-0790-496E-9A12-37055489AF4F}" type="datetimeFigureOut">
               <a:rPr lang="en-US" smtClean="0"/>
-              <a:t>8/3/2021</a:t>
+              <a:t>9/30/2021</a:t>
             </a:fld>
             <a:endParaRPr lang="en-US"/>
           </a:p>
@@ -2446,7 +2447,7 @@
           <a:p>
             <a:fld id="{11D67388-0790-496E-9A12-37055489AF4F}" type="datetimeFigureOut">
               <a:rPr lang="en-US" smtClean="0"/>
-              <a:t>8/3/2021</a:t>
+              <a:t>9/30/2021</a:t>
             </a:fld>
             <a:endParaRPr lang="en-US"/>
           </a:p>
@@ -2698,7 +2699,7 @@
           <a:p>
             <a:fld id="{11D67388-0790-496E-9A12-37055489AF4F}" type="datetimeFigureOut">
               <a:rPr lang="en-US" smtClean="0"/>
-              <a:t>8/3/2021</a:t>
+              <a:t>9/30/2021</a:t>
             </a:fld>
             <a:endParaRPr lang="en-US"/>
           </a:p>
@@ -2909,7 +2910,7 @@
           <a:p>
             <a:fld id="{11D67388-0790-496E-9A12-37055489AF4F}" type="datetimeFigureOut">
               <a:rPr lang="en-US" smtClean="0"/>
-              <a:t>8/3/2021</a:t>
+              <a:t>9/30/2021</a:t>
             </a:fld>
             <a:endParaRPr lang="en-US"/>
           </a:p>
@@ -3316,31 +3317,38 @@
       </p:grpSpPr>
       <p:pic>
         <p:nvPicPr>
-          <p:cNvPr id="4" name="Picture 3">
+          <p:cNvPr id="1032" name="Picture 8">
             <a:extLst>
               <a:ext uri="{FF2B5EF4-FFF2-40B4-BE49-F238E27FC236}">
-                <a16:creationId xmlns:a16="http://schemas.microsoft.com/office/drawing/2014/main" id="{17B22F9E-9DB2-446D-8094-478566A323C4}"/>
+                <a16:creationId xmlns:a16="http://schemas.microsoft.com/office/drawing/2014/main" id="{FFA070EA-DA13-4A3C-9ABF-9AEEC8681417}"/>
               </a:ext>
             </a:extLst>
           </p:cNvPr>
           <p:cNvPicPr>
-            <a:picLocks noChangeAspect="1"/>
+            <a:picLocks noChangeAspect="1" noChangeArrowheads="1"/>
           </p:cNvPicPr>
           <p:nvPr/>
         </p:nvPicPr>
         <p:blipFill rotWithShape="1">
-          <a:blip r:embed="rId2"/>
-          <a:srcRect t="2246"/>
+          <a:blip r:embed="rId2">
+            <a:extLst>
+              <a:ext uri="{28A0092B-C50C-407E-A947-70E740481C1C}">
+                <a14:useLocalDpi xmlns:a14="http://schemas.microsoft.com/office/drawing/2010/main" val="0"/>
+              </a:ext>
+            </a:extLst>
+          </a:blip>
+          <a:srcRect b="4154"/>
           <a:stretch/>
         </p:blipFill>
-        <p:spPr>
+        <p:spPr bwMode="auto">
           <a:xfrm>
-            <a:off x="2208933" y="723752"/>
-            <a:ext cx="7774134" cy="5410496"/>
+            <a:off x="2125334" y="734801"/>
+            <a:ext cx="7931799" cy="5266552"/>
           </a:xfrm>
           <a:prstGeom prst="rect">
             <a:avLst/>
           </a:prstGeom>
+          <a:noFill/>
           <a:ln>
             <a:solidFill>
               <a:schemeClr val="tx1"/>
@@ -3353,6 +3361,15 @@
               </a:prstClr>
             </a:outerShdw>
           </a:effectLst>
+          <a:extLst>
+            <a:ext uri="{909E8E84-426E-40DD-AFC4-6F175D3DCCD1}">
+              <a14:hiddenFill xmlns:a14="http://schemas.microsoft.com/office/drawing/2010/main">
+                <a:solidFill>
+                  <a:srgbClr val="FFFFFF"/>
+                </a:solidFill>
+              </a14:hiddenFill>
+            </a:ext>
+          </a:extLst>
         </p:spPr>
       </p:pic>
       <p:cxnSp>
@@ -3366,13 +3383,14 @@
           </p:cNvPr>
           <p:cNvCxnSpPr>
             <a:cxnSpLocks/>
+            <a:stCxn id="8" idx="1"/>
           </p:cNvCxnSpPr>
           <p:nvPr/>
         </p:nvCxnSpPr>
         <p:spPr>
-          <a:xfrm flipH="1">
-            <a:off x="9872241" y="856647"/>
-            <a:ext cx="614949" cy="0"/>
+          <a:xfrm flipH="1" flipV="1">
+            <a:off x="9978502" y="856647"/>
+            <a:ext cx="387906" cy="4598"/>
           </a:xfrm>
           <a:prstGeom prst="straightConnector1">
             <a:avLst/>
@@ -3466,7 +3484,7 @@
         <p:spPr>
           <a:xfrm>
             <a:off x="1828366" y="510139"/>
-            <a:ext cx="1126590" cy="346509"/>
+            <a:ext cx="985855" cy="346508"/>
           </a:xfrm>
           <a:prstGeom prst="straightConnector1">
             <a:avLst/>
@@ -3560,8 +3578,8 @@
         </p:nvCxnSpPr>
         <p:spPr>
           <a:xfrm flipV="1">
-            <a:off x="1825592" y="3549006"/>
-            <a:ext cx="506642" cy="1702"/>
+            <a:off x="1825592" y="3465390"/>
+            <a:ext cx="411581" cy="14294"/>
           </a:xfrm>
           <a:prstGeom prst="straightConnector1">
             <a:avLst/>
@@ -3602,7 +3620,7 @@
         </p:nvSpPr>
         <p:spPr>
           <a:xfrm>
-            <a:off x="170047" y="3204199"/>
+            <a:off x="170047" y="3133175"/>
             <a:ext cx="1655545" cy="693018"/>
           </a:xfrm>
           <a:prstGeom prst="roundRect">
@@ -3708,8 +3726,8 @@
         </p:nvSpPr>
         <p:spPr>
           <a:xfrm>
-            <a:off x="2332234" y="1027416"/>
-            <a:ext cx="7540007" cy="5043179"/>
+            <a:off x="2237173" y="1000496"/>
+            <a:ext cx="7741328" cy="4929787"/>
           </a:xfrm>
           <a:prstGeom prst="rect">
             <a:avLst/>
@@ -3778,32 +3796,40 @@
       </p:grpSpPr>
       <p:pic>
         <p:nvPicPr>
-          <p:cNvPr id="4" name="Picture 3">
+          <p:cNvPr id="6150" name="Picture 6">
             <a:extLst>
               <a:ext uri="{FF2B5EF4-FFF2-40B4-BE49-F238E27FC236}">
-                <a16:creationId xmlns:a16="http://schemas.microsoft.com/office/drawing/2014/main" id="{74EA4701-B880-4923-B0FC-7B26BAAFE50C}"/>
+                <a16:creationId xmlns:a16="http://schemas.microsoft.com/office/drawing/2014/main" id="{29CD8232-8127-42D3-9A39-00FC778D8598}"/>
               </a:ext>
             </a:extLst>
           </p:cNvPr>
           <p:cNvPicPr>
-            <a:picLocks noChangeAspect="1"/>
+            <a:picLocks noChangeAspect="1" noChangeArrowheads="1"/>
           </p:cNvPicPr>
           <p:nvPr/>
         </p:nvPicPr>
         <p:blipFill>
-          <a:blip r:embed="rId2"/>
+          <a:blip r:embed="rId2">
+            <a:extLst>
+              <a:ext uri="{28A0092B-C50C-407E-A947-70E740481C1C}">
+                <a14:useLocalDpi xmlns:a14="http://schemas.microsoft.com/office/drawing/2010/main" val="0"/>
+              </a:ext>
+            </a:extLst>
+          </a:blip>
+          <a:srcRect/>
           <a:stretch>
             <a:fillRect/>
           </a:stretch>
         </p:blipFill>
-        <p:spPr>
+        <p:spPr bwMode="auto">
           <a:xfrm>
-            <a:off x="1914342" y="1184465"/>
-            <a:ext cx="8363311" cy="5360951"/>
+            <a:off x="2125736" y="1169067"/>
+            <a:ext cx="8258667" cy="5422927"/>
           </a:xfrm>
           <a:prstGeom prst="rect">
             <a:avLst/>
           </a:prstGeom>
+          <a:noFill/>
           <a:ln>
             <a:solidFill>
               <a:schemeClr val="tx1"/>
@@ -3816,6 +3842,15 @@
               </a:prstClr>
             </a:outerShdw>
           </a:effectLst>
+          <a:extLst>
+            <a:ext uri="{909E8E84-426E-40DD-AFC4-6F175D3DCCD1}">
+              <a14:hiddenFill xmlns:a14="http://schemas.microsoft.com/office/drawing/2010/main">
+                <a:solidFill>
+                  <a:srgbClr val="FFFFFF"/>
+                </a:solidFill>
+              </a14:hiddenFill>
+            </a:ext>
+          </a:extLst>
         </p:spPr>
       </p:pic>
       <p:sp>
@@ -3892,8 +3927,8 @@
         </p:nvCxnSpPr>
         <p:spPr>
           <a:xfrm flipV="1">
-            <a:off x="1655545" y="2424231"/>
-            <a:ext cx="1534222" cy="978194"/>
+            <a:off x="1855909" y="2725449"/>
+            <a:ext cx="1031406" cy="881167"/>
           </a:xfrm>
           <a:prstGeom prst="straightConnector1">
             <a:avLst/>
@@ -3936,9 +3971,9 @@
           <p:nvPr/>
         </p:nvCxnSpPr>
         <p:spPr>
-          <a:xfrm>
-            <a:off x="1655545" y="3402425"/>
-            <a:ext cx="1534222" cy="1105786"/>
+          <a:xfrm flipV="1">
+            <a:off x="1855909" y="2725449"/>
+            <a:ext cx="3798889" cy="881167"/>
           </a:xfrm>
           <a:prstGeom prst="straightConnector1">
             <a:avLst/>
@@ -3979,7 +4014,7 @@
         </p:nvSpPr>
         <p:spPr>
           <a:xfrm>
-            <a:off x="186340" y="3044113"/>
+            <a:off x="386704" y="3248304"/>
             <a:ext cx="1469205" cy="716623"/>
           </a:xfrm>
           <a:prstGeom prst="roundRect">
@@ -4031,7 +4066,7 @@
         <p:spPr>
           <a:xfrm>
             <a:off x="5059490" y="1029206"/>
-            <a:ext cx="542320" cy="1030413"/>
+            <a:ext cx="708207" cy="1236783"/>
           </a:xfrm>
           <a:prstGeom prst="straightConnector1">
             <a:avLst/>
@@ -4123,9 +4158,9 @@
           <p:nvPr/>
         </p:nvCxnSpPr>
         <p:spPr>
-          <a:xfrm flipH="1">
-            <a:off x="10108503" y="1858488"/>
-            <a:ext cx="527180" cy="4360"/>
+          <a:xfrm flipH="1" flipV="1">
+            <a:off x="10246453" y="1619540"/>
+            <a:ext cx="389230" cy="1"/>
           </a:xfrm>
           <a:prstGeom prst="straightConnector1">
             <a:avLst/>
@@ -4166,7 +4201,7 @@
         </p:nvSpPr>
         <p:spPr>
           <a:xfrm>
-            <a:off x="10635683" y="1496712"/>
+            <a:off x="10635683" y="1257765"/>
             <a:ext cx="1469206" cy="723551"/>
           </a:xfrm>
           <a:prstGeom prst="roundRect">
@@ -4266,8 +4301,8 @@
         </p:nvCxnSpPr>
         <p:spPr>
           <a:xfrm flipH="1">
-            <a:off x="6611077" y="1029206"/>
-            <a:ext cx="461740" cy="613163"/>
+            <a:off x="6717826" y="1029206"/>
+            <a:ext cx="354991" cy="467506"/>
           </a:xfrm>
           <a:prstGeom prst="straightConnector1">
             <a:avLst/>
@@ -4324,91 +4359,42 @@
           <a:chExt cx="0" cy="0"/>
         </a:xfrm>
       </p:grpSpPr>
-      <p:sp>
-        <p:nvSpPr>
-          <p:cNvPr id="4" name="Rectangle: Rounded Corners 3">
-            <a:extLst>
-              <a:ext uri="{FF2B5EF4-FFF2-40B4-BE49-F238E27FC236}">
-                <a16:creationId xmlns:a16="http://schemas.microsoft.com/office/drawing/2014/main" id="{E442DCD7-FFA6-4F0D-9386-7A7F1E5660C6}"/>
-              </a:ext>
-            </a:extLst>
-          </p:cNvPr>
-          <p:cNvSpPr/>
-          <p:nvPr/>
-        </p:nvSpPr>
-        <p:spPr>
-          <a:xfrm>
-            <a:off x="0" y="-393405"/>
-            <a:ext cx="1655545" cy="287079"/>
-          </a:xfrm>
-          <a:prstGeom prst="roundRect">
-            <a:avLst/>
-          </a:prstGeom>
-          <a:noFill/>
-          <a:ln>
-            <a:noFill/>
-          </a:ln>
-        </p:spPr>
-        <p:style>
-          <a:lnRef idx="2">
-            <a:schemeClr val="accent1">
-              <a:shade val="50000"/>
-            </a:schemeClr>
-          </a:lnRef>
-          <a:fillRef idx="1">
-            <a:schemeClr val="accent1"/>
-          </a:fillRef>
-          <a:effectRef idx="0">
-            <a:schemeClr val="accent1"/>
-          </a:effectRef>
-          <a:fontRef idx="minor">
-            <a:schemeClr val="lt1"/>
-          </a:fontRef>
-        </p:style>
-        <p:txBody>
-          <a:bodyPr rtlCol="0" anchor="ctr"/>
-          <a:lstStyle/>
-          <a:p>
-            <a:pPr algn="ctr"/>
-            <a:r>
-              <a:rPr lang="en-US" dirty="0">
-                <a:solidFill>
-                  <a:schemeClr val="tx1"/>
-                </a:solidFill>
-              </a:rPr>
-              <a:t>charts.png</a:t>
-            </a:r>
-          </a:p>
-        </p:txBody>
-      </p:sp>
       <p:pic>
         <p:nvPicPr>
-          <p:cNvPr id="5" name="Picture 4">
+          <p:cNvPr id="8194" name="Picture 2">
             <a:extLst>
               <a:ext uri="{FF2B5EF4-FFF2-40B4-BE49-F238E27FC236}">
-                <a16:creationId xmlns:a16="http://schemas.microsoft.com/office/drawing/2014/main" id="{5C441D3C-00D7-4ACD-A628-4EEFB188FCC2}"/>
+                <a16:creationId xmlns:a16="http://schemas.microsoft.com/office/drawing/2014/main" id="{BF73C8EA-24C3-48D8-9563-49ECABC10C19}"/>
               </a:ext>
             </a:extLst>
           </p:cNvPr>
           <p:cNvPicPr>
-            <a:picLocks noChangeAspect="1"/>
+            <a:picLocks noChangeAspect="1" noChangeArrowheads="1"/>
           </p:cNvPicPr>
           <p:nvPr/>
         </p:nvPicPr>
         <p:blipFill>
-          <a:blip r:embed="rId2"/>
+          <a:blip r:embed="rId2">
+            <a:extLst>
+              <a:ext uri="{28A0092B-C50C-407E-A947-70E740481C1C}">
+                <a14:useLocalDpi xmlns:a14="http://schemas.microsoft.com/office/drawing/2010/main" val="0"/>
+              </a:ext>
+            </a:extLst>
+          </a:blip>
+          <a:srcRect/>
           <a:stretch>
             <a:fillRect/>
           </a:stretch>
         </p:blipFill>
-        <p:spPr>
+        <p:spPr bwMode="auto">
           <a:xfrm>
-            <a:off x="2198822" y="1205502"/>
-            <a:ext cx="7962319" cy="5283461"/>
+            <a:off x="2102782" y="1242316"/>
+            <a:ext cx="7798459" cy="5496712"/>
           </a:xfrm>
           <a:prstGeom prst="rect">
             <a:avLst/>
           </a:prstGeom>
+          <a:noFill/>
           <a:ln>
             <a:solidFill>
               <a:schemeClr val="tx1"/>
@@ -4421,14 +4407,23 @@
               </a:prstClr>
             </a:outerShdw>
           </a:effectLst>
+          <a:extLst>
+            <a:ext uri="{909E8E84-426E-40DD-AFC4-6F175D3DCCD1}">
+              <a14:hiddenFill xmlns:a14="http://schemas.microsoft.com/office/drawing/2010/main">
+                <a:solidFill>
+                  <a:srgbClr val="FFFFFF"/>
+                </a:solidFill>
+              </a14:hiddenFill>
+            </a:ext>
+          </a:extLst>
         </p:spPr>
       </p:pic>
       <p:sp>
         <p:nvSpPr>
-          <p:cNvPr id="6" name="Rectangle: Rounded Corners 5">
+          <p:cNvPr id="4" name="Rectangle: Rounded Corners 3">
             <a:extLst>
               <a:ext uri="{FF2B5EF4-FFF2-40B4-BE49-F238E27FC236}">
-                <a16:creationId xmlns:a16="http://schemas.microsoft.com/office/drawing/2014/main" id="{F92C74C7-5E6E-4A7E-B022-16B9734BE4E4}"/>
+                <a16:creationId xmlns:a16="http://schemas.microsoft.com/office/drawing/2014/main" id="{E442DCD7-FFA6-4F0D-9386-7A7F1E5660C6}"/>
               </a:ext>
             </a:extLst>
           </p:cNvPr>
@@ -4437,12 +4432,16 @@
         </p:nvSpPr>
         <p:spPr>
           <a:xfrm>
-            <a:off x="94025" y="3820700"/>
-            <a:ext cx="1469205" cy="716623"/>
+            <a:off x="0" y="-393405"/>
+            <a:ext cx="1655545" cy="287079"/>
           </a:xfrm>
           <a:prstGeom prst="roundRect">
             <a:avLst/>
           </a:prstGeom>
+          <a:noFill/>
+          <a:ln>
+            <a:noFill/>
+          </a:ln>
         </p:spPr>
         <p:style>
           <a:lnRef idx="2">
@@ -4466,6 +4465,59 @@
           <a:p>
             <a:pPr algn="ctr"/>
             <a:r>
+              <a:rPr lang="en-US" dirty="0">
+                <a:solidFill>
+                  <a:schemeClr val="tx1"/>
+                </a:solidFill>
+              </a:rPr>
+              <a:t>charts.png</a:t>
+            </a:r>
+          </a:p>
+        </p:txBody>
+      </p:sp>
+      <p:sp>
+        <p:nvSpPr>
+          <p:cNvPr id="6" name="Rectangle: Rounded Corners 5">
+            <a:extLst>
+              <a:ext uri="{FF2B5EF4-FFF2-40B4-BE49-F238E27FC236}">
+                <a16:creationId xmlns:a16="http://schemas.microsoft.com/office/drawing/2014/main" id="{F92C74C7-5E6E-4A7E-B022-16B9734BE4E4}"/>
+              </a:ext>
+            </a:extLst>
+          </p:cNvPr>
+          <p:cNvSpPr/>
+          <p:nvPr/>
+        </p:nvSpPr>
+        <p:spPr>
+          <a:xfrm>
+            <a:off x="106397" y="3891721"/>
+            <a:ext cx="1469205" cy="716623"/>
+          </a:xfrm>
+          <a:prstGeom prst="roundRect">
+            <a:avLst/>
+          </a:prstGeom>
+        </p:spPr>
+        <p:style>
+          <a:lnRef idx="2">
+            <a:schemeClr val="accent1">
+              <a:shade val="50000"/>
+            </a:schemeClr>
+          </a:lnRef>
+          <a:fillRef idx="1">
+            <a:schemeClr val="accent1"/>
+          </a:fillRef>
+          <a:effectRef idx="0">
+            <a:schemeClr val="accent1"/>
+          </a:effectRef>
+          <a:fontRef idx="minor">
+            <a:schemeClr val="lt1"/>
+          </a:fontRef>
+        </p:style>
+        <p:txBody>
+          <a:bodyPr rtlCol="0" anchor="ctr"/>
+          <a:lstStyle/>
+          <a:p>
+            <a:pPr algn="ctr"/>
+            <a:r>
               <a:rPr lang="en-US" dirty="0"/>
               <a:t>Different Parameters</a:t>
             </a:r>
@@ -4489,7 +4541,7 @@
         </p:nvCxnSpPr>
         <p:spPr>
           <a:xfrm flipV="1">
-            <a:off x="1563230" y="3295436"/>
+            <a:off x="1575602" y="3366457"/>
             <a:ext cx="738181" cy="883576"/>
           </a:xfrm>
           <a:prstGeom prst="straightConnector1">
@@ -4534,8 +4586,8 @@
         </p:nvCxnSpPr>
         <p:spPr>
           <a:xfrm>
-            <a:off x="1563230" y="4179012"/>
-            <a:ext cx="738181" cy="850603"/>
+            <a:off x="1575602" y="4250033"/>
+            <a:ext cx="738181" cy="978914"/>
           </a:xfrm>
           <a:prstGeom prst="straightConnector1">
             <a:avLst/>
@@ -4579,8 +4631,8 @@
         </p:nvCxnSpPr>
         <p:spPr>
           <a:xfrm flipH="1">
-            <a:off x="9901241" y="1660052"/>
-            <a:ext cx="527180" cy="4360"/>
+            <a:off x="9708500" y="1677807"/>
+            <a:ext cx="505754" cy="0"/>
           </a:xfrm>
           <a:prstGeom prst="straightConnector1">
             <a:avLst/>
@@ -4621,7 +4673,7 @@
         </p:nvSpPr>
         <p:spPr>
           <a:xfrm>
-            <a:off x="10428421" y="1298276"/>
+            <a:off x="10214254" y="1316031"/>
             <a:ext cx="1469206" cy="723551"/>
           </a:xfrm>
           <a:prstGeom prst="roundRect">
@@ -4674,7 +4726,7 @@
         <p:spPr>
           <a:xfrm flipH="1">
             <a:off x="3850102" y="1095939"/>
-            <a:ext cx="734603" cy="1020540"/>
+            <a:ext cx="734603" cy="1230011"/>
           </a:xfrm>
           <a:prstGeom prst="straightConnector1">
             <a:avLst/>
@@ -4719,7 +4771,7 @@
         <p:spPr>
           <a:xfrm>
             <a:off x="4584705" y="1095939"/>
-            <a:ext cx="915616" cy="1020540"/>
+            <a:ext cx="1011396" cy="1230011"/>
           </a:xfrm>
           <a:prstGeom prst="straightConnector1">
             <a:avLst/>
@@ -4809,7 +4861,7 @@
         </p:nvSpPr>
         <p:spPr>
           <a:xfrm>
-            <a:off x="5664052" y="1777432"/>
+            <a:off x="5541349" y="1577523"/>
             <a:ext cx="1651148" cy="213573"/>
           </a:xfrm>
           <a:prstGeom prst="roundRect">
@@ -4914,8 +4966,8 @@
         </p:nvCxnSpPr>
         <p:spPr>
           <a:xfrm flipH="1">
-            <a:off x="6489626" y="737628"/>
-            <a:ext cx="1196237" cy="1039804"/>
+            <a:off x="6366923" y="737628"/>
+            <a:ext cx="1318940" cy="839895"/>
           </a:xfrm>
           <a:prstGeom prst="straightConnector1">
             <a:avLst/>
@@ -4974,32 +5026,40 @@
       </p:grpSpPr>
       <p:pic>
         <p:nvPicPr>
-          <p:cNvPr id="4" name="Picture 3">
+          <p:cNvPr id="9220" name="Picture 4">
             <a:extLst>
               <a:ext uri="{FF2B5EF4-FFF2-40B4-BE49-F238E27FC236}">
-                <a16:creationId xmlns:a16="http://schemas.microsoft.com/office/drawing/2014/main" id="{88DA5DA5-B2F0-4B59-BA00-FF4C691B5379}"/>
+                <a16:creationId xmlns:a16="http://schemas.microsoft.com/office/drawing/2014/main" id="{F53B1AEE-E830-407D-BA32-6E0C6990237C}"/>
               </a:ext>
             </a:extLst>
           </p:cNvPr>
           <p:cNvPicPr>
-            <a:picLocks noChangeAspect="1"/>
+            <a:picLocks noChangeAspect="1" noChangeArrowheads="1"/>
           </p:cNvPicPr>
           <p:nvPr/>
         </p:nvPicPr>
         <p:blipFill>
-          <a:blip r:embed="rId2"/>
+          <a:blip r:embed="rId2">
+            <a:extLst>
+              <a:ext uri="{28A0092B-C50C-407E-A947-70E740481C1C}">
+                <a14:useLocalDpi xmlns:a14="http://schemas.microsoft.com/office/drawing/2010/main" val="0"/>
+              </a:ext>
+            </a:extLst>
+          </a:blip>
+          <a:srcRect/>
           <a:stretch>
             <a:fillRect/>
           </a:stretch>
         </p:blipFill>
-        <p:spPr>
+        <p:spPr bwMode="auto">
           <a:xfrm>
-            <a:off x="2461331" y="1239245"/>
-            <a:ext cx="7783046" cy="5078152"/>
+            <a:off x="2350541" y="1236330"/>
+            <a:ext cx="7890032" cy="4906426"/>
           </a:xfrm>
           <a:prstGeom prst="rect">
             <a:avLst/>
           </a:prstGeom>
+          <a:noFill/>
           <a:ln>
             <a:solidFill>
               <a:schemeClr val="tx1"/>
@@ -5012,6 +5072,15 @@
               </a:prstClr>
             </a:outerShdw>
           </a:effectLst>
+          <a:extLst>
+            <a:ext uri="{909E8E84-426E-40DD-AFC4-6F175D3DCCD1}">
+              <a14:hiddenFill xmlns:a14="http://schemas.microsoft.com/office/drawing/2010/main">
+                <a:solidFill>
+                  <a:srgbClr val="FFFFFF"/>
+                </a:solidFill>
+              </a14:hiddenFill>
+            </a:ext>
+          </a:extLst>
         </p:spPr>
       </p:pic>
       <p:cxnSp>
@@ -5031,8 +5100,8 @@
         </p:nvCxnSpPr>
         <p:spPr>
           <a:xfrm>
-            <a:off x="1931542" y="1767155"/>
-            <a:ext cx="627360" cy="0"/>
+            <a:off x="1931542" y="1811545"/>
+            <a:ext cx="545328" cy="0"/>
           </a:xfrm>
           <a:prstGeom prst="straightConnector1">
             <a:avLst/>
@@ -5073,7 +5142,7 @@
         </p:nvSpPr>
         <p:spPr>
           <a:xfrm>
-            <a:off x="308225" y="1489753"/>
+            <a:off x="308225" y="1534143"/>
             <a:ext cx="1623317" cy="554804"/>
           </a:xfrm>
           <a:prstGeom prst="roundRect">
@@ -5103,7 +5172,7 @@
             <a:pPr algn="ctr"/>
             <a:r>
               <a:rPr lang="en-US" dirty="0"/>
-              <a:t>Year Scrollbar</a:t>
+              <a:t>Year Slide Bar</a:t>
             </a:r>
           </a:p>
         </p:txBody>
@@ -5122,7 +5191,7 @@
         </p:nvSpPr>
         <p:spPr>
           <a:xfrm>
-            <a:off x="462337" y="3429000"/>
+            <a:off x="385280" y="4374222"/>
             <a:ext cx="1469205" cy="716623"/>
           </a:xfrm>
           <a:prstGeom prst="roundRect">
@@ -5174,8 +5243,8 @@
         </p:nvCxnSpPr>
         <p:spPr>
           <a:xfrm flipV="1">
-            <a:off x="1931542" y="3070688"/>
-            <a:ext cx="732990" cy="716624"/>
+            <a:off x="1854485" y="3932808"/>
+            <a:ext cx="704417" cy="799726"/>
           </a:xfrm>
           <a:prstGeom prst="straightConnector1">
             <a:avLst/>
@@ -5219,8 +5288,8 @@
         </p:nvCxnSpPr>
         <p:spPr>
           <a:xfrm>
-            <a:off x="1931542" y="3787312"/>
-            <a:ext cx="732990" cy="515330"/>
+            <a:off x="1854485" y="4732534"/>
+            <a:ext cx="773305" cy="635713"/>
           </a:xfrm>
           <a:prstGeom prst="straightConnector1">
             <a:avLst/>
@@ -5264,8 +5333,8 @@
         </p:nvCxnSpPr>
         <p:spPr>
           <a:xfrm flipH="1">
-            <a:off x="3954544" y="1152283"/>
-            <a:ext cx="829214" cy="1311439"/>
+            <a:off x="3824650" y="1152283"/>
+            <a:ext cx="959108" cy="1706327"/>
           </a:xfrm>
           <a:prstGeom prst="straightConnector1">
             <a:avLst/>
@@ -5310,7 +5379,7 @@
         <p:spPr>
           <a:xfrm>
             <a:off x="4783758" y="1152283"/>
-            <a:ext cx="1166492" cy="1311439"/>
+            <a:ext cx="1219791" cy="1706327"/>
           </a:xfrm>
           <a:prstGeom prst="straightConnector1">
             <a:avLst/>
@@ -5400,7 +5469,7 @@
         </p:nvSpPr>
         <p:spPr>
           <a:xfrm>
-            <a:off x="6332022" y="435660"/>
+            <a:off x="6008823" y="435660"/>
             <a:ext cx="1469206" cy="554804"/>
           </a:xfrm>
           <a:prstGeom prst="roundRect">
@@ -5509,8 +5578,8 @@
         </p:nvCxnSpPr>
         <p:spPr>
           <a:xfrm flipH="1">
-            <a:off x="9937898" y="1762795"/>
-            <a:ext cx="527180" cy="4360"/>
+            <a:off x="10089236" y="2135655"/>
+            <a:ext cx="375842" cy="0"/>
           </a:xfrm>
           <a:prstGeom prst="straightConnector1">
             <a:avLst/>
@@ -5551,7 +5620,7 @@
         </p:nvSpPr>
         <p:spPr>
           <a:xfrm>
-            <a:off x="10465078" y="1401019"/>
+            <a:off x="10465078" y="1773879"/>
             <a:ext cx="1469206" cy="723551"/>
           </a:xfrm>
           <a:prstGeom prst="roundRect">
@@ -5744,13 +5813,14 @@
           </p:cNvPr>
           <p:cNvCxnSpPr>
             <a:cxnSpLocks/>
+            <a:stCxn id="45" idx="2"/>
           </p:cNvCxnSpPr>
           <p:nvPr/>
         </p:nvCxnSpPr>
         <p:spPr>
           <a:xfrm>
-            <a:off x="6738151" y="990464"/>
-            <a:ext cx="0" cy="607092"/>
+            <a:off x="6743426" y="990464"/>
+            <a:ext cx="0" cy="618822"/>
           </a:xfrm>
           <a:prstGeom prst="straightConnector1">
             <a:avLst/>
@@ -5807,91 +5877,40 @@
           <a:chExt cx="0" cy="0"/>
         </a:xfrm>
       </p:grpSpPr>
-      <p:sp>
-        <p:nvSpPr>
-          <p:cNvPr id="4" name="Rectangle: Rounded Corners 3">
-            <a:extLst>
-              <a:ext uri="{FF2B5EF4-FFF2-40B4-BE49-F238E27FC236}">
-                <a16:creationId xmlns:a16="http://schemas.microsoft.com/office/drawing/2014/main" id="{FC35F17E-E78E-42CF-920A-6179EEFEE9B4}"/>
-              </a:ext>
-            </a:extLst>
-          </p:cNvPr>
-          <p:cNvSpPr/>
-          <p:nvPr/>
-        </p:nvSpPr>
-        <p:spPr>
-          <a:xfrm>
-            <a:off x="0" y="-393405"/>
-            <a:ext cx="1655545" cy="287079"/>
-          </a:xfrm>
-          <a:prstGeom prst="roundRect">
-            <a:avLst/>
-          </a:prstGeom>
-          <a:noFill/>
-          <a:ln>
-            <a:noFill/>
-          </a:ln>
-        </p:spPr>
-        <p:style>
-          <a:lnRef idx="2">
-            <a:schemeClr val="accent1">
-              <a:shade val="50000"/>
-            </a:schemeClr>
-          </a:lnRef>
-          <a:fillRef idx="1">
-            <a:schemeClr val="accent1"/>
-          </a:fillRef>
-          <a:effectRef idx="0">
-            <a:schemeClr val="accent1"/>
-          </a:effectRef>
-          <a:fontRef idx="minor">
-            <a:schemeClr val="lt1"/>
-          </a:fontRef>
-        </p:style>
-        <p:txBody>
-          <a:bodyPr rtlCol="0" anchor="ctr"/>
-          <a:lstStyle/>
-          <a:p>
-            <a:pPr algn="ctr"/>
-            <a:r>
-              <a:rPr lang="en-US" dirty="0">
-                <a:solidFill>
-                  <a:schemeClr val="tx1"/>
-                </a:solidFill>
-              </a:rPr>
-              <a:t>table.png</a:t>
-            </a:r>
-          </a:p>
-        </p:txBody>
-      </p:sp>
       <p:pic>
         <p:nvPicPr>
-          <p:cNvPr id="5" name="Picture 4">
+          <p:cNvPr id="10242" name="Picture 2">
             <a:extLst>
               <a:ext uri="{FF2B5EF4-FFF2-40B4-BE49-F238E27FC236}">
-                <a16:creationId xmlns:a16="http://schemas.microsoft.com/office/drawing/2014/main" id="{45B3F2AE-1FB8-4810-8BF2-77F8711E1F2C}"/>
+                <a16:creationId xmlns:a16="http://schemas.microsoft.com/office/drawing/2014/main" id="{5A15C3BD-63BA-47E3-988A-452FEF4EE9E1}"/>
               </a:ext>
             </a:extLst>
           </p:cNvPr>
           <p:cNvPicPr>
-            <a:picLocks noChangeAspect="1"/>
+            <a:picLocks noChangeAspect="1" noChangeArrowheads="1"/>
           </p:cNvPicPr>
           <p:nvPr/>
         </p:nvPicPr>
-        <p:blipFill>
-          <a:blip r:embed="rId2"/>
-          <a:stretch>
-            <a:fillRect/>
-          </a:stretch>
+        <p:blipFill rotWithShape="1">
+          <a:blip r:embed="rId2">
+            <a:extLst>
+              <a:ext uri="{28A0092B-C50C-407E-A947-70E740481C1C}">
+                <a14:useLocalDpi xmlns:a14="http://schemas.microsoft.com/office/drawing/2010/main" val="0"/>
+              </a:ext>
+            </a:extLst>
+          </a:blip>
+          <a:srcRect b="28673"/>
+          <a:stretch/>
         </p:blipFill>
-        <p:spPr>
+        <p:spPr bwMode="auto">
           <a:xfrm>
-            <a:off x="524213" y="1316216"/>
-            <a:ext cx="9677275" cy="4225568"/>
+            <a:off x="471133" y="1096851"/>
+            <a:ext cx="9802274" cy="4347768"/>
           </a:xfrm>
           <a:prstGeom prst="rect">
             <a:avLst/>
           </a:prstGeom>
+          <a:noFill/>
           <a:ln>
             <a:solidFill>
               <a:schemeClr val="tx1"/>
@@ -5904,8 +5923,74 @@
               </a:prstClr>
             </a:outerShdw>
           </a:effectLst>
+          <a:extLst>
+            <a:ext uri="{909E8E84-426E-40DD-AFC4-6F175D3DCCD1}">
+              <a14:hiddenFill xmlns:a14="http://schemas.microsoft.com/office/drawing/2010/main">
+                <a:solidFill>
+                  <a:srgbClr val="FFFFFF"/>
+                </a:solidFill>
+              </a14:hiddenFill>
+            </a:ext>
+          </a:extLst>
         </p:spPr>
       </p:pic>
+      <p:sp>
+        <p:nvSpPr>
+          <p:cNvPr id="4" name="Rectangle: Rounded Corners 3">
+            <a:extLst>
+              <a:ext uri="{FF2B5EF4-FFF2-40B4-BE49-F238E27FC236}">
+                <a16:creationId xmlns:a16="http://schemas.microsoft.com/office/drawing/2014/main" id="{FC35F17E-E78E-42CF-920A-6179EEFEE9B4}"/>
+              </a:ext>
+            </a:extLst>
+          </p:cNvPr>
+          <p:cNvSpPr/>
+          <p:nvPr/>
+        </p:nvSpPr>
+        <p:spPr>
+          <a:xfrm>
+            <a:off x="0" y="-393405"/>
+            <a:ext cx="1655545" cy="287079"/>
+          </a:xfrm>
+          <a:prstGeom prst="roundRect">
+            <a:avLst/>
+          </a:prstGeom>
+          <a:noFill/>
+          <a:ln>
+            <a:noFill/>
+          </a:ln>
+        </p:spPr>
+        <p:style>
+          <a:lnRef idx="2">
+            <a:schemeClr val="accent1">
+              <a:shade val="50000"/>
+            </a:schemeClr>
+          </a:lnRef>
+          <a:fillRef idx="1">
+            <a:schemeClr val="accent1"/>
+          </a:fillRef>
+          <a:effectRef idx="0">
+            <a:schemeClr val="accent1"/>
+          </a:effectRef>
+          <a:fontRef idx="minor">
+            <a:schemeClr val="lt1"/>
+          </a:fontRef>
+        </p:style>
+        <p:txBody>
+          <a:bodyPr rtlCol="0" anchor="ctr"/>
+          <a:lstStyle/>
+          <a:p>
+            <a:pPr algn="ctr"/>
+            <a:r>
+              <a:rPr lang="en-US" dirty="0">
+                <a:solidFill>
+                  <a:schemeClr val="tx1"/>
+                </a:solidFill>
+              </a:rPr>
+              <a:t>table.png</a:t>
+            </a:r>
+          </a:p>
+        </p:txBody>
+      </p:sp>
       <p:cxnSp>
         <p:nvCxnSpPr>
           <p:cNvPr id="6" name="Straight Arrow Connector 5">
@@ -5923,7 +6008,7 @@
         </p:nvCxnSpPr>
         <p:spPr>
           <a:xfrm flipH="1">
-            <a:off x="10009817" y="1834715"/>
+            <a:off x="10009817" y="1657160"/>
             <a:ext cx="527180" cy="4360"/>
           </a:xfrm>
           <a:prstGeom prst="straightConnector1">
@@ -5965,7 +6050,7 @@
         </p:nvSpPr>
         <p:spPr>
           <a:xfrm>
-            <a:off x="10536997" y="1472939"/>
+            <a:off x="10536997" y="1295384"/>
             <a:ext cx="1469206" cy="723551"/>
           </a:xfrm>
           <a:prstGeom prst="roundRect">
@@ -6014,7 +6099,7 @@
         </p:nvSpPr>
         <p:spPr>
           <a:xfrm>
-            <a:off x="7853729" y="397283"/>
+            <a:off x="7853729" y="255235"/>
             <a:ext cx="1469206" cy="723551"/>
           </a:xfrm>
           <a:prstGeom prst="roundRect">
@@ -6066,8 +6151,8 @@
         </p:nvCxnSpPr>
         <p:spPr>
           <a:xfrm>
-            <a:off x="8588332" y="1120834"/>
-            <a:ext cx="0" cy="851805"/>
+            <a:off x="8588332" y="978786"/>
+            <a:ext cx="0" cy="1040149"/>
           </a:xfrm>
           <a:prstGeom prst="straightConnector1">
             <a:avLst/>
@@ -6108,7 +6193,7 @@
         </p:nvSpPr>
         <p:spPr>
           <a:xfrm>
-            <a:off x="4771368" y="397283"/>
+            <a:off x="4771368" y="255235"/>
             <a:ext cx="1469206" cy="723551"/>
           </a:xfrm>
           <a:prstGeom prst="roundRect">
@@ -6213,8 +6298,8 @@
         </p:nvCxnSpPr>
         <p:spPr>
           <a:xfrm flipH="1">
-            <a:off x="5503195" y="1120834"/>
-            <a:ext cx="2776" cy="1314141"/>
+            <a:off x="5503195" y="978786"/>
+            <a:ext cx="2776" cy="1456189"/>
           </a:xfrm>
           <a:prstGeom prst="straightConnector1">
             <a:avLst/>
@@ -6255,7 +6340,7 @@
         </p:nvSpPr>
         <p:spPr>
           <a:xfrm>
-            <a:off x="7922757" y="5936992"/>
+            <a:off x="7922757" y="5803823"/>
             <a:ext cx="1469206" cy="723551"/>
           </a:xfrm>
           <a:prstGeom prst="roundRect">
@@ -6304,7 +6389,7 @@
         </p:nvSpPr>
         <p:spPr>
           <a:xfrm>
-            <a:off x="7253554" y="5219272"/>
+            <a:off x="7253554" y="5086103"/>
             <a:ext cx="2807613" cy="322512"/>
           </a:xfrm>
           <a:prstGeom prst="roundRect">
@@ -6360,7 +6445,7 @@
         </p:nvCxnSpPr>
         <p:spPr>
           <a:xfrm flipV="1">
-            <a:off x="8657360" y="5541784"/>
+            <a:off x="8657360" y="5408615"/>
             <a:ext cx="1" cy="395208"/>
           </a:xfrm>
           <a:prstGeom prst="straightConnector1">
@@ -6714,6 +6799,59 @@
           <a:chExt cx="0" cy="0"/>
         </a:xfrm>
       </p:grpSpPr>
+      <p:pic>
+        <p:nvPicPr>
+          <p:cNvPr id="20" name="Picture 2">
+            <a:extLst>
+              <a:ext uri="{FF2B5EF4-FFF2-40B4-BE49-F238E27FC236}">
+                <a16:creationId xmlns:a16="http://schemas.microsoft.com/office/drawing/2014/main" id="{161504B2-3806-4957-AF30-A2EDB9388FAC}"/>
+              </a:ext>
+            </a:extLst>
+          </p:cNvPr>
+          <p:cNvPicPr>
+            <a:picLocks noChangeAspect="1" noChangeArrowheads="1"/>
+          </p:cNvPicPr>
+          <p:nvPr/>
+        </p:nvPicPr>
+        <p:blipFill>
+          <a:blip r:embed="rId2">
+            <a:extLst>
+              <a:ext uri="{28A0092B-C50C-407E-A947-70E740481C1C}">
+                <a14:useLocalDpi xmlns:a14="http://schemas.microsoft.com/office/drawing/2010/main" val="0"/>
+              </a:ext>
+            </a:extLst>
+          </a:blip>
+          <a:srcRect/>
+          <a:stretch>
+            <a:fillRect/>
+          </a:stretch>
+        </p:blipFill>
+        <p:spPr bwMode="auto">
+          <a:xfrm>
+            <a:off x="4666657" y="479871"/>
+            <a:ext cx="7298666" cy="5129199"/>
+          </a:xfrm>
+          <a:prstGeom prst="rect">
+            <a:avLst/>
+          </a:prstGeom>
+          <a:noFill/>
+          <a:ln>
+            <a:solidFill>
+              <a:schemeClr val="tx1"/>
+            </a:solidFill>
+          </a:ln>
+          <a:effectLst/>
+          <a:extLst>
+            <a:ext uri="{909E8E84-426E-40DD-AFC4-6F175D3DCCD1}">
+              <a14:hiddenFill xmlns:a14="http://schemas.microsoft.com/office/drawing/2010/main">
+                <a:solidFill>
+                  <a:srgbClr val="FFFFFF"/>
+                </a:solidFill>
+              </a14:hiddenFill>
+            </a:ext>
+          </a:extLst>
+        </p:spPr>
+      </p:pic>
       <p:sp>
         <p:nvSpPr>
           <p:cNvPr id="4" name="Rectangle: Rounded Corners 3">
@@ -7001,43 +7139,6 @@
       </p:sp>
       <p:pic>
         <p:nvPicPr>
-          <p:cNvPr id="11" name="Picture 10">
-            <a:extLst>
-              <a:ext uri="{FF2B5EF4-FFF2-40B4-BE49-F238E27FC236}">
-                <a16:creationId xmlns:a16="http://schemas.microsoft.com/office/drawing/2014/main" id="{E50F1493-F59F-466D-842C-44DAAB57EB57}"/>
-              </a:ext>
-            </a:extLst>
-          </p:cNvPr>
-          <p:cNvPicPr>
-            <a:picLocks noChangeAspect="1"/>
-          </p:cNvPicPr>
-          <p:nvPr/>
-        </p:nvPicPr>
-        <p:blipFill>
-          <a:blip r:embed="rId2"/>
-          <a:stretch>
-            <a:fillRect/>
-          </a:stretch>
-        </p:blipFill>
-        <p:spPr>
-          <a:xfrm>
-            <a:off x="4666657" y="490778"/>
-            <a:ext cx="7298666" cy="5156489"/>
-          </a:xfrm>
-          <a:prstGeom prst="rect">
-            <a:avLst/>
-          </a:prstGeom>
-          <a:ln>
-            <a:solidFill>
-              <a:schemeClr val="bg1">
-                <a:lumMod val="50000"/>
-              </a:schemeClr>
-            </a:solidFill>
-          </a:ln>
-        </p:spPr>
-      </p:pic>
-      <p:pic>
-        <p:nvPicPr>
           <p:cNvPr id="12" name="Picture 11">
             <a:extLst>
               <a:ext uri="{FF2B5EF4-FFF2-40B4-BE49-F238E27FC236}">
@@ -7051,7 +7152,7 @@
           <p:nvPr/>
         </p:nvPicPr>
         <p:blipFill rotWithShape="1">
-          <a:blip r:embed="rId2"/>
+          <a:blip r:embed="rId3"/>
           <a:srcRect t="15778"/>
           <a:stretch/>
         </p:blipFill>
@@ -7065,9 +7166,7 @@
           </a:prstGeom>
           <a:ln>
             <a:solidFill>
-              <a:schemeClr val="bg1">
-                <a:lumMod val="50000"/>
-              </a:schemeClr>
+              <a:schemeClr val="tx1"/>
             </a:solidFill>
           </a:ln>
         </p:spPr>
@@ -7086,8 +7185,8 @@
         </p:nvSpPr>
         <p:spPr>
           <a:xfrm>
-            <a:off x="4683591" y="1312333"/>
-            <a:ext cx="7262876" cy="1041400"/>
+            <a:off x="4666657" y="1312333"/>
+            <a:ext cx="7298666" cy="1041400"/>
           </a:xfrm>
           <a:prstGeom prst="rect">
             <a:avLst/>
@@ -7138,7 +7237,7 @@
         </p:nvSpPr>
         <p:spPr>
           <a:xfrm>
-            <a:off x="4885267" y="1413933"/>
+            <a:off x="4856692" y="1413933"/>
             <a:ext cx="6934200" cy="778934"/>
           </a:xfrm>
           <a:prstGeom prst="roundRect">
@@ -7196,7 +7295,7 @@
         </p:nvSpPr>
         <p:spPr>
           <a:xfrm>
-            <a:off x="6951896" y="1388958"/>
+            <a:off x="6923321" y="1388958"/>
             <a:ext cx="2726266" cy="307777"/>
           </a:xfrm>
           <a:prstGeom prst="rect">
@@ -7232,7 +7331,7 @@
         </p:nvSpPr>
         <p:spPr>
           <a:xfrm>
-            <a:off x="4969934" y="1606915"/>
+            <a:off x="4941359" y="1606915"/>
             <a:ext cx="6764865" cy="584775"/>
           </a:xfrm>
           <a:prstGeom prst="rect">
@@ -7274,7 +7373,7 @@
         </p:nvSpPr>
         <p:spPr>
           <a:xfrm>
-            <a:off x="11692465" y="1413933"/>
+            <a:off x="11663890" y="1413933"/>
             <a:ext cx="127001" cy="777757"/>
           </a:xfrm>
           <a:prstGeom prst="roundRect">
@@ -7332,7 +7431,7 @@
         </p:nvSpPr>
         <p:spPr>
           <a:xfrm>
-            <a:off x="11692464" y="1795408"/>
+            <a:off x="11663889" y="1795408"/>
             <a:ext cx="127001" cy="134992"/>
           </a:xfrm>
           <a:prstGeom prst="roundRect">
@@ -7392,7 +7491,7 @@
         </p:nvSpPr>
         <p:spPr>
           <a:xfrm>
-            <a:off x="4968380" y="1469453"/>
+            <a:off x="4939805" y="1469453"/>
             <a:ext cx="127380" cy="78540"/>
           </a:xfrm>
           <a:prstGeom prst="triangle">
@@ -7517,6 +7616,233 @@
 </p:sld>
 </file>
 
+<file path=ppt/slides/slide16.xml><?xml version="1.0" encoding="utf-8"?>
+<p:sld xmlns:a="http://schemas.openxmlformats.org/drawingml/2006/main" xmlns:r="http://schemas.openxmlformats.org/officeDocument/2006/relationships" xmlns:p="http://schemas.openxmlformats.org/presentationml/2006/main">
+  <p:cSld>
+    <p:spTree>
+      <p:nvGrpSpPr>
+        <p:cNvPr id="1" name=""/>
+        <p:cNvGrpSpPr/>
+        <p:nvPr/>
+      </p:nvGrpSpPr>
+      <p:grpSpPr>
+        <a:xfrm>
+          <a:off x="0" y="0"/>
+          <a:ext cx="0" cy="0"/>
+          <a:chOff x="0" y="0"/>
+          <a:chExt cx="0" cy="0"/>
+        </a:xfrm>
+      </p:grpSpPr>
+      <p:pic>
+        <p:nvPicPr>
+          <p:cNvPr id="11266" name="Picture 2">
+            <a:extLst>
+              <a:ext uri="{FF2B5EF4-FFF2-40B4-BE49-F238E27FC236}">
+                <a16:creationId xmlns:a16="http://schemas.microsoft.com/office/drawing/2014/main" id="{6C2B4168-1D62-4572-A223-D69178D259EF}"/>
+              </a:ext>
+            </a:extLst>
+          </p:cNvPr>
+          <p:cNvPicPr>
+            <a:picLocks noChangeAspect="1" noChangeArrowheads="1"/>
+          </p:cNvPicPr>
+          <p:nvPr/>
+        </p:nvPicPr>
+        <p:blipFill>
+          <a:blip r:embed="rId2">
+            <a:extLst>
+              <a:ext uri="{28A0092B-C50C-407E-A947-70E740481C1C}">
+                <a14:useLocalDpi xmlns:a14="http://schemas.microsoft.com/office/drawing/2010/main" val="0"/>
+              </a:ext>
+            </a:extLst>
+          </a:blip>
+          <a:srcRect/>
+          <a:stretch>
+            <a:fillRect/>
+          </a:stretch>
+        </p:blipFill>
+        <p:spPr bwMode="auto">
+          <a:xfrm>
+            <a:off x="4962525" y="365012"/>
+            <a:ext cx="6400800" cy="6106771"/>
+          </a:xfrm>
+          <a:prstGeom prst="rect">
+            <a:avLst/>
+          </a:prstGeom>
+          <a:noFill/>
+          <a:ln>
+            <a:solidFill>
+              <a:schemeClr val="tx1"/>
+            </a:solidFill>
+          </a:ln>
+          <a:effectLst>
+            <a:outerShdw blurRad="50800" dist="38100" dir="2700000" algn="tl" rotWithShape="0">
+              <a:prstClr val="black">
+                <a:alpha val="40000"/>
+              </a:prstClr>
+            </a:outerShdw>
+          </a:effectLst>
+          <a:extLst>
+            <a:ext uri="{909E8E84-426E-40DD-AFC4-6F175D3DCCD1}">
+              <a14:hiddenFill xmlns:a14="http://schemas.microsoft.com/office/drawing/2010/main">
+                <a:solidFill>
+                  <a:srgbClr val="FFFFFF"/>
+                </a:solidFill>
+              </a14:hiddenFill>
+            </a:ext>
+          </a:extLst>
+        </p:spPr>
+      </p:pic>
+      <p:pic>
+        <p:nvPicPr>
+          <p:cNvPr id="3" name="Picture 2">
+            <a:extLst>
+              <a:ext uri="{FF2B5EF4-FFF2-40B4-BE49-F238E27FC236}">
+                <a16:creationId xmlns:a16="http://schemas.microsoft.com/office/drawing/2014/main" id="{26EA764F-2A2B-4C11-BDCF-C0B247B2999C}"/>
+              </a:ext>
+            </a:extLst>
+          </p:cNvPr>
+          <p:cNvPicPr>
+            <a:picLocks noChangeAspect="1"/>
+          </p:cNvPicPr>
+          <p:nvPr/>
+        </p:nvPicPr>
+        <p:blipFill>
+          <a:blip r:embed="rId3"/>
+          <a:stretch>
+            <a:fillRect/>
+          </a:stretch>
+        </p:blipFill>
+        <p:spPr>
+          <a:xfrm>
+            <a:off x="1845748" y="365012"/>
+            <a:ext cx="2351104" cy="5305869"/>
+          </a:xfrm>
+          <a:prstGeom prst="rect">
+            <a:avLst/>
+          </a:prstGeom>
+          <a:ln>
+            <a:solidFill>
+              <a:schemeClr val="tx1"/>
+            </a:solidFill>
+          </a:ln>
+          <a:effectLst>
+            <a:outerShdw blurRad="50800" dist="38100" dir="2700000" algn="tl" rotWithShape="0">
+              <a:prstClr val="black">
+                <a:alpha val="40000"/>
+              </a:prstClr>
+            </a:outerShdw>
+          </a:effectLst>
+        </p:spPr>
+      </p:pic>
+      <p:cxnSp>
+        <p:nvCxnSpPr>
+          <p:cNvPr id="5" name="Straight Arrow Connector 4">
+            <a:extLst>
+              <a:ext uri="{FF2B5EF4-FFF2-40B4-BE49-F238E27FC236}">
+                <a16:creationId xmlns:a16="http://schemas.microsoft.com/office/drawing/2014/main" id="{DAA203B6-1443-4984-813E-1B36D9300247}"/>
+              </a:ext>
+            </a:extLst>
+          </p:cNvPr>
+          <p:cNvCxnSpPr>
+            <a:cxnSpLocks/>
+          </p:cNvCxnSpPr>
+          <p:nvPr/>
+        </p:nvCxnSpPr>
+        <p:spPr>
+          <a:xfrm flipH="1">
+            <a:off x="4273052" y="1016886"/>
+            <a:ext cx="822960" cy="9525"/>
+          </a:xfrm>
+          <a:prstGeom prst="straightConnector1">
+            <a:avLst/>
+          </a:prstGeom>
+          <a:ln w="28575">
+            <a:solidFill>
+              <a:srgbClr val="FF0000"/>
+            </a:solidFill>
+            <a:tailEnd type="triangle" w="lg" len="lg"/>
+          </a:ln>
+        </p:spPr>
+        <p:style>
+          <a:lnRef idx="1">
+            <a:schemeClr val="accent1"/>
+          </a:lnRef>
+          <a:fillRef idx="0">
+            <a:schemeClr val="accent1"/>
+          </a:fillRef>
+          <a:effectRef idx="0">
+            <a:schemeClr val="accent1"/>
+          </a:effectRef>
+          <a:fontRef idx="minor">
+            <a:schemeClr val="tx1"/>
+          </a:fontRef>
+        </p:style>
+      </p:cxnSp>
+      <p:sp>
+        <p:nvSpPr>
+          <p:cNvPr id="9" name="Rectangle: Rounded Corners 8">
+            <a:extLst>
+              <a:ext uri="{FF2B5EF4-FFF2-40B4-BE49-F238E27FC236}">
+                <a16:creationId xmlns:a16="http://schemas.microsoft.com/office/drawing/2014/main" id="{EB6AD305-ADA3-4780-AC5B-D7F8F952C4CC}"/>
+              </a:ext>
+            </a:extLst>
+          </p:cNvPr>
+          <p:cNvSpPr/>
+          <p:nvPr/>
+        </p:nvSpPr>
+        <p:spPr>
+          <a:xfrm>
+            <a:off x="5114925" y="879726"/>
+            <a:ext cx="457200" cy="274320"/>
+          </a:xfrm>
+          <a:prstGeom prst="roundRect">
+            <a:avLst/>
+          </a:prstGeom>
+          <a:noFill/>
+          <a:ln w="28575">
+            <a:solidFill>
+              <a:srgbClr val="FF0000"/>
+            </a:solidFill>
+          </a:ln>
+        </p:spPr>
+        <p:style>
+          <a:lnRef idx="2">
+            <a:schemeClr val="accent1">
+              <a:shade val="50000"/>
+            </a:schemeClr>
+          </a:lnRef>
+          <a:fillRef idx="1">
+            <a:schemeClr val="accent1"/>
+          </a:fillRef>
+          <a:effectRef idx="0">
+            <a:schemeClr val="accent1"/>
+          </a:effectRef>
+          <a:fontRef idx="minor">
+            <a:schemeClr val="lt1"/>
+          </a:fontRef>
+        </p:style>
+        <p:txBody>
+          <a:bodyPr rtlCol="0" anchor="ctr"/>
+          <a:lstStyle/>
+          <a:p>
+            <a:pPr algn="ctr"/>
+            <a:endParaRPr lang="en-US"/>
+          </a:p>
+        </p:txBody>
+      </p:sp>
+    </p:spTree>
+    <p:extLst>
+      <p:ext uri="{BB962C8B-B14F-4D97-AF65-F5344CB8AC3E}">
+        <p14:creationId xmlns:p14="http://schemas.microsoft.com/office/powerpoint/2010/main" val="1100922383"/>
+      </p:ext>
+    </p:extLst>
+  </p:cSld>
+  <p:clrMapOvr>
+    <a:masterClrMapping/>
+  </p:clrMapOvr>
+</p:sld>
+</file>
+
 <file path=ppt/slides/slide2.xml><?xml version="1.0" encoding="utf-8"?>
 <p:sld xmlns:a="http://schemas.openxmlformats.org/drawingml/2006/main" xmlns:r="http://schemas.openxmlformats.org/officeDocument/2006/relationships" xmlns:p="http://schemas.openxmlformats.org/presentationml/2006/main">
   <p:cSld>
@@ -7536,10 +7862,10 @@
       </p:grpSpPr>
       <p:pic>
         <p:nvPicPr>
-          <p:cNvPr id="5" name="Picture 4">
+          <p:cNvPr id="3" name="Picture 2">
             <a:extLst>
               <a:ext uri="{FF2B5EF4-FFF2-40B4-BE49-F238E27FC236}">
-                <a16:creationId xmlns:a16="http://schemas.microsoft.com/office/drawing/2014/main" id="{AE9394F5-6208-4BBE-8382-280A12D73ACA}"/>
+                <a16:creationId xmlns:a16="http://schemas.microsoft.com/office/drawing/2014/main" id="{3FD67D67-ADD6-470B-969E-9F6D76927F33}"/>
               </a:ext>
             </a:extLst>
           </p:cNvPr>
@@ -7556,8 +7882,8 @@
         </p:blipFill>
         <p:spPr>
           <a:xfrm>
-            <a:off x="4248631" y="1039805"/>
-            <a:ext cx="3694737" cy="4778389"/>
+            <a:off x="4299131" y="1015061"/>
+            <a:ext cx="3657600" cy="4806529"/>
           </a:xfrm>
           <a:prstGeom prst="rect">
             <a:avLst/>
@@ -13069,69 +13395,12 @@
           <a:chExt cx="0" cy="0"/>
         </a:xfrm>
       </p:grpSpPr>
-      <p:sp>
-        <p:nvSpPr>
-          <p:cNvPr id="4" name="Rectangle: Rounded Corners 3">
-            <a:extLst>
-              <a:ext uri="{FF2B5EF4-FFF2-40B4-BE49-F238E27FC236}">
-                <a16:creationId xmlns:a16="http://schemas.microsoft.com/office/drawing/2014/main" id="{25114302-DEAD-402C-940F-2D5871393932}"/>
-              </a:ext>
-            </a:extLst>
-          </p:cNvPr>
-          <p:cNvSpPr/>
-          <p:nvPr/>
-        </p:nvSpPr>
-        <p:spPr>
-          <a:xfrm>
-            <a:off x="0" y="-393405"/>
-            <a:ext cx="1655545" cy="287079"/>
-          </a:xfrm>
-          <a:prstGeom prst="roundRect">
-            <a:avLst/>
-          </a:prstGeom>
-          <a:noFill/>
-          <a:ln>
-            <a:noFill/>
-          </a:ln>
-        </p:spPr>
-        <p:style>
-          <a:lnRef idx="2">
-            <a:schemeClr val="accent1">
-              <a:shade val="50000"/>
-            </a:schemeClr>
-          </a:lnRef>
-          <a:fillRef idx="1">
-            <a:schemeClr val="accent1"/>
-          </a:fillRef>
-          <a:effectRef idx="0">
-            <a:schemeClr val="accent1"/>
-          </a:effectRef>
-          <a:fontRef idx="minor">
-            <a:schemeClr val="lt1"/>
-          </a:fontRef>
-        </p:style>
-        <p:txBody>
-          <a:bodyPr rtlCol="0" anchor="ctr"/>
-          <a:lstStyle/>
-          <a:p>
-            <a:pPr algn="ctr"/>
-            <a:r>
-              <a:rPr lang="en-US" dirty="0">
-                <a:solidFill>
-                  <a:schemeClr val="tx1"/>
-                </a:solidFill>
-              </a:rPr>
-              <a:t>selections.png</a:t>
-            </a:r>
-          </a:p>
-        </p:txBody>
-      </p:sp>
       <p:pic>
         <p:nvPicPr>
-          <p:cNvPr id="5" name="Picture 4">
+          <p:cNvPr id="3" name="Picture 2">
             <a:extLst>
               <a:ext uri="{FF2B5EF4-FFF2-40B4-BE49-F238E27FC236}">
-                <a16:creationId xmlns:a16="http://schemas.microsoft.com/office/drawing/2014/main" id="{573B92E0-5F39-403F-B907-24EC451F62C9}"/>
+                <a16:creationId xmlns:a16="http://schemas.microsoft.com/office/drawing/2014/main" id="{A5DDD61B-672D-46AF-9D05-6FB096A9AECD}"/>
               </a:ext>
             </a:extLst>
           </p:cNvPr>
@@ -13148,8 +13417,107 @@
         </p:blipFill>
         <p:spPr>
           <a:xfrm>
-            <a:off x="4281930" y="981740"/>
-            <a:ext cx="3628139" cy="4735029"/>
+            <a:off x="4315284" y="975068"/>
+            <a:ext cx="3566160" cy="4750542"/>
+          </a:xfrm>
+          <a:prstGeom prst="rect">
+            <a:avLst/>
+          </a:prstGeom>
+          <a:ln w="12700">
+            <a:solidFill>
+              <a:schemeClr val="tx1"/>
+            </a:solidFill>
+          </a:ln>
+          <a:effectLst>
+            <a:outerShdw blurRad="50800" dist="38100" dir="2700000" algn="tl" rotWithShape="0">
+              <a:prstClr val="black">
+                <a:alpha val="40000"/>
+              </a:prstClr>
+            </a:outerShdw>
+          </a:effectLst>
+        </p:spPr>
+      </p:pic>
+      <p:sp>
+        <p:nvSpPr>
+          <p:cNvPr id="4" name="Rectangle: Rounded Corners 3">
+            <a:extLst>
+              <a:ext uri="{FF2B5EF4-FFF2-40B4-BE49-F238E27FC236}">
+                <a16:creationId xmlns:a16="http://schemas.microsoft.com/office/drawing/2014/main" id="{25114302-DEAD-402C-940F-2D5871393932}"/>
+              </a:ext>
+            </a:extLst>
+          </p:cNvPr>
+          <p:cNvSpPr/>
+          <p:nvPr/>
+        </p:nvSpPr>
+        <p:spPr>
+          <a:xfrm>
+            <a:off x="0" y="-393405"/>
+            <a:ext cx="1655545" cy="287079"/>
+          </a:xfrm>
+          <a:prstGeom prst="roundRect">
+            <a:avLst/>
+          </a:prstGeom>
+          <a:noFill/>
+          <a:ln>
+            <a:noFill/>
+          </a:ln>
+        </p:spPr>
+        <p:style>
+          <a:lnRef idx="2">
+            <a:schemeClr val="accent1">
+              <a:shade val="50000"/>
+            </a:schemeClr>
+          </a:lnRef>
+          <a:fillRef idx="1">
+            <a:schemeClr val="accent1"/>
+          </a:fillRef>
+          <a:effectRef idx="0">
+            <a:schemeClr val="accent1"/>
+          </a:effectRef>
+          <a:fontRef idx="minor">
+            <a:schemeClr val="lt1"/>
+          </a:fontRef>
+        </p:style>
+        <p:txBody>
+          <a:bodyPr rtlCol="0" anchor="ctr"/>
+          <a:lstStyle/>
+          <a:p>
+            <a:pPr algn="ctr"/>
+            <a:r>
+              <a:rPr lang="en-US" dirty="0">
+                <a:solidFill>
+                  <a:schemeClr val="tx1"/>
+                </a:solidFill>
+              </a:rPr>
+              <a:t>selections.png</a:t>
+            </a:r>
+          </a:p>
+        </p:txBody>
+      </p:sp>
+      <p:pic>
+        <p:nvPicPr>
+          <p:cNvPr id="9" name="Picture 8">
+            <a:extLst>
+              <a:ext uri="{FF2B5EF4-FFF2-40B4-BE49-F238E27FC236}">
+                <a16:creationId xmlns:a16="http://schemas.microsoft.com/office/drawing/2014/main" id="{40DEF4F8-4D1F-4C7A-9251-8D168A6993EB}"/>
+              </a:ext>
+            </a:extLst>
+          </p:cNvPr>
+          <p:cNvPicPr>
+            <a:picLocks noChangeAspect="1"/>
+          </p:cNvPicPr>
+          <p:nvPr/>
+        </p:nvPicPr>
+        <p:blipFill>
+          <a:blip r:embed="rId3"/>
+          <a:stretch>
+            <a:fillRect/>
+          </a:stretch>
+        </p:blipFill>
+        <p:spPr>
+          <a:xfrm>
+            <a:off x="8982534" y="1540057"/>
+            <a:ext cx="2838450" cy="5057775"/>
           </a:xfrm>
           <a:prstGeom prst="rect">
             <a:avLst/>
@@ -13168,54 +13536,402 @@
           </a:effectLst>
         </p:spPr>
       </p:pic>
+      <p:sp>
+        <p:nvSpPr>
+          <p:cNvPr id="10" name="Rectangle: Rounded Corners 9">
+            <a:extLst>
+              <a:ext uri="{FF2B5EF4-FFF2-40B4-BE49-F238E27FC236}">
+                <a16:creationId xmlns:a16="http://schemas.microsoft.com/office/drawing/2014/main" id="{5E591BA3-DD86-49D3-BB7F-05939465B70F}"/>
+              </a:ext>
+            </a:extLst>
+          </p:cNvPr>
+          <p:cNvSpPr/>
+          <p:nvPr/>
+        </p:nvSpPr>
+        <p:spPr>
+          <a:xfrm>
+            <a:off x="4476307" y="2477385"/>
+            <a:ext cx="3179135" cy="669851"/>
+          </a:xfrm>
+          <a:prstGeom prst="roundRect">
+            <a:avLst/>
+          </a:prstGeom>
+          <a:noFill/>
+          <a:ln w="28575">
+            <a:solidFill>
+              <a:srgbClr val="FF0000"/>
+            </a:solidFill>
+          </a:ln>
+        </p:spPr>
+        <p:style>
+          <a:lnRef idx="2">
+            <a:schemeClr val="accent1">
+              <a:shade val="50000"/>
+            </a:schemeClr>
+          </a:lnRef>
+          <a:fillRef idx="1">
+            <a:schemeClr val="accent1"/>
+          </a:fillRef>
+          <a:effectRef idx="0">
+            <a:schemeClr val="accent1"/>
+          </a:effectRef>
+          <a:fontRef idx="minor">
+            <a:schemeClr val="lt1"/>
+          </a:fontRef>
+        </p:style>
+        <p:txBody>
+          <a:bodyPr rtlCol="0" anchor="ctr"/>
+          <a:lstStyle/>
+          <a:p>
+            <a:pPr algn="ctr"/>
+            <a:endParaRPr lang="en-US"/>
+          </a:p>
+        </p:txBody>
+      </p:sp>
+      <p:sp>
+        <p:nvSpPr>
+          <p:cNvPr id="11" name="Rectangle: Rounded Corners 10">
+            <a:extLst>
+              <a:ext uri="{FF2B5EF4-FFF2-40B4-BE49-F238E27FC236}">
+                <a16:creationId xmlns:a16="http://schemas.microsoft.com/office/drawing/2014/main" id="{9EDA0F31-978E-4E57-A6BB-51E38D86FCD0}"/>
+              </a:ext>
+            </a:extLst>
+          </p:cNvPr>
+          <p:cNvSpPr/>
+          <p:nvPr/>
+        </p:nvSpPr>
+        <p:spPr>
+          <a:xfrm>
+            <a:off x="4476306" y="3228089"/>
+            <a:ext cx="3179135" cy="669851"/>
+          </a:xfrm>
+          <a:prstGeom prst="roundRect">
+            <a:avLst/>
+          </a:prstGeom>
+          <a:noFill/>
+          <a:ln w="28575">
+            <a:solidFill>
+              <a:srgbClr val="FF0000"/>
+            </a:solidFill>
+          </a:ln>
+        </p:spPr>
+        <p:style>
+          <a:lnRef idx="2">
+            <a:schemeClr val="accent1">
+              <a:shade val="50000"/>
+            </a:schemeClr>
+          </a:lnRef>
+          <a:fillRef idx="1">
+            <a:schemeClr val="accent1"/>
+          </a:fillRef>
+          <a:effectRef idx="0">
+            <a:schemeClr val="accent1"/>
+          </a:effectRef>
+          <a:fontRef idx="minor">
+            <a:schemeClr val="lt1"/>
+          </a:fontRef>
+        </p:style>
+        <p:txBody>
+          <a:bodyPr rtlCol="0" anchor="ctr"/>
+          <a:lstStyle/>
+          <a:p>
+            <a:pPr algn="ctr"/>
+            <a:endParaRPr lang="en-US"/>
+          </a:p>
+        </p:txBody>
+      </p:sp>
+      <p:sp>
+        <p:nvSpPr>
+          <p:cNvPr id="12" name="Rectangle: Rounded Corners 11">
+            <a:extLst>
+              <a:ext uri="{FF2B5EF4-FFF2-40B4-BE49-F238E27FC236}">
+                <a16:creationId xmlns:a16="http://schemas.microsoft.com/office/drawing/2014/main" id="{D0F67DF2-0F6E-4E3F-91EA-2FA9641F1561}"/>
+              </a:ext>
+            </a:extLst>
+          </p:cNvPr>
+          <p:cNvSpPr/>
+          <p:nvPr/>
+        </p:nvSpPr>
+        <p:spPr>
+          <a:xfrm>
+            <a:off x="4476305" y="4004929"/>
+            <a:ext cx="3179135" cy="669851"/>
+          </a:xfrm>
+          <a:prstGeom prst="roundRect">
+            <a:avLst/>
+          </a:prstGeom>
+          <a:noFill/>
+          <a:ln w="28575">
+            <a:solidFill>
+              <a:srgbClr val="FF0000"/>
+            </a:solidFill>
+          </a:ln>
+        </p:spPr>
+        <p:style>
+          <a:lnRef idx="2">
+            <a:schemeClr val="accent1">
+              <a:shade val="50000"/>
+            </a:schemeClr>
+          </a:lnRef>
+          <a:fillRef idx="1">
+            <a:schemeClr val="accent1"/>
+          </a:fillRef>
+          <a:effectRef idx="0">
+            <a:schemeClr val="accent1"/>
+          </a:effectRef>
+          <a:fontRef idx="minor">
+            <a:schemeClr val="lt1"/>
+          </a:fontRef>
+        </p:style>
+        <p:txBody>
+          <a:bodyPr rtlCol="0" anchor="ctr"/>
+          <a:lstStyle/>
+          <a:p>
+            <a:pPr algn="ctr"/>
+            <a:endParaRPr lang="en-US"/>
+          </a:p>
+        </p:txBody>
+      </p:sp>
+      <p:sp>
+        <p:nvSpPr>
+          <p:cNvPr id="13" name="Rectangle: Rounded Corners 12">
+            <a:extLst>
+              <a:ext uri="{FF2B5EF4-FFF2-40B4-BE49-F238E27FC236}">
+                <a16:creationId xmlns:a16="http://schemas.microsoft.com/office/drawing/2014/main" id="{6E04B007-B17B-4B89-86E3-2A3E227F5EF0}"/>
+              </a:ext>
+            </a:extLst>
+          </p:cNvPr>
+          <p:cNvSpPr/>
+          <p:nvPr/>
+        </p:nvSpPr>
+        <p:spPr>
+          <a:xfrm>
+            <a:off x="4476304" y="4770804"/>
+            <a:ext cx="3179135" cy="669851"/>
+          </a:xfrm>
+          <a:prstGeom prst="roundRect">
+            <a:avLst/>
+          </a:prstGeom>
+          <a:noFill/>
+          <a:ln w="28575">
+            <a:solidFill>
+              <a:srgbClr val="FF0000"/>
+            </a:solidFill>
+          </a:ln>
+        </p:spPr>
+        <p:style>
+          <a:lnRef idx="2">
+            <a:schemeClr val="accent1">
+              <a:shade val="50000"/>
+            </a:schemeClr>
+          </a:lnRef>
+          <a:fillRef idx="1">
+            <a:schemeClr val="accent1"/>
+          </a:fillRef>
+          <a:effectRef idx="0">
+            <a:schemeClr val="accent1"/>
+          </a:effectRef>
+          <a:fontRef idx="minor">
+            <a:schemeClr val="lt1"/>
+          </a:fontRef>
+        </p:style>
+        <p:txBody>
+          <a:bodyPr rtlCol="0" anchor="ctr"/>
+          <a:lstStyle/>
+          <a:p>
+            <a:pPr algn="ctr"/>
+            <a:endParaRPr lang="en-US"/>
+          </a:p>
+        </p:txBody>
+      </p:sp>
+      <p:cxnSp>
+        <p:nvCxnSpPr>
+          <p:cNvPr id="14" name="Straight Arrow Connector 13">
+            <a:extLst>
+              <a:ext uri="{FF2B5EF4-FFF2-40B4-BE49-F238E27FC236}">
+                <a16:creationId xmlns:a16="http://schemas.microsoft.com/office/drawing/2014/main" id="{DB9931C8-C5FC-43D7-8AF4-AEEC3EF53467}"/>
+              </a:ext>
+            </a:extLst>
+          </p:cNvPr>
+          <p:cNvCxnSpPr>
+            <a:cxnSpLocks/>
+            <a:stCxn id="10" idx="1"/>
+            <a:endCxn id="16" idx="3"/>
+          </p:cNvCxnSpPr>
+          <p:nvPr/>
+        </p:nvCxnSpPr>
+        <p:spPr>
+          <a:xfrm flipH="1" flipV="1">
+            <a:off x="3233276" y="2064753"/>
+            <a:ext cx="1243031" cy="747558"/>
+          </a:xfrm>
+          <a:prstGeom prst="straightConnector1">
+            <a:avLst/>
+          </a:prstGeom>
+          <a:ln w="38100">
+            <a:solidFill>
+              <a:srgbClr val="FF0000"/>
+            </a:solidFill>
+            <a:tailEnd type="triangle" w="lg" len="lg"/>
+          </a:ln>
+        </p:spPr>
+        <p:style>
+          <a:lnRef idx="1">
+            <a:schemeClr val="accent1"/>
+          </a:lnRef>
+          <a:fillRef idx="0">
+            <a:schemeClr val="accent1"/>
+          </a:fillRef>
+          <a:effectRef idx="0">
+            <a:schemeClr val="accent1"/>
+          </a:effectRef>
+          <a:fontRef idx="minor">
+            <a:schemeClr val="tx1"/>
+          </a:fontRef>
+        </p:style>
+      </p:cxnSp>
+      <p:cxnSp>
+        <p:nvCxnSpPr>
+          <p:cNvPr id="18" name="Straight Arrow Connector 17">
+            <a:extLst>
+              <a:ext uri="{FF2B5EF4-FFF2-40B4-BE49-F238E27FC236}">
+                <a16:creationId xmlns:a16="http://schemas.microsoft.com/office/drawing/2014/main" id="{91B416B8-BF05-4B25-8166-D2F0B83FAAA3}"/>
+              </a:ext>
+            </a:extLst>
+          </p:cNvPr>
+          <p:cNvCxnSpPr>
+            <a:cxnSpLocks/>
+            <a:stCxn id="11" idx="1"/>
+            <a:endCxn id="21" idx="3"/>
+          </p:cNvCxnSpPr>
+          <p:nvPr/>
+        </p:nvCxnSpPr>
+        <p:spPr>
+          <a:xfrm flipH="1" flipV="1">
+            <a:off x="3233276" y="3557009"/>
+            <a:ext cx="1243030" cy="6006"/>
+          </a:xfrm>
+          <a:prstGeom prst="straightConnector1">
+            <a:avLst/>
+          </a:prstGeom>
+          <a:ln w="38100">
+            <a:solidFill>
+              <a:srgbClr val="FF0000"/>
+            </a:solidFill>
+            <a:tailEnd type="triangle" w="lg" len="lg"/>
+          </a:ln>
+        </p:spPr>
+        <p:style>
+          <a:lnRef idx="1">
+            <a:schemeClr val="accent1"/>
+          </a:lnRef>
+          <a:fillRef idx="0">
+            <a:schemeClr val="accent1"/>
+          </a:fillRef>
+          <a:effectRef idx="0">
+            <a:schemeClr val="accent1"/>
+          </a:effectRef>
+          <a:fontRef idx="minor">
+            <a:schemeClr val="tx1"/>
+          </a:fontRef>
+        </p:style>
+      </p:cxnSp>
+      <p:cxnSp>
+        <p:nvCxnSpPr>
+          <p:cNvPr id="23" name="Straight Arrow Connector 22">
+            <a:extLst>
+              <a:ext uri="{FF2B5EF4-FFF2-40B4-BE49-F238E27FC236}">
+                <a16:creationId xmlns:a16="http://schemas.microsoft.com/office/drawing/2014/main" id="{82AC3984-80BA-4A8B-BB26-466002F48347}"/>
+              </a:ext>
+            </a:extLst>
+          </p:cNvPr>
+          <p:cNvCxnSpPr>
+            <a:cxnSpLocks/>
+            <a:stCxn id="12" idx="1"/>
+          </p:cNvCxnSpPr>
+          <p:nvPr/>
+        </p:nvCxnSpPr>
+        <p:spPr>
+          <a:xfrm flipH="1">
+            <a:off x="3209465" y="4339855"/>
+            <a:ext cx="1266840" cy="588665"/>
+          </a:xfrm>
+          <a:prstGeom prst="straightConnector1">
+            <a:avLst/>
+          </a:prstGeom>
+          <a:ln w="38100">
+            <a:solidFill>
+              <a:srgbClr val="FF0000"/>
+            </a:solidFill>
+            <a:tailEnd type="triangle" w="lg" len="lg"/>
+          </a:ln>
+        </p:spPr>
+        <p:style>
+          <a:lnRef idx="1">
+            <a:schemeClr val="accent1"/>
+          </a:lnRef>
+          <a:fillRef idx="0">
+            <a:schemeClr val="accent1"/>
+          </a:fillRef>
+          <a:effectRef idx="0">
+            <a:schemeClr val="accent1"/>
+          </a:effectRef>
+          <a:fontRef idx="minor">
+            <a:schemeClr val="tx1"/>
+          </a:fontRef>
+        </p:style>
+      </p:cxnSp>
+      <p:cxnSp>
+        <p:nvCxnSpPr>
+          <p:cNvPr id="30" name="Straight Arrow Connector 29">
+            <a:extLst>
+              <a:ext uri="{FF2B5EF4-FFF2-40B4-BE49-F238E27FC236}">
+                <a16:creationId xmlns:a16="http://schemas.microsoft.com/office/drawing/2014/main" id="{54FBB9B3-BDEA-4130-A67D-161727DDE255}"/>
+              </a:ext>
+            </a:extLst>
+          </p:cNvPr>
+          <p:cNvCxnSpPr>
+            <a:cxnSpLocks/>
+            <a:stCxn id="13" idx="3"/>
+          </p:cNvCxnSpPr>
+          <p:nvPr/>
+        </p:nvCxnSpPr>
+        <p:spPr>
+          <a:xfrm>
+            <a:off x="7655439" y="5105730"/>
+            <a:ext cx="1327095" cy="10964"/>
+          </a:xfrm>
+          <a:prstGeom prst="straightConnector1">
+            <a:avLst/>
+          </a:prstGeom>
+          <a:ln w="38100">
+            <a:solidFill>
+              <a:srgbClr val="FF0000"/>
+            </a:solidFill>
+            <a:tailEnd type="triangle" w="lg" len="lg"/>
+          </a:ln>
+        </p:spPr>
+        <p:style>
+          <a:lnRef idx="1">
+            <a:schemeClr val="accent1"/>
+          </a:lnRef>
+          <a:fillRef idx="0">
+            <a:schemeClr val="accent1"/>
+          </a:fillRef>
+          <a:effectRef idx="0">
+            <a:schemeClr val="accent1"/>
+          </a:effectRef>
+          <a:fontRef idx="minor">
+            <a:schemeClr val="tx1"/>
+          </a:fontRef>
+        </p:style>
+      </p:cxnSp>
       <p:pic>
         <p:nvPicPr>
-          <p:cNvPr id="6" name="Picture 5">
+          <p:cNvPr id="16" name="Picture 15">
             <a:extLst>
               <a:ext uri="{FF2B5EF4-FFF2-40B4-BE49-F238E27FC236}">
-                <a16:creationId xmlns:a16="http://schemas.microsoft.com/office/drawing/2014/main" id="{2DF8473E-F4D1-4B08-A521-2271808D21DD}"/>
-              </a:ext>
-            </a:extLst>
-          </p:cNvPr>
-          <p:cNvPicPr>
-            <a:picLocks noChangeAspect="1"/>
-          </p:cNvPicPr>
-          <p:nvPr/>
-        </p:nvPicPr>
-        <p:blipFill>
-          <a:blip r:embed="rId3"/>
-          <a:stretch>
-            <a:fillRect/>
-          </a:stretch>
-        </p:blipFill>
-        <p:spPr>
-          <a:xfrm>
-            <a:off x="437690" y="1214548"/>
-            <a:ext cx="2771775" cy="1133475"/>
-          </a:xfrm>
-          <a:prstGeom prst="rect">
-            <a:avLst/>
-          </a:prstGeom>
-          <a:ln>
-            <a:solidFill>
-              <a:schemeClr val="tx1"/>
-            </a:solidFill>
-          </a:ln>
-          <a:effectLst>
-            <a:outerShdw blurRad="50800" dist="38100" dir="2700000" algn="tl" rotWithShape="0">
-              <a:prstClr val="black">
-                <a:alpha val="40000"/>
-              </a:prstClr>
-            </a:outerShdw>
-          </a:effectLst>
-        </p:spPr>
-      </p:pic>
-      <p:pic>
-        <p:nvPicPr>
-          <p:cNvPr id="7" name="Picture 6">
-            <a:extLst>
-              <a:ext uri="{FF2B5EF4-FFF2-40B4-BE49-F238E27FC236}">
-                <a16:creationId xmlns:a16="http://schemas.microsoft.com/office/drawing/2014/main" id="{1CEF302F-E419-4AC5-B246-9B7D853D03BE}"/>
+                <a16:creationId xmlns:a16="http://schemas.microsoft.com/office/drawing/2014/main" id="{B970E343-79EA-4329-863D-AC86A857AEDA}"/>
               </a:ext>
             </a:extLst>
           </p:cNvPr>
@@ -13232,13 +13948,13 @@
         </p:blipFill>
         <p:spPr>
           <a:xfrm>
-            <a:off x="485314" y="3167726"/>
-            <a:ext cx="2752725" cy="790575"/>
+            <a:off x="490076" y="1458963"/>
+            <a:ext cx="2743200" cy="1211580"/>
           </a:xfrm>
           <a:prstGeom prst="rect">
             <a:avLst/>
           </a:prstGeom>
-          <a:ln>
+          <a:ln w="9525">
             <a:solidFill>
               <a:schemeClr val="tx1"/>
             </a:solidFill>
@@ -13254,10 +13970,10 @@
       </p:pic>
       <p:pic>
         <p:nvPicPr>
-          <p:cNvPr id="8" name="Picture 7">
+          <p:cNvPr id="21" name="Picture 20">
             <a:extLst>
               <a:ext uri="{FF2B5EF4-FFF2-40B4-BE49-F238E27FC236}">
-                <a16:creationId xmlns:a16="http://schemas.microsoft.com/office/drawing/2014/main" id="{1655EBD2-8558-43A6-A091-EC3867CB29AF}"/>
+                <a16:creationId xmlns:a16="http://schemas.microsoft.com/office/drawing/2014/main" id="{446C5C06-B264-412D-A88F-B0A34E8FB773}"/>
               </a:ext>
             </a:extLst>
           </p:cNvPr>
@@ -13274,13 +13990,13 @@
         </p:blipFill>
         <p:spPr>
           <a:xfrm>
-            <a:off x="399590" y="4464232"/>
-            <a:ext cx="2809875" cy="2133600"/>
+            <a:off x="490076" y="3147236"/>
+            <a:ext cx="2743200" cy="819546"/>
           </a:xfrm>
           <a:prstGeom prst="rect">
             <a:avLst/>
           </a:prstGeom>
-          <a:ln>
+          <a:ln w="9525">
             <a:solidFill>
               <a:schemeClr val="tx1"/>
             </a:solidFill>
@@ -13296,10 +14012,10 @@
       </p:pic>
       <p:pic>
         <p:nvPicPr>
-          <p:cNvPr id="9" name="Picture 8">
+          <p:cNvPr id="26" name="Picture 25">
             <a:extLst>
               <a:ext uri="{FF2B5EF4-FFF2-40B4-BE49-F238E27FC236}">
-                <a16:creationId xmlns:a16="http://schemas.microsoft.com/office/drawing/2014/main" id="{40DEF4F8-4D1F-4C7A-9251-8D168A6993EB}"/>
+                <a16:creationId xmlns:a16="http://schemas.microsoft.com/office/drawing/2014/main" id="{0C61291C-5132-4AAA-8B87-A51BA969A820}"/>
               </a:ext>
             </a:extLst>
           </p:cNvPr>
@@ -13316,13 +14032,13 @@
         </p:blipFill>
         <p:spPr>
           <a:xfrm>
-            <a:off x="8982534" y="1540057"/>
-            <a:ext cx="2838450" cy="5057775"/>
+            <a:off x="466265" y="4517821"/>
+            <a:ext cx="2743200" cy="1567543"/>
           </a:xfrm>
           <a:prstGeom prst="rect">
             <a:avLst/>
           </a:prstGeom>
-          <a:ln>
+          <a:ln w="9525">
             <a:solidFill>
               <a:schemeClr val="tx1"/>
             </a:solidFill>
@@ -13336,395 +14052,6 @@
           </a:effectLst>
         </p:spPr>
       </p:pic>
-      <p:sp>
-        <p:nvSpPr>
-          <p:cNvPr id="10" name="Rectangle: Rounded Corners 9">
-            <a:extLst>
-              <a:ext uri="{FF2B5EF4-FFF2-40B4-BE49-F238E27FC236}">
-                <a16:creationId xmlns:a16="http://schemas.microsoft.com/office/drawing/2014/main" id="{5E591BA3-DD86-49D3-BB7F-05939465B70F}"/>
-              </a:ext>
-            </a:extLst>
-          </p:cNvPr>
-          <p:cNvSpPr/>
-          <p:nvPr/>
-        </p:nvSpPr>
-        <p:spPr>
-          <a:xfrm>
-            <a:off x="4476307" y="2477385"/>
-            <a:ext cx="3179135" cy="669851"/>
-          </a:xfrm>
-          <a:prstGeom prst="roundRect">
-            <a:avLst/>
-          </a:prstGeom>
-          <a:noFill/>
-          <a:ln w="28575">
-            <a:solidFill>
-              <a:srgbClr val="FF0000"/>
-            </a:solidFill>
-          </a:ln>
-        </p:spPr>
-        <p:style>
-          <a:lnRef idx="2">
-            <a:schemeClr val="accent1">
-              <a:shade val="50000"/>
-            </a:schemeClr>
-          </a:lnRef>
-          <a:fillRef idx="1">
-            <a:schemeClr val="accent1"/>
-          </a:fillRef>
-          <a:effectRef idx="0">
-            <a:schemeClr val="accent1"/>
-          </a:effectRef>
-          <a:fontRef idx="minor">
-            <a:schemeClr val="lt1"/>
-          </a:fontRef>
-        </p:style>
-        <p:txBody>
-          <a:bodyPr rtlCol="0" anchor="ctr"/>
-          <a:lstStyle/>
-          <a:p>
-            <a:pPr algn="ctr"/>
-            <a:endParaRPr lang="en-US"/>
-          </a:p>
-        </p:txBody>
-      </p:sp>
-      <p:sp>
-        <p:nvSpPr>
-          <p:cNvPr id="11" name="Rectangle: Rounded Corners 10">
-            <a:extLst>
-              <a:ext uri="{FF2B5EF4-FFF2-40B4-BE49-F238E27FC236}">
-                <a16:creationId xmlns:a16="http://schemas.microsoft.com/office/drawing/2014/main" id="{9EDA0F31-978E-4E57-A6BB-51E38D86FCD0}"/>
-              </a:ext>
-            </a:extLst>
-          </p:cNvPr>
-          <p:cNvSpPr/>
-          <p:nvPr/>
-        </p:nvSpPr>
-        <p:spPr>
-          <a:xfrm>
-            <a:off x="4476306" y="3228089"/>
-            <a:ext cx="3179135" cy="669851"/>
-          </a:xfrm>
-          <a:prstGeom prst="roundRect">
-            <a:avLst/>
-          </a:prstGeom>
-          <a:noFill/>
-          <a:ln w="28575">
-            <a:solidFill>
-              <a:srgbClr val="FF0000"/>
-            </a:solidFill>
-          </a:ln>
-        </p:spPr>
-        <p:style>
-          <a:lnRef idx="2">
-            <a:schemeClr val="accent1">
-              <a:shade val="50000"/>
-            </a:schemeClr>
-          </a:lnRef>
-          <a:fillRef idx="1">
-            <a:schemeClr val="accent1"/>
-          </a:fillRef>
-          <a:effectRef idx="0">
-            <a:schemeClr val="accent1"/>
-          </a:effectRef>
-          <a:fontRef idx="minor">
-            <a:schemeClr val="lt1"/>
-          </a:fontRef>
-        </p:style>
-        <p:txBody>
-          <a:bodyPr rtlCol="0" anchor="ctr"/>
-          <a:lstStyle/>
-          <a:p>
-            <a:pPr algn="ctr"/>
-            <a:endParaRPr lang="en-US"/>
-          </a:p>
-        </p:txBody>
-      </p:sp>
-      <p:sp>
-        <p:nvSpPr>
-          <p:cNvPr id="12" name="Rectangle: Rounded Corners 11">
-            <a:extLst>
-              <a:ext uri="{FF2B5EF4-FFF2-40B4-BE49-F238E27FC236}">
-                <a16:creationId xmlns:a16="http://schemas.microsoft.com/office/drawing/2014/main" id="{D0F67DF2-0F6E-4E3F-91EA-2FA9641F1561}"/>
-              </a:ext>
-            </a:extLst>
-          </p:cNvPr>
-          <p:cNvSpPr/>
-          <p:nvPr/>
-        </p:nvSpPr>
-        <p:spPr>
-          <a:xfrm>
-            <a:off x="4476305" y="4004929"/>
-            <a:ext cx="3179135" cy="669851"/>
-          </a:xfrm>
-          <a:prstGeom prst="roundRect">
-            <a:avLst/>
-          </a:prstGeom>
-          <a:noFill/>
-          <a:ln w="28575">
-            <a:solidFill>
-              <a:srgbClr val="FF0000"/>
-            </a:solidFill>
-          </a:ln>
-        </p:spPr>
-        <p:style>
-          <a:lnRef idx="2">
-            <a:schemeClr val="accent1">
-              <a:shade val="50000"/>
-            </a:schemeClr>
-          </a:lnRef>
-          <a:fillRef idx="1">
-            <a:schemeClr val="accent1"/>
-          </a:fillRef>
-          <a:effectRef idx="0">
-            <a:schemeClr val="accent1"/>
-          </a:effectRef>
-          <a:fontRef idx="minor">
-            <a:schemeClr val="lt1"/>
-          </a:fontRef>
-        </p:style>
-        <p:txBody>
-          <a:bodyPr rtlCol="0" anchor="ctr"/>
-          <a:lstStyle/>
-          <a:p>
-            <a:pPr algn="ctr"/>
-            <a:endParaRPr lang="en-US"/>
-          </a:p>
-        </p:txBody>
-      </p:sp>
-      <p:sp>
-        <p:nvSpPr>
-          <p:cNvPr id="13" name="Rectangle: Rounded Corners 12">
-            <a:extLst>
-              <a:ext uri="{FF2B5EF4-FFF2-40B4-BE49-F238E27FC236}">
-                <a16:creationId xmlns:a16="http://schemas.microsoft.com/office/drawing/2014/main" id="{6E04B007-B17B-4B89-86E3-2A3E227F5EF0}"/>
-              </a:ext>
-            </a:extLst>
-          </p:cNvPr>
-          <p:cNvSpPr/>
-          <p:nvPr/>
-        </p:nvSpPr>
-        <p:spPr>
-          <a:xfrm>
-            <a:off x="4476304" y="4770804"/>
-            <a:ext cx="3179135" cy="669851"/>
-          </a:xfrm>
-          <a:prstGeom prst="roundRect">
-            <a:avLst/>
-          </a:prstGeom>
-          <a:noFill/>
-          <a:ln w="28575">
-            <a:solidFill>
-              <a:srgbClr val="FF0000"/>
-            </a:solidFill>
-          </a:ln>
-        </p:spPr>
-        <p:style>
-          <a:lnRef idx="2">
-            <a:schemeClr val="accent1">
-              <a:shade val="50000"/>
-            </a:schemeClr>
-          </a:lnRef>
-          <a:fillRef idx="1">
-            <a:schemeClr val="accent1"/>
-          </a:fillRef>
-          <a:effectRef idx="0">
-            <a:schemeClr val="accent1"/>
-          </a:effectRef>
-          <a:fontRef idx="minor">
-            <a:schemeClr val="lt1"/>
-          </a:fontRef>
-        </p:style>
-        <p:txBody>
-          <a:bodyPr rtlCol="0" anchor="ctr"/>
-          <a:lstStyle/>
-          <a:p>
-            <a:pPr algn="ctr"/>
-            <a:endParaRPr lang="en-US"/>
-          </a:p>
-        </p:txBody>
-      </p:sp>
-      <p:cxnSp>
-        <p:nvCxnSpPr>
-          <p:cNvPr id="14" name="Straight Arrow Connector 13">
-            <a:extLst>
-              <a:ext uri="{FF2B5EF4-FFF2-40B4-BE49-F238E27FC236}">
-                <a16:creationId xmlns:a16="http://schemas.microsoft.com/office/drawing/2014/main" id="{DB9931C8-C5FC-43D7-8AF4-AEEC3EF53467}"/>
-              </a:ext>
-            </a:extLst>
-          </p:cNvPr>
-          <p:cNvCxnSpPr>
-            <a:cxnSpLocks/>
-            <a:stCxn id="10" idx="1"/>
-          </p:cNvCxnSpPr>
-          <p:nvPr/>
-        </p:nvCxnSpPr>
-        <p:spPr>
-          <a:xfrm flipH="1" flipV="1">
-            <a:off x="3209465" y="2142460"/>
-            <a:ext cx="1266842" cy="669851"/>
-          </a:xfrm>
-          <a:prstGeom prst="straightConnector1">
-            <a:avLst/>
-          </a:prstGeom>
-          <a:ln w="38100">
-            <a:solidFill>
-              <a:srgbClr val="FF0000"/>
-            </a:solidFill>
-            <a:tailEnd type="triangle" w="lg" len="lg"/>
-          </a:ln>
-        </p:spPr>
-        <p:style>
-          <a:lnRef idx="1">
-            <a:schemeClr val="accent1"/>
-          </a:lnRef>
-          <a:fillRef idx="0">
-            <a:schemeClr val="accent1"/>
-          </a:fillRef>
-          <a:effectRef idx="0">
-            <a:schemeClr val="accent1"/>
-          </a:effectRef>
-          <a:fontRef idx="minor">
-            <a:schemeClr val="tx1"/>
-          </a:fontRef>
-        </p:style>
-      </p:cxnSp>
-      <p:cxnSp>
-        <p:nvCxnSpPr>
-          <p:cNvPr id="18" name="Straight Arrow Connector 17">
-            <a:extLst>
-              <a:ext uri="{FF2B5EF4-FFF2-40B4-BE49-F238E27FC236}">
-                <a16:creationId xmlns:a16="http://schemas.microsoft.com/office/drawing/2014/main" id="{91B416B8-BF05-4B25-8166-D2F0B83FAAA3}"/>
-              </a:ext>
-            </a:extLst>
-          </p:cNvPr>
-          <p:cNvCxnSpPr>
-            <a:cxnSpLocks/>
-            <a:stCxn id="11" idx="1"/>
-            <a:endCxn id="7" idx="3"/>
-          </p:cNvCxnSpPr>
-          <p:nvPr/>
-        </p:nvCxnSpPr>
-        <p:spPr>
-          <a:xfrm flipH="1" flipV="1">
-            <a:off x="3238039" y="3563014"/>
-            <a:ext cx="1238267" cy="1"/>
-          </a:xfrm>
-          <a:prstGeom prst="straightConnector1">
-            <a:avLst/>
-          </a:prstGeom>
-          <a:ln w="38100">
-            <a:solidFill>
-              <a:srgbClr val="FF0000"/>
-            </a:solidFill>
-            <a:tailEnd type="triangle" w="lg" len="lg"/>
-          </a:ln>
-        </p:spPr>
-        <p:style>
-          <a:lnRef idx="1">
-            <a:schemeClr val="accent1"/>
-          </a:lnRef>
-          <a:fillRef idx="0">
-            <a:schemeClr val="accent1"/>
-          </a:fillRef>
-          <a:effectRef idx="0">
-            <a:schemeClr val="accent1"/>
-          </a:effectRef>
-          <a:fontRef idx="minor">
-            <a:schemeClr val="tx1"/>
-          </a:fontRef>
-        </p:style>
-      </p:cxnSp>
-      <p:cxnSp>
-        <p:nvCxnSpPr>
-          <p:cNvPr id="23" name="Straight Arrow Connector 22">
-            <a:extLst>
-              <a:ext uri="{FF2B5EF4-FFF2-40B4-BE49-F238E27FC236}">
-                <a16:creationId xmlns:a16="http://schemas.microsoft.com/office/drawing/2014/main" id="{82AC3984-80BA-4A8B-BB26-466002F48347}"/>
-              </a:ext>
-            </a:extLst>
-          </p:cNvPr>
-          <p:cNvCxnSpPr>
-            <a:cxnSpLocks/>
-            <a:stCxn id="12" idx="1"/>
-          </p:cNvCxnSpPr>
-          <p:nvPr/>
-        </p:nvCxnSpPr>
-        <p:spPr>
-          <a:xfrm flipH="1">
-            <a:off x="3209465" y="4339855"/>
-            <a:ext cx="1266840" cy="588665"/>
-          </a:xfrm>
-          <a:prstGeom prst="straightConnector1">
-            <a:avLst/>
-          </a:prstGeom>
-          <a:ln w="38100">
-            <a:solidFill>
-              <a:srgbClr val="FF0000"/>
-            </a:solidFill>
-            <a:tailEnd type="triangle" w="lg" len="lg"/>
-          </a:ln>
-        </p:spPr>
-        <p:style>
-          <a:lnRef idx="1">
-            <a:schemeClr val="accent1"/>
-          </a:lnRef>
-          <a:fillRef idx="0">
-            <a:schemeClr val="accent1"/>
-          </a:fillRef>
-          <a:effectRef idx="0">
-            <a:schemeClr val="accent1"/>
-          </a:effectRef>
-          <a:fontRef idx="minor">
-            <a:schemeClr val="tx1"/>
-          </a:fontRef>
-        </p:style>
-      </p:cxnSp>
-      <p:cxnSp>
-        <p:nvCxnSpPr>
-          <p:cNvPr id="30" name="Straight Arrow Connector 29">
-            <a:extLst>
-              <a:ext uri="{FF2B5EF4-FFF2-40B4-BE49-F238E27FC236}">
-                <a16:creationId xmlns:a16="http://schemas.microsoft.com/office/drawing/2014/main" id="{54FBB9B3-BDEA-4130-A67D-161727DDE255}"/>
-              </a:ext>
-            </a:extLst>
-          </p:cNvPr>
-          <p:cNvCxnSpPr>
-            <a:cxnSpLocks/>
-            <a:stCxn id="13" idx="3"/>
-          </p:cNvCxnSpPr>
-          <p:nvPr/>
-        </p:nvCxnSpPr>
-        <p:spPr>
-          <a:xfrm>
-            <a:off x="7655439" y="5105730"/>
-            <a:ext cx="1327095" cy="10964"/>
-          </a:xfrm>
-          <a:prstGeom prst="straightConnector1">
-            <a:avLst/>
-          </a:prstGeom>
-          <a:ln w="38100">
-            <a:solidFill>
-              <a:srgbClr val="FF0000"/>
-            </a:solidFill>
-            <a:tailEnd type="triangle" w="lg" len="lg"/>
-          </a:ln>
-        </p:spPr>
-        <p:style>
-          <a:lnRef idx="1">
-            <a:schemeClr val="accent1"/>
-          </a:lnRef>
-          <a:fillRef idx="0">
-            <a:schemeClr val="accent1"/>
-          </a:fillRef>
-          <a:effectRef idx="0">
-            <a:schemeClr val="accent1"/>
-          </a:effectRef>
-          <a:fontRef idx="minor">
-            <a:schemeClr val="tx1"/>
-          </a:fontRef>
-        </p:style>
-      </p:cxnSp>
     </p:spTree>
     <p:extLst>
       <p:ext uri="{BB962C8B-B14F-4D97-AF65-F5344CB8AC3E}">
@@ -13757,32 +14084,38 @@
       </p:grpSpPr>
       <p:pic>
         <p:nvPicPr>
-          <p:cNvPr id="4" name="Picture 3">
+          <p:cNvPr id="2050" name="Picture 2">
             <a:extLst>
               <a:ext uri="{FF2B5EF4-FFF2-40B4-BE49-F238E27FC236}">
-                <a16:creationId xmlns:a16="http://schemas.microsoft.com/office/drawing/2014/main" id="{339CCFC0-CF5B-427B-983A-1DA831CC0891}"/>
+                <a16:creationId xmlns:a16="http://schemas.microsoft.com/office/drawing/2014/main" id="{23F2515C-E2F0-4987-B430-0244A2BADC87}"/>
               </a:ext>
             </a:extLst>
           </p:cNvPr>
           <p:cNvPicPr>
-            <a:picLocks noChangeAspect="1"/>
+            <a:picLocks noChangeAspect="1" noChangeArrowheads="1"/>
           </p:cNvPicPr>
           <p:nvPr/>
         </p:nvPicPr>
-        <p:blipFill>
-          <a:blip r:embed="rId2"/>
-          <a:stretch>
-            <a:fillRect/>
-          </a:stretch>
+        <p:blipFill rotWithShape="1">
+          <a:blip r:embed="rId2">
+            <a:extLst>
+              <a:ext uri="{28A0092B-C50C-407E-A947-70E740481C1C}">
+                <a14:useLocalDpi xmlns:a14="http://schemas.microsoft.com/office/drawing/2010/main" val="0"/>
+              </a:ext>
+            </a:extLst>
+          </a:blip>
+          <a:srcRect b="4161"/>
+          <a:stretch/>
         </p:blipFill>
-        <p:spPr>
+        <p:spPr bwMode="auto">
           <a:xfrm>
-            <a:off x="312928" y="1187047"/>
-            <a:ext cx="8320710" cy="5363086"/>
+            <a:off x="713473" y="1169115"/>
+            <a:ext cx="8320710" cy="5524349"/>
           </a:xfrm>
           <a:prstGeom prst="rect">
             <a:avLst/>
           </a:prstGeom>
+          <a:noFill/>
           <a:ln>
             <a:solidFill>
               <a:schemeClr val="tx1"/>
@@ -13795,6 +14128,15 @@
               </a:prstClr>
             </a:outerShdw>
           </a:effectLst>
+          <a:extLst>
+            <a:ext uri="{909E8E84-426E-40DD-AFC4-6F175D3DCCD1}">
+              <a14:hiddenFill xmlns:a14="http://schemas.microsoft.com/office/drawing/2010/main">
+                <a:solidFill>
+                  <a:srgbClr val="FFFFFF"/>
+                </a:solidFill>
+              </a14:hiddenFill>
+            </a:ext>
+          </a:extLst>
         </p:spPr>
       </p:pic>
       <p:sp>
@@ -13967,7 +14309,7 @@
         </p:nvSpPr>
         <p:spPr>
           <a:xfrm>
-            <a:off x="7842064" y="1199576"/>
+            <a:off x="8259315" y="1199576"/>
             <a:ext cx="281065" cy="210650"/>
           </a:xfrm>
           <a:prstGeom prst="roundRect">
@@ -14023,8 +14365,8 @@
         </p:nvCxnSpPr>
         <p:spPr>
           <a:xfrm flipH="1" flipV="1">
-            <a:off x="6246277" y="461722"/>
-            <a:ext cx="992451" cy="855045"/>
+            <a:off x="5882293" y="537242"/>
+            <a:ext cx="1356435" cy="779525"/>
           </a:xfrm>
           <a:prstGeom prst="straightConnector1">
             <a:avLst/>
@@ -14065,7 +14407,7 @@
         </p:nvSpPr>
         <p:spPr>
           <a:xfrm>
-            <a:off x="4423145" y="193675"/>
+            <a:off x="4059161" y="269195"/>
             <a:ext cx="1823132" cy="536093"/>
           </a:xfrm>
           <a:prstGeom prst="roundRect">
@@ -14112,14 +14454,14 @@
           <p:cNvCxnSpPr>
             <a:cxnSpLocks/>
             <a:stCxn id="7" idx="0"/>
-            <a:endCxn id="22" idx="1"/>
+            <a:endCxn id="22" idx="2"/>
           </p:cNvCxnSpPr>
           <p:nvPr/>
         </p:nvCxnSpPr>
         <p:spPr>
-          <a:xfrm flipV="1">
-            <a:off x="7527887" y="441461"/>
-            <a:ext cx="839178" cy="794375"/>
+          <a:xfrm flipH="1" flipV="1">
+            <a:off x="7520441" y="806115"/>
+            <a:ext cx="7446" cy="429721"/>
           </a:xfrm>
           <a:prstGeom prst="straightConnector1">
             <a:avLst/>
@@ -14160,7 +14502,7 @@
         </p:nvSpPr>
         <p:spPr>
           <a:xfrm>
-            <a:off x="8367065" y="173414"/>
+            <a:off x="6808933" y="270022"/>
             <a:ext cx="1423016" cy="536093"/>
           </a:xfrm>
           <a:prstGeom prst="roundRect">
@@ -14214,7 +14556,7 @@
         </p:nvSpPr>
         <p:spPr>
           <a:xfrm>
-            <a:off x="9649345" y="3140691"/>
+            <a:off x="9034183" y="254731"/>
             <a:ext cx="1423016" cy="576617"/>
           </a:xfrm>
           <a:prstGeom prst="roundRect">
@@ -14260,15 +14602,15 @@
           </p:cNvPr>
           <p:cNvCxnSpPr>
             <a:cxnSpLocks/>
-            <a:stCxn id="8" idx="2"/>
+            <a:stCxn id="8" idx="0"/>
             <a:endCxn id="29" idx="1"/>
           </p:cNvCxnSpPr>
           <p:nvPr/>
         </p:nvCxnSpPr>
         <p:spPr>
-          <a:xfrm>
-            <a:off x="7731130" y="1397697"/>
-            <a:ext cx="1918215" cy="2031303"/>
+          <a:xfrm flipV="1">
+            <a:off x="7731130" y="543040"/>
+            <a:ext cx="1303053" cy="692796"/>
           </a:xfrm>
           <a:prstGeom prst="straightConnector1">
             <a:avLst/>
@@ -14309,7 +14651,7 @@
         </p:nvSpPr>
         <p:spPr>
           <a:xfrm>
-            <a:off x="9649345" y="1605075"/>
+            <a:off x="9649345" y="1258107"/>
             <a:ext cx="1423016" cy="576617"/>
           </a:xfrm>
           <a:prstGeom prst="roundRect">
@@ -14362,8 +14704,8 @@
         </p:nvCxnSpPr>
         <p:spPr>
           <a:xfrm>
-            <a:off x="8123129" y="1304901"/>
-            <a:ext cx="1526216" cy="588483"/>
+            <a:off x="8540380" y="1304901"/>
+            <a:ext cx="1108965" cy="241515"/>
           </a:xfrm>
           <a:prstGeom prst="straightConnector1">
             <a:avLst/>
@@ -14447,6 +14789,153 @@
           </a:p>
         </p:txBody>
       </p:sp>
+      <p:sp>
+        <p:nvSpPr>
+          <p:cNvPr id="17" name="Rectangle: Rounded Corners 16">
+            <a:extLst>
+              <a:ext uri="{FF2B5EF4-FFF2-40B4-BE49-F238E27FC236}">
+                <a16:creationId xmlns:a16="http://schemas.microsoft.com/office/drawing/2014/main" id="{631DA5C8-9E4E-47DB-AA54-AD0D53A6EF1E}"/>
+              </a:ext>
+            </a:extLst>
+          </p:cNvPr>
+          <p:cNvSpPr/>
+          <p:nvPr/>
+        </p:nvSpPr>
+        <p:spPr>
+          <a:xfrm>
+            <a:off x="7825787" y="1201052"/>
+            <a:ext cx="411480" cy="210650"/>
+          </a:xfrm>
+          <a:prstGeom prst="roundRect">
+            <a:avLst/>
+          </a:prstGeom>
+          <a:noFill/>
+          <a:ln w="19050">
+            <a:solidFill>
+              <a:srgbClr val="FF0000"/>
+            </a:solidFill>
+          </a:ln>
+        </p:spPr>
+        <p:style>
+          <a:lnRef idx="2">
+            <a:schemeClr val="accent1">
+              <a:shade val="50000"/>
+            </a:schemeClr>
+          </a:lnRef>
+          <a:fillRef idx="1">
+            <a:schemeClr val="accent1"/>
+          </a:fillRef>
+          <a:effectRef idx="0">
+            <a:schemeClr val="accent1"/>
+          </a:effectRef>
+          <a:fontRef idx="minor">
+            <a:schemeClr val="lt1"/>
+          </a:fontRef>
+        </p:style>
+        <p:txBody>
+          <a:bodyPr rtlCol="0" anchor="ctr"/>
+          <a:lstStyle/>
+          <a:p>
+            <a:pPr algn="ctr"/>
+            <a:endParaRPr lang="en-US"/>
+          </a:p>
+        </p:txBody>
+      </p:sp>
+      <p:sp>
+        <p:nvSpPr>
+          <p:cNvPr id="19" name="Rectangle: Rounded Corners 18">
+            <a:extLst>
+              <a:ext uri="{FF2B5EF4-FFF2-40B4-BE49-F238E27FC236}">
+                <a16:creationId xmlns:a16="http://schemas.microsoft.com/office/drawing/2014/main" id="{407F4F0D-F4AB-4D3E-9BE4-A9445FC0D555}"/>
+              </a:ext>
+            </a:extLst>
+          </p:cNvPr>
+          <p:cNvSpPr/>
+          <p:nvPr/>
+        </p:nvSpPr>
+        <p:spPr>
+          <a:xfrm>
+            <a:off x="9649345" y="2199399"/>
+            <a:ext cx="1423016" cy="576617"/>
+          </a:xfrm>
+          <a:prstGeom prst="roundRect">
+            <a:avLst/>
+          </a:prstGeom>
+        </p:spPr>
+        <p:style>
+          <a:lnRef idx="2">
+            <a:schemeClr val="accent1">
+              <a:shade val="50000"/>
+            </a:schemeClr>
+          </a:lnRef>
+          <a:fillRef idx="1">
+            <a:schemeClr val="accent1"/>
+          </a:fillRef>
+          <a:effectRef idx="0">
+            <a:schemeClr val="accent1"/>
+          </a:effectRef>
+          <a:fontRef idx="minor">
+            <a:schemeClr val="lt1"/>
+          </a:fontRef>
+        </p:style>
+        <p:txBody>
+          <a:bodyPr rtlCol="0" anchor="ctr"/>
+          <a:lstStyle/>
+          <a:p>
+            <a:pPr algn="ctr"/>
+            <a:r>
+              <a:rPr lang="en-US" dirty="0"/>
+              <a:t>5. Preload</a:t>
+            </a:r>
+          </a:p>
+        </p:txBody>
+      </p:sp>
+      <p:cxnSp>
+        <p:nvCxnSpPr>
+          <p:cNvPr id="20" name="Straight Arrow Connector 19">
+            <a:extLst>
+              <a:ext uri="{FF2B5EF4-FFF2-40B4-BE49-F238E27FC236}">
+                <a16:creationId xmlns:a16="http://schemas.microsoft.com/office/drawing/2014/main" id="{A4B9FC14-7B06-4CA8-B4A2-5C34084E2318}"/>
+              </a:ext>
+            </a:extLst>
+          </p:cNvPr>
+          <p:cNvCxnSpPr>
+            <a:cxnSpLocks/>
+            <a:stCxn id="17" idx="2"/>
+            <a:endCxn id="19" idx="1"/>
+          </p:cNvCxnSpPr>
+          <p:nvPr/>
+        </p:nvCxnSpPr>
+        <p:spPr>
+          <a:xfrm>
+            <a:off x="8031527" y="1411702"/>
+            <a:ext cx="1617818" cy="1076006"/>
+          </a:xfrm>
+          <a:prstGeom prst="straightConnector1">
+            <a:avLst/>
+          </a:prstGeom>
+          <a:ln w="19050">
+            <a:solidFill>
+              <a:srgbClr val="FF0000"/>
+            </a:solidFill>
+            <a:tailEnd type="triangle" w="lg" len="lg"/>
+          </a:ln>
+        </p:spPr>
+        <p:style>
+          <a:lnRef idx="1">
+            <a:schemeClr val="accent1"/>
+          </a:lnRef>
+          <a:fillRef idx="0">
+            <a:schemeClr val="accent1"/>
+          </a:fillRef>
+          <a:effectRef idx="0">
+            <a:schemeClr val="accent1"/>
+          </a:effectRef>
+          <a:fontRef idx="minor">
+            <a:schemeClr val="tx1"/>
+          </a:fontRef>
+        </p:style>
+      </p:cxnSp>
     </p:spTree>
     <p:extLst>
       <p:ext uri="{BB962C8B-B14F-4D97-AF65-F5344CB8AC3E}">
@@ -14479,32 +14968,38 @@
       </p:grpSpPr>
       <p:pic>
         <p:nvPicPr>
-          <p:cNvPr id="5" name="Picture 4">
+          <p:cNvPr id="13" name="Picture 8">
             <a:extLst>
               <a:ext uri="{FF2B5EF4-FFF2-40B4-BE49-F238E27FC236}">
-                <a16:creationId xmlns:a16="http://schemas.microsoft.com/office/drawing/2014/main" id="{1FFE2715-686B-4742-94F8-AAF43F7F276A}"/>
+                <a16:creationId xmlns:a16="http://schemas.microsoft.com/office/drawing/2014/main" id="{24F79C05-97CC-4DF2-8EB0-5F7C836F583C}"/>
               </a:ext>
             </a:extLst>
           </p:cNvPr>
           <p:cNvPicPr>
-            <a:picLocks noChangeAspect="1"/>
+            <a:picLocks noChangeAspect="1" noChangeArrowheads="1"/>
           </p:cNvPicPr>
           <p:nvPr/>
         </p:nvPicPr>
-        <p:blipFill>
-          <a:blip r:embed="rId2"/>
-          <a:stretch>
-            <a:fillRect/>
-          </a:stretch>
+        <p:blipFill rotWithShape="1">
+          <a:blip r:embed="rId2">
+            <a:extLst>
+              <a:ext uri="{28A0092B-C50C-407E-A947-70E740481C1C}">
+                <a14:useLocalDpi xmlns:a14="http://schemas.microsoft.com/office/drawing/2010/main" val="0"/>
+              </a:ext>
+            </a:extLst>
+          </a:blip>
+          <a:srcRect b="4154"/>
+          <a:stretch/>
         </p:blipFill>
-        <p:spPr>
+        <p:spPr bwMode="auto">
           <a:xfrm>
-            <a:off x="462335" y="1169772"/>
-            <a:ext cx="7924599" cy="5176001"/>
+            <a:off x="491557" y="1159808"/>
+            <a:ext cx="7931799" cy="5266552"/>
           </a:xfrm>
           <a:prstGeom prst="rect">
             <a:avLst/>
           </a:prstGeom>
+          <a:noFill/>
           <a:ln>
             <a:solidFill>
               <a:schemeClr val="tx1"/>
@@ -14517,6 +15012,15 @@
               </a:prstClr>
             </a:outerShdw>
           </a:effectLst>
+          <a:extLst>
+            <a:ext uri="{909E8E84-426E-40DD-AFC4-6F175D3DCCD1}">
+              <a14:hiddenFill xmlns:a14="http://schemas.microsoft.com/office/drawing/2010/main">
+                <a:solidFill>
+                  <a:srgbClr val="FFFFFF"/>
+                </a:solidFill>
+              </a14:hiddenFill>
+            </a:ext>
+          </a:extLst>
         </p:spPr>
       </p:pic>
       <p:sp>
@@ -14533,7 +15037,7 @@
         </p:nvSpPr>
         <p:spPr>
           <a:xfrm>
-            <a:off x="6996701" y="1181528"/>
+            <a:off x="6668225" y="1181528"/>
             <a:ext cx="236305" cy="236306"/>
           </a:xfrm>
           <a:prstGeom prst="ellipse">
@@ -14571,12 +15075,115 @@
           </a:p>
         </p:txBody>
       </p:sp>
+      <p:cxnSp>
+        <p:nvCxnSpPr>
+          <p:cNvPr id="8" name="Straight Arrow Connector 7">
+            <a:extLst>
+              <a:ext uri="{FF2B5EF4-FFF2-40B4-BE49-F238E27FC236}">
+                <a16:creationId xmlns:a16="http://schemas.microsoft.com/office/drawing/2014/main" id="{E00FDCFA-85FC-4BB0-AFCB-AB115446B6EB}"/>
+              </a:ext>
+            </a:extLst>
+          </p:cNvPr>
+          <p:cNvCxnSpPr>
+            <a:cxnSpLocks/>
+            <a:stCxn id="6" idx="5"/>
+            <a:endCxn id="3" idx="1"/>
+          </p:cNvCxnSpPr>
+          <p:nvPr/>
+        </p:nvCxnSpPr>
+        <p:spPr>
+          <a:xfrm>
+            <a:off x="6869924" y="1383228"/>
+            <a:ext cx="2078441" cy="1581442"/>
+          </a:xfrm>
+          <a:prstGeom prst="straightConnector1">
+            <a:avLst/>
+          </a:prstGeom>
+          <a:ln w="28575">
+            <a:solidFill>
+              <a:srgbClr val="FF0000"/>
+            </a:solidFill>
+            <a:tailEnd type="triangle" w="lg" len="lg"/>
+          </a:ln>
+        </p:spPr>
+        <p:style>
+          <a:lnRef idx="1">
+            <a:schemeClr val="accent1"/>
+          </a:lnRef>
+          <a:fillRef idx="0">
+            <a:schemeClr val="accent1"/>
+          </a:fillRef>
+          <a:effectRef idx="0">
+            <a:schemeClr val="accent1"/>
+          </a:effectRef>
+          <a:fontRef idx="minor">
+            <a:schemeClr val="tx1"/>
+          </a:fontRef>
+        </p:style>
+      </p:cxnSp>
+      <p:sp>
+        <p:nvSpPr>
+          <p:cNvPr id="15" name="Rectangle: Rounded Corners 14">
+            <a:extLst>
+              <a:ext uri="{FF2B5EF4-FFF2-40B4-BE49-F238E27FC236}">
+                <a16:creationId xmlns:a16="http://schemas.microsoft.com/office/drawing/2014/main" id="{60024E6C-3043-4E18-A1D0-E132708E98D6}"/>
+              </a:ext>
+            </a:extLst>
+          </p:cNvPr>
+          <p:cNvSpPr/>
+          <p:nvPr/>
+        </p:nvSpPr>
+        <p:spPr>
+          <a:xfrm>
+            <a:off x="0" y="-393405"/>
+            <a:ext cx="1655545" cy="287079"/>
+          </a:xfrm>
+          <a:prstGeom prst="roundRect">
+            <a:avLst/>
+          </a:prstGeom>
+          <a:noFill/>
+          <a:ln>
+            <a:noFill/>
+          </a:ln>
+        </p:spPr>
+        <p:style>
+          <a:lnRef idx="2">
+            <a:schemeClr val="accent1">
+              <a:shade val="50000"/>
+            </a:schemeClr>
+          </a:lnRef>
+          <a:fillRef idx="1">
+            <a:schemeClr val="accent1"/>
+          </a:fillRef>
+          <a:effectRef idx="0">
+            <a:schemeClr val="accent1"/>
+          </a:effectRef>
+          <a:fontRef idx="minor">
+            <a:schemeClr val="lt1"/>
+          </a:fontRef>
+        </p:style>
+        <p:txBody>
+          <a:bodyPr rtlCol="0" anchor="ctr"/>
+          <a:lstStyle/>
+          <a:p>
+            <a:pPr algn="ctr"/>
+            <a:r>
+              <a:rPr lang="en-US" dirty="0">
+                <a:solidFill>
+                  <a:schemeClr val="tx1"/>
+                </a:solidFill>
+              </a:rPr>
+              <a:t>bookmark.png</a:t>
+            </a:r>
+          </a:p>
+        </p:txBody>
+      </p:sp>
       <p:pic>
         <p:nvPicPr>
-          <p:cNvPr id="7" name="Picture 6">
+          <p:cNvPr id="3" name="Picture 2">
             <a:extLst>
               <a:ext uri="{FF2B5EF4-FFF2-40B4-BE49-F238E27FC236}">
-                <a16:creationId xmlns:a16="http://schemas.microsoft.com/office/drawing/2014/main" id="{F162D799-5468-4EAF-AFFC-3955C01C6F89}"/>
+                <a16:creationId xmlns:a16="http://schemas.microsoft.com/office/drawing/2014/main" id="{1AD34253-870B-46DE-8619-E065FDB7595B}"/>
               </a:ext>
             </a:extLst>
           </p:cNvPr>
@@ -14593,8 +15200,8 @@
         </p:blipFill>
         <p:spPr>
           <a:xfrm>
-            <a:off x="8948365" y="2186147"/>
-            <a:ext cx="2781300" cy="1571625"/>
+            <a:off x="8948365" y="1651189"/>
+            <a:ext cx="2743200" cy="2626962"/>
           </a:xfrm>
           <a:prstGeom prst="rect">
             <a:avLst/>
@@ -14613,109 +15220,6 @@
           </a:effectLst>
         </p:spPr>
       </p:pic>
-      <p:cxnSp>
-        <p:nvCxnSpPr>
-          <p:cNvPr id="8" name="Straight Arrow Connector 7">
-            <a:extLst>
-              <a:ext uri="{FF2B5EF4-FFF2-40B4-BE49-F238E27FC236}">
-                <a16:creationId xmlns:a16="http://schemas.microsoft.com/office/drawing/2014/main" id="{E00FDCFA-85FC-4BB0-AFCB-AB115446B6EB}"/>
-              </a:ext>
-            </a:extLst>
-          </p:cNvPr>
-          <p:cNvCxnSpPr>
-            <a:cxnSpLocks/>
-            <a:stCxn id="6" idx="5"/>
-            <a:endCxn id="7" idx="1"/>
-          </p:cNvCxnSpPr>
-          <p:nvPr/>
-        </p:nvCxnSpPr>
-        <p:spPr>
-          <a:xfrm>
-            <a:off x="7198400" y="1383228"/>
-            <a:ext cx="1749965" cy="1588732"/>
-          </a:xfrm>
-          <a:prstGeom prst="straightConnector1">
-            <a:avLst/>
-          </a:prstGeom>
-          <a:ln w="28575">
-            <a:solidFill>
-              <a:srgbClr val="FF0000"/>
-            </a:solidFill>
-            <a:tailEnd type="triangle" w="lg" len="lg"/>
-          </a:ln>
-        </p:spPr>
-        <p:style>
-          <a:lnRef idx="1">
-            <a:schemeClr val="accent1"/>
-          </a:lnRef>
-          <a:fillRef idx="0">
-            <a:schemeClr val="accent1"/>
-          </a:fillRef>
-          <a:effectRef idx="0">
-            <a:schemeClr val="accent1"/>
-          </a:effectRef>
-          <a:fontRef idx="minor">
-            <a:schemeClr val="tx1"/>
-          </a:fontRef>
-        </p:style>
-      </p:cxnSp>
-      <p:sp>
-        <p:nvSpPr>
-          <p:cNvPr id="15" name="Rectangle: Rounded Corners 14">
-            <a:extLst>
-              <a:ext uri="{FF2B5EF4-FFF2-40B4-BE49-F238E27FC236}">
-                <a16:creationId xmlns:a16="http://schemas.microsoft.com/office/drawing/2014/main" id="{60024E6C-3043-4E18-A1D0-E132708E98D6}"/>
-              </a:ext>
-            </a:extLst>
-          </p:cNvPr>
-          <p:cNvSpPr/>
-          <p:nvPr/>
-        </p:nvSpPr>
-        <p:spPr>
-          <a:xfrm>
-            <a:off x="0" y="-393405"/>
-            <a:ext cx="1655545" cy="287079"/>
-          </a:xfrm>
-          <a:prstGeom prst="roundRect">
-            <a:avLst/>
-          </a:prstGeom>
-          <a:noFill/>
-          <a:ln>
-            <a:noFill/>
-          </a:ln>
-        </p:spPr>
-        <p:style>
-          <a:lnRef idx="2">
-            <a:schemeClr val="accent1">
-              <a:shade val="50000"/>
-            </a:schemeClr>
-          </a:lnRef>
-          <a:fillRef idx="1">
-            <a:schemeClr val="accent1"/>
-          </a:fillRef>
-          <a:effectRef idx="0">
-            <a:schemeClr val="accent1"/>
-          </a:effectRef>
-          <a:fontRef idx="minor">
-            <a:schemeClr val="lt1"/>
-          </a:fontRef>
-        </p:style>
-        <p:txBody>
-          <a:bodyPr rtlCol="0" anchor="ctr"/>
-          <a:lstStyle/>
-          <a:p>
-            <a:pPr algn="ctr"/>
-            <a:r>
-              <a:rPr lang="en-US" dirty="0">
-                <a:solidFill>
-                  <a:schemeClr val="tx1"/>
-                </a:solidFill>
-              </a:rPr>
-              <a:t>bookmark.png</a:t>
-            </a:r>
-          </a:p>
-        </p:txBody>
-      </p:sp>
     </p:spTree>
     <p:extLst>
       <p:ext uri="{BB962C8B-B14F-4D97-AF65-F5344CB8AC3E}">
@@ -14748,32 +15252,38 @@
       </p:grpSpPr>
       <p:pic>
         <p:nvPicPr>
-          <p:cNvPr id="5" name="Picture 4">
+          <p:cNvPr id="7" name="Picture 8">
             <a:extLst>
               <a:ext uri="{FF2B5EF4-FFF2-40B4-BE49-F238E27FC236}">
-                <a16:creationId xmlns:a16="http://schemas.microsoft.com/office/drawing/2014/main" id="{1FFE2715-686B-4742-94F8-AAF43F7F276A}"/>
+                <a16:creationId xmlns:a16="http://schemas.microsoft.com/office/drawing/2014/main" id="{4258DE63-7055-4436-BCDB-8FC82096C4C1}"/>
               </a:ext>
             </a:extLst>
           </p:cNvPr>
           <p:cNvPicPr>
-            <a:picLocks noChangeAspect="1"/>
+            <a:picLocks noChangeAspect="1" noChangeArrowheads="1"/>
           </p:cNvPicPr>
           <p:nvPr/>
         </p:nvPicPr>
-        <p:blipFill>
-          <a:blip r:embed="rId2"/>
-          <a:stretch>
-            <a:fillRect/>
-          </a:stretch>
+        <p:blipFill rotWithShape="1">
+          <a:blip r:embed="rId2">
+            <a:extLst>
+              <a:ext uri="{28A0092B-C50C-407E-A947-70E740481C1C}">
+                <a14:useLocalDpi xmlns:a14="http://schemas.microsoft.com/office/drawing/2010/main" val="0"/>
+              </a:ext>
+            </a:extLst>
+          </a:blip>
+          <a:srcRect b="4154"/>
+          <a:stretch/>
         </p:blipFill>
-        <p:spPr>
+        <p:spPr bwMode="auto">
           <a:xfrm>
-            <a:off x="186720" y="199606"/>
-            <a:ext cx="6657712" cy="4348526"/>
+            <a:off x="309581" y="191856"/>
+            <a:ext cx="6885755" cy="4572000"/>
           </a:xfrm>
           <a:prstGeom prst="rect">
             <a:avLst/>
           </a:prstGeom>
+          <a:noFill/>
           <a:ln>
             <a:solidFill>
               <a:schemeClr val="tx1"/>
@@ -14786,6 +15296,15 @@
               </a:prstClr>
             </a:outerShdw>
           </a:effectLst>
+          <a:extLst>
+            <a:ext uri="{909E8E84-426E-40DD-AFC4-6F175D3DCCD1}">
+              <a14:hiddenFill xmlns:a14="http://schemas.microsoft.com/office/drawing/2010/main">
+                <a:solidFill>
+                  <a:srgbClr val="FFFFFF"/>
+                </a:solidFill>
+              </a14:hiddenFill>
+            </a:ext>
+          </a:extLst>
         </p:spPr>
       </p:pic>
       <p:sp>
@@ -15017,32 +15536,38 @@
       </p:grpSpPr>
       <p:pic>
         <p:nvPicPr>
-          <p:cNvPr id="5" name="Picture 4">
+          <p:cNvPr id="7" name="Picture 8">
             <a:extLst>
               <a:ext uri="{FF2B5EF4-FFF2-40B4-BE49-F238E27FC236}">
-                <a16:creationId xmlns:a16="http://schemas.microsoft.com/office/drawing/2014/main" id="{1FFE2715-686B-4742-94F8-AAF43F7F276A}"/>
+                <a16:creationId xmlns:a16="http://schemas.microsoft.com/office/drawing/2014/main" id="{BE62B3E8-6927-47F4-B50D-DF3840D8D40D}"/>
               </a:ext>
             </a:extLst>
           </p:cNvPr>
           <p:cNvPicPr>
-            <a:picLocks noChangeAspect="1"/>
+            <a:picLocks noChangeAspect="1" noChangeArrowheads="1"/>
           </p:cNvPicPr>
           <p:nvPr/>
         </p:nvPicPr>
-        <p:blipFill>
-          <a:blip r:embed="rId2"/>
-          <a:stretch>
-            <a:fillRect/>
-          </a:stretch>
+        <p:blipFill rotWithShape="1">
+          <a:blip r:embed="rId2">
+            <a:extLst>
+              <a:ext uri="{28A0092B-C50C-407E-A947-70E740481C1C}">
+                <a14:useLocalDpi xmlns:a14="http://schemas.microsoft.com/office/drawing/2010/main" val="0"/>
+              </a:ext>
+            </a:extLst>
+          </a:blip>
+          <a:srcRect b="4154"/>
+          <a:stretch/>
         </p:blipFill>
-        <p:spPr>
+        <p:spPr bwMode="auto">
           <a:xfrm>
-            <a:off x="186720" y="199606"/>
-            <a:ext cx="6657712" cy="4348526"/>
+            <a:off x="314293" y="191856"/>
+            <a:ext cx="6885755" cy="4572000"/>
           </a:xfrm>
           <a:prstGeom prst="rect">
             <a:avLst/>
           </a:prstGeom>
+          <a:noFill/>
           <a:ln>
             <a:solidFill>
               <a:schemeClr val="tx1"/>
@@ -15055,6 +15580,15 @@
               </a:prstClr>
             </a:outerShdw>
           </a:effectLst>
+          <a:extLst>
+            <a:ext uri="{909E8E84-426E-40DD-AFC4-6F175D3DCCD1}">
+              <a14:hiddenFill xmlns:a14="http://schemas.microsoft.com/office/drawing/2010/main">
+                <a:solidFill>
+                  <a:srgbClr val="FFFFFF"/>
+                </a:solidFill>
+              </a14:hiddenFill>
+            </a:ext>
+          </a:extLst>
         </p:spPr>
       </p:pic>
       <p:sp>
@@ -15213,32 +15747,40 @@
       </p:sp>
       <p:pic>
         <p:nvPicPr>
-          <p:cNvPr id="2" name="Picture 1">
+          <p:cNvPr id="4098" name="Picture 2">
             <a:extLst>
               <a:ext uri="{FF2B5EF4-FFF2-40B4-BE49-F238E27FC236}">
-                <a16:creationId xmlns:a16="http://schemas.microsoft.com/office/drawing/2014/main" id="{89DE1DAD-F8F9-4F53-B1DF-3C238DEA32DC}"/>
+                <a16:creationId xmlns:a16="http://schemas.microsoft.com/office/drawing/2014/main" id="{956DAB03-0C0D-4969-ACFB-E26A79CE010B}"/>
               </a:ext>
             </a:extLst>
           </p:cNvPr>
           <p:cNvPicPr>
-            <a:picLocks noChangeAspect="1"/>
+            <a:picLocks noChangeAspect="1" noChangeArrowheads="1"/>
           </p:cNvPicPr>
           <p:nvPr/>
         </p:nvPicPr>
         <p:blipFill>
-          <a:blip r:embed="rId3"/>
+          <a:blip r:embed="rId3">
+            <a:extLst>
+              <a:ext uri="{28A0092B-C50C-407E-A947-70E740481C1C}">
+                <a14:useLocalDpi xmlns:a14="http://schemas.microsoft.com/office/drawing/2010/main" val="0"/>
+              </a:ext>
+            </a:extLst>
+          </a:blip>
+          <a:srcRect/>
           <a:stretch>
             <a:fillRect/>
           </a:stretch>
         </p:blipFill>
-        <p:spPr>
+        <p:spPr bwMode="auto">
           <a:xfrm>
-            <a:off x="6378823" y="2373869"/>
-            <a:ext cx="5413806" cy="4178595"/>
+            <a:off x="5563341" y="2373869"/>
+            <a:ext cx="5275581" cy="3657600"/>
           </a:xfrm>
           <a:prstGeom prst="rect">
             <a:avLst/>
           </a:prstGeom>
+          <a:noFill/>
           <a:ln>
             <a:solidFill>
               <a:schemeClr val="tx1"/>
@@ -15251,6 +15793,15 @@
               </a:prstClr>
             </a:outerShdw>
           </a:effectLst>
+          <a:extLst>
+            <a:ext uri="{909E8E84-426E-40DD-AFC4-6F175D3DCCD1}">
+              <a14:hiddenFill xmlns:a14="http://schemas.microsoft.com/office/drawing/2010/main">
+                <a:solidFill>
+                  <a:srgbClr val="FFFFFF"/>
+                </a:solidFill>
+              </a14:hiddenFill>
+            </a:ext>
+          </a:extLst>
         </p:spPr>
       </p:pic>
     </p:spTree>
@@ -15285,32 +15836,38 @@
       </p:grpSpPr>
       <p:pic>
         <p:nvPicPr>
-          <p:cNvPr id="4" name="Picture 3">
+          <p:cNvPr id="16" name="Picture 2">
             <a:extLst>
               <a:ext uri="{FF2B5EF4-FFF2-40B4-BE49-F238E27FC236}">
-                <a16:creationId xmlns:a16="http://schemas.microsoft.com/office/drawing/2014/main" id="{64F8CE30-F2F4-4CFB-8A11-90B99B4AE6D0}"/>
+                <a16:creationId xmlns:a16="http://schemas.microsoft.com/office/drawing/2014/main" id="{082EEB48-D376-49AB-8C68-C8B1B40D857B}"/>
               </a:ext>
             </a:extLst>
           </p:cNvPr>
           <p:cNvPicPr>
-            <a:picLocks noChangeAspect="1"/>
+            <a:picLocks noChangeAspect="1" noChangeArrowheads="1"/>
           </p:cNvPicPr>
           <p:nvPr/>
         </p:nvPicPr>
-        <p:blipFill>
-          <a:blip r:embed="rId2"/>
-          <a:stretch>
-            <a:fillRect/>
-          </a:stretch>
+        <p:blipFill rotWithShape="1">
+          <a:blip r:embed="rId2">
+            <a:extLst>
+              <a:ext uri="{28A0092B-C50C-407E-A947-70E740481C1C}">
+                <a14:useLocalDpi xmlns:a14="http://schemas.microsoft.com/office/drawing/2010/main" val="0"/>
+              </a:ext>
+            </a:extLst>
+          </a:blip>
+          <a:srcRect b="4161"/>
+          <a:stretch/>
         </p:blipFill>
-        <p:spPr>
+        <p:spPr bwMode="auto">
           <a:xfrm>
-            <a:off x="2050127" y="1286540"/>
-            <a:ext cx="8091746" cy="5215508"/>
+            <a:off x="2044807" y="995073"/>
+            <a:ext cx="7850375" cy="5212080"/>
           </a:xfrm>
           <a:prstGeom prst="rect">
             <a:avLst/>
           </a:prstGeom>
+          <a:noFill/>
           <a:ln>
             <a:solidFill>
               <a:schemeClr val="tx1"/>
@@ -15323,6 +15880,15 @@
               </a:prstClr>
             </a:outerShdw>
           </a:effectLst>
+          <a:extLst>
+            <a:ext uri="{909E8E84-426E-40DD-AFC4-6F175D3DCCD1}">
+              <a14:hiddenFill xmlns:a14="http://schemas.microsoft.com/office/drawing/2010/main">
+                <a:solidFill>
+                  <a:srgbClr val="FFFFFF"/>
+                </a:solidFill>
+              </a14:hiddenFill>
+            </a:ext>
+          </a:extLst>
         </p:spPr>
       </p:pic>
       <p:cxnSp>
@@ -15336,14 +15902,14 @@
           </p:cNvPr>
           <p:cNvCxnSpPr>
             <a:cxnSpLocks/>
-            <a:stCxn id="6" idx="3"/>
+            <a:stCxn id="6" idx="2"/>
           </p:cNvCxnSpPr>
           <p:nvPr/>
         </p:nvCxnSpPr>
         <p:spPr>
           <a:xfrm>
-            <a:off x="3483931" y="659709"/>
-            <a:ext cx="719064" cy="1015872"/>
+            <a:off x="2656159" y="887630"/>
+            <a:ext cx="1514588" cy="802947"/>
           </a:xfrm>
           <a:prstGeom prst="straightConnector1">
             <a:avLst/>
@@ -15384,7 +15950,7 @@
         </p:nvSpPr>
         <p:spPr>
           <a:xfrm>
-            <a:off x="1828386" y="313200"/>
+            <a:off x="1828386" y="194612"/>
             <a:ext cx="1655545" cy="693018"/>
           </a:xfrm>
           <a:prstGeom prst="roundRect">
@@ -15430,14 +15996,14 @@
           </p:cNvPr>
           <p:cNvCxnSpPr>
             <a:cxnSpLocks/>
-            <a:stCxn id="8" idx="1"/>
+            <a:stCxn id="8" idx="2"/>
           </p:cNvCxnSpPr>
           <p:nvPr/>
         </p:nvCxnSpPr>
         <p:spPr>
           <a:xfrm flipH="1">
-            <a:off x="5858540" y="617177"/>
-            <a:ext cx="1080952" cy="1073400"/>
+            <a:off x="5741690" y="887630"/>
+            <a:ext cx="2016698" cy="839321"/>
           </a:xfrm>
           <a:prstGeom prst="straightConnector1">
             <a:avLst/>
@@ -15478,7 +16044,7 @@
         </p:nvSpPr>
         <p:spPr>
           <a:xfrm>
-            <a:off x="6939492" y="270668"/>
+            <a:off x="6930615" y="194612"/>
             <a:ext cx="1655545" cy="693018"/>
           </a:xfrm>
           <a:prstGeom prst="roundRect">
@@ -15892,11 +16458,105 @@
             <a:pPr algn="ctr"/>
             <a:r>
               <a:rPr lang="en-US" dirty="0"/>
-              <a:t>Year Scrollbar</a:t>
+              <a:t>Year Slide Bar</a:t>
             </a:r>
           </a:p>
         </p:txBody>
       </p:sp>
+      <p:sp>
+        <p:nvSpPr>
+          <p:cNvPr id="19" name="Rectangle: Rounded Corners 18">
+            <a:extLst>
+              <a:ext uri="{FF2B5EF4-FFF2-40B4-BE49-F238E27FC236}">
+                <a16:creationId xmlns:a16="http://schemas.microsoft.com/office/drawing/2014/main" id="{8D577789-A050-4F72-B850-6FE5305B38B4}"/>
+              </a:ext>
+            </a:extLst>
+          </p:cNvPr>
+          <p:cNvSpPr/>
+          <p:nvPr/>
+        </p:nvSpPr>
+        <p:spPr>
+          <a:xfrm>
+            <a:off x="4238361" y="194612"/>
+            <a:ext cx="1655545" cy="693018"/>
+          </a:xfrm>
+          <a:prstGeom prst="roundRect">
+            <a:avLst/>
+          </a:prstGeom>
+        </p:spPr>
+        <p:style>
+          <a:lnRef idx="2">
+            <a:schemeClr val="accent1">
+              <a:shade val="50000"/>
+            </a:schemeClr>
+          </a:lnRef>
+          <a:fillRef idx="1">
+            <a:schemeClr val="accent1"/>
+          </a:fillRef>
+          <a:effectRef idx="0">
+            <a:schemeClr val="accent1"/>
+          </a:effectRef>
+          <a:fontRef idx="minor">
+            <a:schemeClr val="lt1"/>
+          </a:fontRef>
+        </p:style>
+        <p:txBody>
+          <a:bodyPr rtlCol="0" anchor="ctr"/>
+          <a:lstStyle/>
+          <a:p>
+            <a:pPr algn="ctr"/>
+            <a:r>
+              <a:rPr lang="en-US" dirty="0"/>
+              <a:t>Data Story</a:t>
+            </a:r>
+          </a:p>
+        </p:txBody>
+      </p:sp>
+      <p:cxnSp>
+        <p:nvCxnSpPr>
+          <p:cNvPr id="21" name="Straight Arrow Connector 20">
+            <a:extLst>
+              <a:ext uri="{FF2B5EF4-FFF2-40B4-BE49-F238E27FC236}">
+                <a16:creationId xmlns:a16="http://schemas.microsoft.com/office/drawing/2014/main" id="{FD38E74D-84F9-45A0-9E6C-2C4B56588F0C}"/>
+              </a:ext>
+            </a:extLst>
+          </p:cNvPr>
+          <p:cNvCxnSpPr>
+            <a:cxnSpLocks/>
+            <a:stCxn id="19" idx="2"/>
+          </p:cNvCxnSpPr>
+          <p:nvPr/>
+        </p:nvCxnSpPr>
+        <p:spPr>
+          <a:xfrm>
+            <a:off x="5066134" y="887630"/>
+            <a:ext cx="0" cy="453952"/>
+          </a:xfrm>
+          <a:prstGeom prst="straightConnector1">
+            <a:avLst/>
+          </a:prstGeom>
+          <a:ln w="38100">
+            <a:solidFill>
+              <a:srgbClr val="FF0000"/>
+            </a:solidFill>
+            <a:tailEnd type="triangle" w="lg" len="lg"/>
+          </a:ln>
+        </p:spPr>
+        <p:style>
+          <a:lnRef idx="1">
+            <a:schemeClr val="accent1"/>
+          </a:lnRef>
+          <a:fillRef idx="0">
+            <a:schemeClr val="accent1"/>
+          </a:fillRef>
+          <a:effectRef idx="0">
+            <a:schemeClr val="accent1"/>
+          </a:effectRef>
+          <a:fontRef idx="minor">
+            <a:schemeClr val="tx1"/>
+          </a:fontRef>
+        </p:style>
+      </p:cxnSp>
     </p:spTree>
     <p:extLst>
       <p:ext uri="{BB962C8B-B14F-4D97-AF65-F5344CB8AC3E}">

</xml_diff>